<commit_message>
chore: Add some more analysis
</commit_message>
<xml_diff>
--- a/Lending Club Case Study.pptx
+++ b/Lending Club Case Study.pptx
@@ -2764,8 +2764,8 @@
     </dgm:pt>
   </dgm:ptLst>
   <dgm:cxnLst>
+    <dgm:cxn modelId="{7676A246-4A72-461E-B1F2-B9971D3A84A5}" type="presOf" srcId="{3C4CDE7B-DEAD-45A1-93CF-F457CC09E9BF}" destId="{0FF0B6D4-D5A1-4CF0-A704-F7732984552D}" srcOrd="1" destOrd="0" presId="urn:microsoft.com/office/officeart/2005/8/layout/vProcess5"/>
     <dgm:cxn modelId="{EDBEB35C-BC36-423E-A7AE-EFBC96A1AC21}" srcId="{46942F89-7408-4143-A04E-2E5FCA761BB0}" destId="{70E5059F-BE4F-42AC-950E-28736A35CF35}" srcOrd="0" destOrd="0" parTransId="{4B6F9F15-5643-4F50-9123-FC2C5A628143}" sibTransId="{CDA12E66-93A4-47F4-A552-6A51DF9D11A3}"/>
-    <dgm:cxn modelId="{7676A246-4A72-461E-B1F2-B9971D3A84A5}" type="presOf" srcId="{3C4CDE7B-DEAD-45A1-93CF-F457CC09E9BF}" destId="{0FF0B6D4-D5A1-4CF0-A704-F7732984552D}" srcOrd="1" destOrd="0" presId="urn:microsoft.com/office/officeart/2005/8/layout/vProcess5"/>
     <dgm:cxn modelId="{BE7D00A8-C92D-4BA1-BC65-D93A442F8967}" type="presOf" srcId="{CDA12E66-93A4-47F4-A552-6A51DF9D11A3}" destId="{03A4F8E2-501E-4B19-B2FF-2BC6A48319E0}" srcOrd="0" destOrd="0" presId="urn:microsoft.com/office/officeart/2005/8/layout/vProcess5"/>
     <dgm:cxn modelId="{D9A193AC-B630-4CD6-905E-32DEA596B942}" srcId="{46942F89-7408-4143-A04E-2E5FCA761BB0}" destId="{3C4CDE7B-DEAD-45A1-93CF-F457CC09E9BF}" srcOrd="1" destOrd="0" parTransId="{00D80EAC-CAC9-4A51-A341-55442D134721}" sibTransId="{F7283870-52F6-479E-9FAF-83E32F6A9453}"/>
     <dgm:cxn modelId="{8A71A7E0-3199-4C31-B928-D70965989316}" type="presOf" srcId="{70E5059F-BE4F-42AC-950E-28736A35CF35}" destId="{A5E2B134-293F-437C-9FC5-18E7DA905CBB}" srcOrd="0" destOrd="0" presId="urn:microsoft.com/office/officeart/2005/8/layout/vProcess5"/>
@@ -3249,12 +3249,12 @@
     <dgm:cxn modelId="{25C7EF26-C808-4D3A-A29E-498FD7D9EA5B}" type="presOf" srcId="{F27BB194-C5A6-485F-B7B2-1045249D6FA8}" destId="{764C10EB-98B1-460A-9F00-441B3C676616}" srcOrd="0" destOrd="0" presId="urn:microsoft.com/office/officeart/2016/7/layout/RepeatingBendingProcessNew"/>
     <dgm:cxn modelId="{8966D327-A017-4E14-B0FA-CBACE4F95D92}" type="presOf" srcId="{9B368393-1B97-4AC5-841C-60BD6C66D4A4}" destId="{F349DA9B-9599-45E1-B864-C4DFE5087D4F}" srcOrd="1" destOrd="0" presId="urn:microsoft.com/office/officeart/2016/7/layout/RepeatingBendingProcessNew"/>
     <dgm:cxn modelId="{CBC6E739-30BD-4D3A-8F77-3B6BA32A5217}" srcId="{E82AF63D-4D60-4DAE-905F-D29CD31363C8}" destId="{4129CFBD-3D5A-4926-9E7B-DA65E818255F}" srcOrd="2" destOrd="0" parTransId="{2825E212-48ED-4179-A1B1-D1B0243F4361}" sibTransId="{86E4539D-8FEE-456B-9871-6F846FACFD52}"/>
-    <dgm:cxn modelId="{6E7B8E5C-9F27-4F58-B12B-206C8F478CEA}" type="presOf" srcId="{04FAC872-8DFE-4CB1-AB5E-1AB213161C7A}" destId="{44307A02-BAAC-43C9-A936-3C8FE70902BC}" srcOrd="0" destOrd="2" presId="urn:microsoft.com/office/officeart/2016/7/layout/RepeatingBendingProcessNew"/>
     <dgm:cxn modelId="{FBEFC041-584E-4884-95A2-A09864B4B385}" type="presOf" srcId="{F27BB194-C5A6-485F-B7B2-1045249D6FA8}" destId="{100659C1-7284-44CA-951C-82836D94A6E5}" srcOrd="1" destOrd="0" presId="urn:microsoft.com/office/officeart/2016/7/layout/RepeatingBendingProcessNew"/>
-    <dgm:cxn modelId="{A30C4666-B197-4174-A6A2-D4FCC13162B5}" type="presOf" srcId="{1FA136F0-C748-47AE-A148-5F27844DCEBE}" destId="{80488D83-6EA4-452D-88B5-AFEDE4919FF0}" srcOrd="0" destOrd="0" presId="urn:microsoft.com/office/officeart/2016/7/layout/RepeatingBendingProcessNew"/>
     <dgm:cxn modelId="{7F19264C-9FBB-4B38-B217-7DB33474931D}" type="presOf" srcId="{F620FAB2-DE09-4CBF-98BF-475A77F3EC57}" destId="{6E71D10D-8AA0-4210-9CB5-56A018C37844}" srcOrd="1" destOrd="0" presId="urn:microsoft.com/office/officeart/2016/7/layout/RepeatingBendingProcessNew"/>
     <dgm:cxn modelId="{D2E65650-8615-42F6-9DF3-D737A8F24B0C}" type="presOf" srcId="{4129CFBD-3D5A-4926-9E7B-DA65E818255F}" destId="{44307A02-BAAC-43C9-A936-3C8FE70902BC}" srcOrd="0" destOrd="3" presId="urn:microsoft.com/office/officeart/2016/7/layout/RepeatingBendingProcessNew"/>
     <dgm:cxn modelId="{597BD752-1628-4EE1-BA4D-1CFB9380D660}" type="presOf" srcId="{E82AF63D-4D60-4DAE-905F-D29CD31363C8}" destId="{44307A02-BAAC-43C9-A936-3C8FE70902BC}" srcOrd="0" destOrd="0" presId="urn:microsoft.com/office/officeart/2016/7/layout/RepeatingBendingProcessNew"/>
+    <dgm:cxn modelId="{6E7B8E5C-9F27-4F58-B12B-206C8F478CEA}" type="presOf" srcId="{04FAC872-8DFE-4CB1-AB5E-1AB213161C7A}" destId="{44307A02-BAAC-43C9-A936-3C8FE70902BC}" srcOrd="0" destOrd="2" presId="urn:microsoft.com/office/officeart/2016/7/layout/RepeatingBendingProcessNew"/>
+    <dgm:cxn modelId="{A30C4666-B197-4174-A6A2-D4FCC13162B5}" type="presOf" srcId="{1FA136F0-C748-47AE-A148-5F27844DCEBE}" destId="{80488D83-6EA4-452D-88B5-AFEDE4919FF0}" srcOrd="0" destOrd="0" presId="urn:microsoft.com/office/officeart/2016/7/layout/RepeatingBendingProcessNew"/>
     <dgm:cxn modelId="{8DE3C978-FF78-4323-A640-824CAF750103}" type="presOf" srcId="{BB4EBCED-A00F-47C2-ADDD-DB7EA0453683}" destId="{FF55B818-920F-46BF-A11E-619B21BC9DB4}" srcOrd="0" destOrd="0" presId="urn:microsoft.com/office/officeart/2016/7/layout/RepeatingBendingProcessNew"/>
     <dgm:cxn modelId="{3E550879-5B01-4DB3-A3C0-07C462790425}" type="presOf" srcId="{BAFB70B2-D29F-459F-BCE8-F58247016A59}" destId="{44307A02-BAAC-43C9-A936-3C8FE70902BC}" srcOrd="0" destOrd="1" presId="urn:microsoft.com/office/officeart/2016/7/layout/RepeatingBendingProcessNew"/>
     <dgm:cxn modelId="{43F39680-C811-4623-B6DE-66200B8901EE}" type="presOf" srcId="{084F3510-B883-4378-AA67-8E9B243BDFE8}" destId="{27D2CF87-7972-4C41-8E90-81554A6B0D6D}" srcOrd="0" destOrd="0" presId="urn:microsoft.com/office/officeart/2016/7/layout/RepeatingBendingProcessNew"/>
@@ -3322,8 +3322,8 @@
         <a:lstStyle/>
         <a:p>
           <a:r>
-            <a:rPr lang="en-US"/>
-            <a:t>Interest Rate.</a:t>
+            <a:rPr lang="en-US" dirty="0"/>
+            <a:t>Interest Rate</a:t>
           </a:r>
         </a:p>
       </dgm:t>
@@ -3358,8 +3358,8 @@
         <a:lstStyle/>
         <a:p>
           <a:r>
-            <a:rPr lang="en-US"/>
-            <a:t>Annual Income.</a:t>
+            <a:rPr lang="en-US" dirty="0"/>
+            <a:t>Annual Income</a:t>
           </a:r>
         </a:p>
       </dgm:t>
@@ -3394,8 +3394,8 @@
         <a:lstStyle/>
         <a:p>
           <a:r>
-            <a:rPr lang="en-US"/>
-            <a:t>Loan Amount.</a:t>
+            <a:rPr lang="en-US" dirty="0"/>
+            <a:t>Loan Amount</a:t>
           </a:r>
         </a:p>
       </dgm:t>
@@ -3430,8 +3430,8 @@
         <a:lstStyle/>
         <a:p>
           <a:r>
-            <a:rPr lang="en-US"/>
-            <a:t>Grade of the Loan.</a:t>
+            <a:rPr lang="en-US" dirty="0"/>
+            <a:t>Grade of the Loan</a:t>
           </a:r>
         </a:p>
       </dgm:t>
@@ -3466,8 +3466,8 @@
         <a:lstStyle/>
         <a:p>
           <a:r>
-            <a:rPr lang="en-US"/>
-            <a:t>Purpose of the Loan.</a:t>
+            <a:rPr lang="en-US" dirty="0"/>
+            <a:t>Purpose of the Loan</a:t>
           </a:r>
         </a:p>
       </dgm:t>
@@ -3503,7 +3503,7 @@
         <a:p>
           <a:r>
             <a:rPr lang="en-US" dirty="0"/>
-            <a:t>Public record for bankruptcies.</a:t>
+            <a:t>Public record for bankruptcies</a:t>
           </a:r>
         </a:p>
       </dgm:t>
@@ -3539,7 +3539,7 @@
         <a:p>
           <a:r>
             <a:rPr lang="en-US" dirty="0"/>
-            <a:t>Employment Length.</a:t>
+            <a:t>Employment Length</a:t>
           </a:r>
         </a:p>
       </dgm:t>
@@ -3666,12 +3666,12 @@
   <dgm:cxnLst>
     <dgm:cxn modelId="{8D70A43D-8FFF-493E-A5DC-A5A96C5ECFCB}" srcId="{FDEADEFB-3108-4D39-A68E-B73CF1DD7101}" destId="{826B85A4-4088-4D2D-9EAE-47BCA1002C8D}" srcOrd="6" destOrd="0" parTransId="{8CDC87FD-CD92-4A39-BA00-225AD67275A9}" sibTransId="{74A0AE8C-6714-4C90-B392-3245DC99E599}"/>
     <dgm:cxn modelId="{BD0E9B43-FCF4-41B6-BB7D-D61B5FBA65A0}" srcId="{FDEADEFB-3108-4D39-A68E-B73CF1DD7101}" destId="{D7203C3C-ABF3-4280-B55B-9691A4796D67}" srcOrd="1" destOrd="0" parTransId="{11318669-9E14-48C6-AC27-1D87620E4633}" sibTransId="{71B6CC12-E636-4B16-9501-2C5C15AD1EC1}"/>
-    <dgm:cxn modelId="{7A8FFE66-DFE0-48A7-BE74-EB1EB88788FB}" srcId="{FDEADEFB-3108-4D39-A68E-B73CF1DD7101}" destId="{0490B504-3B2D-4673-BF3F-2534905C3FE6}" srcOrd="0" destOrd="0" parTransId="{767800B4-51C8-4A31-837D-B687470A329B}" sibTransId="{2CECAB72-49B0-46C2-9BC3-784541449D0E}"/>
-    <dgm:cxn modelId="{2730BF68-3F76-43BD-8B20-951225939A0C}" srcId="{FDEADEFB-3108-4D39-A68E-B73CF1DD7101}" destId="{1F24A6A8-50A1-4D68-8FD9-D8AF9FD6593E}" srcOrd="3" destOrd="0" parTransId="{094EEE90-ADA2-4387-BB76-F03FC5E397F9}" sibTransId="{38039BFD-78C7-4BF2-8181-54484D8D3CD2}"/>
     <dgm:cxn modelId="{473B654B-4AD6-4C83-9883-31B4CA25084B}" type="presOf" srcId="{A1450AEC-5BEA-4458-9763-94D6A5963846}" destId="{119EE1E9-A66E-4A8F-9043-595DFF0FFFFE}" srcOrd="0" destOrd="0" presId="urn:microsoft.com/office/officeart/2005/8/layout/vList2"/>
     <dgm:cxn modelId="{47ABBF4F-1655-4858-9FC6-D0EE6DA47295}" type="presOf" srcId="{1F24A6A8-50A1-4D68-8FD9-D8AF9FD6593E}" destId="{7A6CEEBF-6134-43DD-8D10-4C1F2988559A}" srcOrd="0" destOrd="0" presId="urn:microsoft.com/office/officeart/2005/8/layout/vList2"/>
     <dgm:cxn modelId="{DC886E52-3EDF-41DB-88CC-EBFB22CE2FA9}" srcId="{FDEADEFB-3108-4D39-A68E-B73CF1DD7101}" destId="{CC91DEB0-66D2-442A-8096-15F4AB7361BA}" srcOrd="2" destOrd="0" parTransId="{6F7330B0-B824-4573-A33B-BF94FC8E0AA6}" sibTransId="{C025D44F-9549-48EC-A42C-E489CD58E0B0}"/>
     <dgm:cxn modelId="{B2AD0F55-35C7-4A38-B6EE-760DAEA08975}" srcId="{FDEADEFB-3108-4D39-A68E-B73CF1DD7101}" destId="{F1ECB717-3901-4630-A9EA-BF84630F1253}" srcOrd="5" destOrd="0" parTransId="{37129F61-FF6A-433C-AB5A-DB0A88F5AA8C}" sibTransId="{EB7E1D43-F769-48D0-9EF1-9E47D78EC194}"/>
+    <dgm:cxn modelId="{7A8FFE66-DFE0-48A7-BE74-EB1EB88788FB}" srcId="{FDEADEFB-3108-4D39-A68E-B73CF1DD7101}" destId="{0490B504-3B2D-4673-BF3F-2534905C3FE6}" srcOrd="0" destOrd="0" parTransId="{767800B4-51C8-4A31-837D-B687470A329B}" sibTransId="{2CECAB72-49B0-46C2-9BC3-784541449D0E}"/>
+    <dgm:cxn modelId="{2730BF68-3F76-43BD-8B20-951225939A0C}" srcId="{FDEADEFB-3108-4D39-A68E-B73CF1DD7101}" destId="{1F24A6A8-50A1-4D68-8FD9-D8AF9FD6593E}" srcOrd="3" destOrd="0" parTransId="{094EEE90-ADA2-4387-BB76-F03FC5E397F9}" sibTransId="{38039BFD-78C7-4BF2-8181-54484D8D3CD2}"/>
     <dgm:cxn modelId="{7FD9E58D-248E-4DC1-BC04-D9F6E4874F65}" type="presOf" srcId="{FDEADEFB-3108-4D39-A68E-B73CF1DD7101}" destId="{57950189-7760-452B-A1A5-336FE40175E1}" srcOrd="0" destOrd="0" presId="urn:microsoft.com/office/officeart/2005/8/layout/vList2"/>
     <dgm:cxn modelId="{A1AECE93-0545-4BE8-A56F-DDCF00BDF3E4}" type="presOf" srcId="{CC91DEB0-66D2-442A-8096-15F4AB7361BA}" destId="{831CE515-3AAA-4D0E-BC15-F133498C8322}" srcOrd="0" destOrd="0" presId="urn:microsoft.com/office/officeart/2005/8/layout/vList2"/>
     <dgm:cxn modelId="{29A18EA9-802C-41F8-9FDF-2D4BBEDAE4EA}" type="presOf" srcId="{F1ECB717-3901-4630-A9EA-BF84630F1253}" destId="{0BFE404D-0655-4872-9BB1-92F347D9E73C}" srcOrd="0" destOrd="0" presId="urn:microsoft.com/office/officeart/2005/8/layout/vList2"/>
@@ -3799,7 +3799,7 @@
       </dsp:nvSpPr>
       <dsp:spPr>
         <a:xfrm>
-          <a:off x="1577339" y="2393235"/>
+          <a:off x="1577340" y="2393235"/>
           <a:ext cx="8938260" cy="1958102"/>
         </a:xfrm>
         <a:prstGeom prst="roundRect">
@@ -3809,7 +3809,7 @@
         </a:prstGeom>
         <a:solidFill>
           <a:schemeClr val="accent2">
-            <a:hueOff val="6443614"/>
+            <a:hueOff val="6443612"/>
             <a:satOff val="-18493"/>
             <a:lumOff val="-29609"/>
             <a:alphaOff val="0"/>
@@ -3892,7 +3892,7 @@
         </a:p>
       </dsp:txBody>
       <dsp:txXfrm>
-        <a:off x="1634690" y="2450586"/>
+        <a:off x="1634691" y="2450586"/>
         <a:ext cx="5973451" cy="1843400"/>
       </dsp:txXfrm>
     </dsp:sp>
@@ -5013,8 +5013,8 @@
             <a:buNone/>
           </a:pPr>
           <a:r>
-            <a:rPr lang="en-US" sz="2900" kern="1200"/>
-            <a:t>Interest Rate.</a:t>
+            <a:rPr lang="en-US" sz="2900" kern="1200" dirty="0"/>
+            <a:t>Interest Rate</a:t>
           </a:r>
         </a:p>
       </dsp:txBody>
@@ -5038,7 +5038,7 @@
         </a:prstGeom>
         <a:solidFill>
           <a:schemeClr val="accent2">
-            <a:hueOff val="1073936"/>
+            <a:hueOff val="1073935"/>
             <a:satOff val="-3082"/>
             <a:lumOff val="-4935"/>
             <a:alphaOff val="0"/>
@@ -5091,8 +5091,8 @@
             <a:buNone/>
           </a:pPr>
           <a:r>
-            <a:rPr lang="en-US" sz="2900" kern="1200"/>
-            <a:t>Annual Income.</a:t>
+            <a:rPr lang="en-US" sz="2900" kern="1200" dirty="0"/>
+            <a:t>Annual Income</a:t>
           </a:r>
         </a:p>
       </dsp:txBody>
@@ -5169,8 +5169,8 @@
             <a:buNone/>
           </a:pPr>
           <a:r>
-            <a:rPr lang="en-US" sz="2900" kern="1200"/>
-            <a:t>Loan Amount.</a:t>
+            <a:rPr lang="en-US" sz="2900" kern="1200" dirty="0"/>
+            <a:t>Loan Amount</a:t>
           </a:r>
         </a:p>
       </dsp:txBody>
@@ -5194,7 +5194,7 @@
         </a:prstGeom>
         <a:solidFill>
           <a:schemeClr val="accent2">
-            <a:hueOff val="3221807"/>
+            <a:hueOff val="3221806"/>
             <a:satOff val="-9246"/>
             <a:lumOff val="-14805"/>
             <a:alphaOff val="0"/>
@@ -5247,8 +5247,8 @@
             <a:buNone/>
           </a:pPr>
           <a:r>
-            <a:rPr lang="en-US" sz="2900" kern="1200"/>
-            <a:t>Grade of the Loan.</a:t>
+            <a:rPr lang="en-US" sz="2900" kern="1200" dirty="0"/>
+            <a:t>Grade of the Loan</a:t>
           </a:r>
         </a:p>
       </dsp:txBody>
@@ -5264,7 +5264,7 @@
       </dsp:nvSpPr>
       <dsp:spPr>
         <a:xfrm>
-          <a:off x="0" y="3192129"/>
+          <a:off x="0" y="3192128"/>
           <a:ext cx="5257800" cy="712530"/>
         </a:xfrm>
         <a:prstGeom prst="roundRect">
@@ -5272,7 +5272,7 @@
         </a:prstGeom>
         <a:solidFill>
           <a:schemeClr val="accent2">
-            <a:hueOff val="4295743"/>
+            <a:hueOff val="4295742"/>
             <a:satOff val="-12329"/>
             <a:lumOff val="-19739"/>
             <a:alphaOff val="0"/>
@@ -5325,13 +5325,13 @@
             <a:buNone/>
           </a:pPr>
           <a:r>
-            <a:rPr lang="en-US" sz="2900" kern="1200"/>
-            <a:t>Purpose of the Loan.</a:t>
+            <a:rPr lang="en-US" sz="2900" kern="1200" dirty="0"/>
+            <a:t>Purpose of the Loan</a:t>
           </a:r>
         </a:p>
       </dsp:txBody>
       <dsp:txXfrm>
-        <a:off x="34783" y="3226912"/>
+        <a:off x="34783" y="3226911"/>
         <a:ext cx="5188234" cy="642964"/>
       </dsp:txXfrm>
     </dsp:sp>
@@ -5342,7 +5342,7 @@
       </dsp:nvSpPr>
       <dsp:spPr>
         <a:xfrm>
-          <a:off x="0" y="3988179"/>
+          <a:off x="0" y="3988178"/>
           <a:ext cx="5257800" cy="712530"/>
         </a:xfrm>
         <a:prstGeom prst="roundRect">
@@ -5350,7 +5350,7 @@
         </a:prstGeom>
         <a:solidFill>
           <a:schemeClr val="accent2">
-            <a:hueOff val="5369678"/>
+            <a:hueOff val="5369677"/>
             <a:satOff val="-15411"/>
             <a:lumOff val="-24674"/>
             <a:alphaOff val="0"/>
@@ -5404,12 +5404,12 @@
           </a:pPr>
           <a:r>
             <a:rPr lang="en-US" sz="2900" kern="1200" dirty="0"/>
-            <a:t>Public record for bankruptcies.</a:t>
+            <a:t>Public record for bankruptcies</a:t>
           </a:r>
         </a:p>
       </dsp:txBody>
       <dsp:txXfrm>
-        <a:off x="34783" y="4022962"/>
+        <a:off x="34783" y="4022961"/>
         <a:ext cx="5188234" cy="642964"/>
       </dsp:txXfrm>
     </dsp:sp>
@@ -5428,7 +5428,7 @@
         </a:prstGeom>
         <a:solidFill>
           <a:schemeClr val="accent2">
-            <a:hueOff val="6443614"/>
+            <a:hueOff val="6443612"/>
             <a:satOff val="-18493"/>
             <a:lumOff val="-29609"/>
             <a:alphaOff val="0"/>
@@ -5482,7 +5482,7 @@
           </a:pPr>
           <a:r>
             <a:rPr lang="en-US" sz="2900" kern="1200" dirty="0"/>
-            <a:t>Employment Length.</a:t>
+            <a:t>Employment Length</a:t>
           </a:r>
         </a:p>
       </dsp:txBody>
@@ -10329,7 +10329,7 @@
           <a:p>
             <a:fld id="{09DB4100-8DFC-4BC4-A1F4-D7F8BEC7BC16}" type="datetimeFigureOut">
               <a:rPr lang="en-US" smtClean="0"/>
-              <a:t>8/21/2024</a:t>
+              <a:t>8/21/24</a:t>
             </a:fld>
             <a:endParaRPr lang="en-US"/>
           </a:p>
@@ -10527,7 +10527,7 @@
           <a:p>
             <a:fld id="{09DB4100-8DFC-4BC4-A1F4-D7F8BEC7BC16}" type="datetimeFigureOut">
               <a:rPr lang="en-US" smtClean="0"/>
-              <a:t>8/21/2024</a:t>
+              <a:t>8/21/24</a:t>
             </a:fld>
             <a:endParaRPr lang="en-US"/>
           </a:p>
@@ -10735,7 +10735,7 @@
           <a:p>
             <a:fld id="{09DB4100-8DFC-4BC4-A1F4-D7F8BEC7BC16}" type="datetimeFigureOut">
               <a:rPr lang="en-US" smtClean="0"/>
-              <a:t>8/21/2024</a:t>
+              <a:t>8/21/24</a:t>
             </a:fld>
             <a:endParaRPr lang="en-US"/>
           </a:p>
@@ -10933,7 +10933,7 @@
           <a:p>
             <a:fld id="{09DB4100-8DFC-4BC4-A1F4-D7F8BEC7BC16}" type="datetimeFigureOut">
               <a:rPr lang="en-US" smtClean="0"/>
-              <a:t>8/21/2024</a:t>
+              <a:t>8/21/24</a:t>
             </a:fld>
             <a:endParaRPr lang="en-US"/>
           </a:p>
@@ -11208,7 +11208,7 @@
           <a:p>
             <a:fld id="{09DB4100-8DFC-4BC4-A1F4-D7F8BEC7BC16}" type="datetimeFigureOut">
               <a:rPr lang="en-US" smtClean="0"/>
-              <a:t>8/21/2024</a:t>
+              <a:t>8/21/24</a:t>
             </a:fld>
             <a:endParaRPr lang="en-US"/>
           </a:p>
@@ -11473,7 +11473,7 @@
           <a:p>
             <a:fld id="{09DB4100-8DFC-4BC4-A1F4-D7F8BEC7BC16}" type="datetimeFigureOut">
               <a:rPr lang="en-US" smtClean="0"/>
-              <a:t>8/21/2024</a:t>
+              <a:t>8/21/24</a:t>
             </a:fld>
             <a:endParaRPr lang="en-US"/>
           </a:p>
@@ -11885,7 +11885,7 @@
           <a:p>
             <a:fld id="{09DB4100-8DFC-4BC4-A1F4-D7F8BEC7BC16}" type="datetimeFigureOut">
               <a:rPr lang="en-US" smtClean="0"/>
-              <a:t>8/21/2024</a:t>
+              <a:t>8/21/24</a:t>
             </a:fld>
             <a:endParaRPr lang="en-US"/>
           </a:p>
@@ -12026,7 +12026,7 @@
           <a:p>
             <a:fld id="{09DB4100-8DFC-4BC4-A1F4-D7F8BEC7BC16}" type="datetimeFigureOut">
               <a:rPr lang="en-US" smtClean="0"/>
-              <a:t>8/21/2024</a:t>
+              <a:t>8/21/24</a:t>
             </a:fld>
             <a:endParaRPr lang="en-US"/>
           </a:p>
@@ -12139,7 +12139,7 @@
           <a:p>
             <a:fld id="{09DB4100-8DFC-4BC4-A1F4-D7F8BEC7BC16}" type="datetimeFigureOut">
               <a:rPr lang="en-US" smtClean="0"/>
-              <a:t>8/21/2024</a:t>
+              <a:t>8/21/24</a:t>
             </a:fld>
             <a:endParaRPr lang="en-US"/>
           </a:p>
@@ -12450,7 +12450,7 @@
           <a:p>
             <a:fld id="{09DB4100-8DFC-4BC4-A1F4-D7F8BEC7BC16}" type="datetimeFigureOut">
               <a:rPr lang="en-US" smtClean="0"/>
-              <a:t>8/21/2024</a:t>
+              <a:t>8/21/24</a:t>
             </a:fld>
             <a:endParaRPr lang="en-US"/>
           </a:p>
@@ -12738,7 +12738,7 @@
           <a:p>
             <a:fld id="{09DB4100-8DFC-4BC4-A1F4-D7F8BEC7BC16}" type="datetimeFigureOut">
               <a:rPr lang="en-US" smtClean="0"/>
-              <a:t>8/21/2024</a:t>
+              <a:t>8/21/24</a:t>
             </a:fld>
             <a:endParaRPr lang="en-US"/>
           </a:p>
@@ -12979,7 +12979,7 @@
           <a:p>
             <a:fld id="{09DB4100-8DFC-4BC4-A1F4-D7F8BEC7BC16}" type="datetimeFigureOut">
               <a:rPr lang="en-US" smtClean="0"/>
-              <a:t>8/21/2024</a:t>
+              <a:t>8/21/24</a:t>
             </a:fld>
             <a:endParaRPr lang="en-US"/>
           </a:p>
@@ -13941,66 +13941,6 @@
           </a:p>
         </p:txBody>
       </p:sp>
-      <p:pic>
-        <p:nvPicPr>
-          <p:cNvPr id="6" name="Picture 5">
-            <a:extLst>
-              <a:ext uri="{FF2B5EF4-FFF2-40B4-BE49-F238E27FC236}">
-                <a16:creationId xmlns:a16="http://schemas.microsoft.com/office/drawing/2014/main" id="{2F60ED4B-6184-F3DE-EA69-74DE74BF981F}"/>
-              </a:ext>
-            </a:extLst>
-          </p:cNvPr>
-          <p:cNvPicPr>
-            <a:picLocks noChangeAspect="1"/>
-          </p:cNvPicPr>
-          <p:nvPr/>
-        </p:nvPicPr>
-        <p:blipFill>
-          <a:blip r:embed="rId2"/>
-          <a:stretch>
-            <a:fillRect/>
-          </a:stretch>
-        </p:blipFill>
-        <p:spPr>
-          <a:xfrm>
-            <a:off x="0" y="0"/>
-            <a:ext cx="5847751" cy="4385814"/>
-          </a:xfrm>
-          <a:prstGeom prst="rect">
-            <a:avLst/>
-          </a:prstGeom>
-        </p:spPr>
-      </p:pic>
-      <p:pic>
-        <p:nvPicPr>
-          <p:cNvPr id="7" name="Picture 6">
-            <a:extLst>
-              <a:ext uri="{FF2B5EF4-FFF2-40B4-BE49-F238E27FC236}">
-                <a16:creationId xmlns:a16="http://schemas.microsoft.com/office/drawing/2014/main" id="{5384D390-C2A5-32C5-BB15-26D04721D61B}"/>
-              </a:ext>
-            </a:extLst>
-          </p:cNvPr>
-          <p:cNvPicPr>
-            <a:picLocks noChangeAspect="1"/>
-          </p:cNvPicPr>
-          <p:nvPr/>
-        </p:nvPicPr>
-        <p:blipFill>
-          <a:blip r:embed="rId2"/>
-          <a:stretch>
-            <a:fillRect/>
-          </a:stretch>
-        </p:blipFill>
-        <p:spPr>
-          <a:xfrm>
-            <a:off x="6341201" y="3414"/>
-            <a:ext cx="5847751" cy="4385814"/>
-          </a:xfrm>
-          <a:prstGeom prst="rect">
-            <a:avLst/>
-          </a:prstGeom>
-        </p:spPr>
-      </p:pic>
       <p:sp>
         <p:nvSpPr>
           <p:cNvPr id="72" name="sketchy line">
@@ -14751,36 +14691,6 @@
           </a:p>
         </p:txBody>
       </p:sp>
-      <p:pic>
-        <p:nvPicPr>
-          <p:cNvPr id="7" name="Picture 6">
-            <a:extLst>
-              <a:ext uri="{FF2B5EF4-FFF2-40B4-BE49-F238E27FC236}">
-                <a16:creationId xmlns:a16="http://schemas.microsoft.com/office/drawing/2014/main" id="{65C3447A-F697-0112-F5DE-305C414B23CF}"/>
-              </a:ext>
-            </a:extLst>
-          </p:cNvPr>
-          <p:cNvPicPr>
-            <a:picLocks noChangeAspect="1"/>
-          </p:cNvPicPr>
-          <p:nvPr/>
-        </p:nvPicPr>
-        <p:blipFill>
-          <a:blip r:embed="rId2"/>
-          <a:stretch>
-            <a:fillRect/>
-          </a:stretch>
-        </p:blipFill>
-        <p:spPr>
-          <a:xfrm>
-            <a:off x="6341201" y="3414"/>
-            <a:ext cx="5847751" cy="4385814"/>
-          </a:xfrm>
-          <a:prstGeom prst="rect">
-            <a:avLst/>
-          </a:prstGeom>
-        </p:spPr>
-      </p:pic>
       <p:sp>
         <p:nvSpPr>
           <p:cNvPr id="72" name="sketchy line">
@@ -15286,7 +15196,7 @@
           <p:nvPr/>
         </p:nvPicPr>
         <p:blipFill>
-          <a:blip r:embed="rId3"/>
+          <a:blip r:embed="rId2"/>
           <a:stretch>
             <a:fillRect/>
           </a:stretch>
@@ -17052,7 +16962,7 @@
             <p:ph idx="1"/>
             <p:extLst>
               <p:ext uri="{D42A27DB-BD31-4B8C-83A1-F6EECF244321}">
-                <p14:modId xmlns:p14="http://schemas.microsoft.com/office/powerpoint/2010/main" val="3001746442"/>
+                <p14:modId xmlns:p14="http://schemas.microsoft.com/office/powerpoint/2010/main" val="394974426"/>
               </p:ext>
             </p:extLst>
           </p:nvPr>
@@ -17113,10 +17023,10 @@
       </p:grpSpPr>
       <p:sp useBgFill="1">
         <p:nvSpPr>
-          <p:cNvPr id="73" name="Rectangle 72">
+          <p:cNvPr id="1040" name="Rectangle 1039">
             <a:extLst>
               <a:ext uri="{FF2B5EF4-FFF2-40B4-BE49-F238E27FC236}">
-                <a16:creationId xmlns:a16="http://schemas.microsoft.com/office/drawing/2014/main" id="{A51A0227-072A-4F5F-928C-E2C3E5CCD10C}"/>
+                <a16:creationId xmlns:a16="http://schemas.microsoft.com/office/drawing/2014/main" id="{84DF55BE-B4AB-4BA1-BDE1-E9F7FB3F110A}"/>
               </a:ext>
               <a:ext uri="{C183D7F6-B498-43B3-948B-1728B52AA6E4}">
                 <adec:decorative xmlns:adec="http://schemas.microsoft.com/office/drawing/2017/decorative" val="1"/>
@@ -17136,7 +17046,7 @@
         </p:nvSpPr>
         <p:spPr>
           <a:xfrm>
-            <a:off x="0" y="0"/>
+            <a:off x="-1" y="0"/>
             <a:ext cx="12188952" cy="6858000"/>
           </a:xfrm>
           <a:prstGeom prst="rect">
@@ -17189,8 +17099,8 @@
         </p:nvSpPr>
         <p:spPr>
           <a:xfrm>
-            <a:off x="630936" y="4735793"/>
-            <a:ext cx="4245864" cy="1343157"/>
+            <a:off x="841249" y="539578"/>
+            <a:ext cx="5981278" cy="1684638"/>
           </a:xfrm>
         </p:spPr>
         <p:txBody>
@@ -17200,292 +17110,9 @@
           <a:lstStyle/>
           <a:p>
             <a:r>
-              <a:rPr lang="en-US" sz="5400" dirty="0"/>
+              <a:rPr lang="en-US" sz="4000" dirty="0"/>
               <a:t>Interest Rate</a:t>
             </a:r>
-          </a:p>
-        </p:txBody>
-      </p:sp>
-      <p:pic>
-        <p:nvPicPr>
-          <p:cNvPr id="6" name="Picture 5">
-            <a:extLst>
-              <a:ext uri="{FF2B5EF4-FFF2-40B4-BE49-F238E27FC236}">
-                <a16:creationId xmlns:a16="http://schemas.microsoft.com/office/drawing/2014/main" id="{B08D9007-9963-A7E9-A84A-04EDB55E8BCE}"/>
-              </a:ext>
-            </a:extLst>
-          </p:cNvPr>
-          <p:cNvPicPr>
-            <a:picLocks noChangeAspect="1"/>
-          </p:cNvPicPr>
-          <p:nvPr/>
-        </p:nvPicPr>
-        <p:blipFill>
-          <a:blip r:embed="rId2"/>
-          <a:stretch>
-            <a:fillRect/>
-          </a:stretch>
-        </p:blipFill>
-        <p:spPr>
-          <a:xfrm>
-            <a:off x="0" y="0"/>
-            <a:ext cx="5847751" cy="4385814"/>
-          </a:xfrm>
-          <a:prstGeom prst="rect">
-            <a:avLst/>
-          </a:prstGeom>
-        </p:spPr>
-      </p:pic>
-      <p:pic>
-        <p:nvPicPr>
-          <p:cNvPr id="7" name="Picture 6">
-            <a:extLst>
-              <a:ext uri="{FF2B5EF4-FFF2-40B4-BE49-F238E27FC236}">
-                <a16:creationId xmlns:a16="http://schemas.microsoft.com/office/drawing/2014/main" id="{F47C06DA-73FD-9382-0DF3-21521D8CBC49}"/>
-              </a:ext>
-            </a:extLst>
-          </p:cNvPr>
-          <p:cNvPicPr>
-            <a:picLocks noChangeAspect="1"/>
-          </p:cNvPicPr>
-          <p:nvPr/>
-        </p:nvPicPr>
-        <p:blipFill>
-          <a:blip r:embed="rId2"/>
-          <a:stretch>
-            <a:fillRect/>
-          </a:stretch>
-        </p:blipFill>
-        <p:spPr>
-          <a:xfrm>
-            <a:off x="6341201" y="3414"/>
-            <a:ext cx="5847751" cy="4385814"/>
-          </a:xfrm>
-          <a:prstGeom prst="rect">
-            <a:avLst/>
-          </a:prstGeom>
-        </p:spPr>
-      </p:pic>
-      <p:sp>
-        <p:nvSpPr>
-          <p:cNvPr id="72" name="sketchy line">
-            <a:extLst>
-              <a:ext uri="{FF2B5EF4-FFF2-40B4-BE49-F238E27FC236}">
-                <a16:creationId xmlns:a16="http://schemas.microsoft.com/office/drawing/2014/main" id="{35D99776-4B38-47DF-A302-11AD9AF87ACA}"/>
-              </a:ext>
-              <a:ext uri="{C183D7F6-B498-43B3-948B-1728B52AA6E4}">
-                <adec:decorative xmlns:adec="http://schemas.microsoft.com/office/drawing/2017/decorative" val="1"/>
-              </a:ext>
-            </a:extLst>
-          </p:cNvPr>
-          <p:cNvSpPr>
-            <a:spLocks noGrp="1" noRot="1" noChangeAspect="1" noMove="1" noResize="1" noEditPoints="1" noAdjustHandles="1" noChangeArrowheads="1" noChangeShapeType="1" noTextEdit="1"/>
-          </p:cNvSpPr>
-          <p:nvPr>
-            <p:extLst>
-              <p:ext uri="{386F3935-93C4-4BCD-93E2-E3B085C9AB24}">
-                <p16:designElem xmlns:p16="http://schemas.microsoft.com/office/powerpoint/2015/main" val="1"/>
-              </p:ext>
-            </p:extLst>
-          </p:nvPr>
-        </p:nvSpPr>
-        <p:spPr>
-          <a:xfrm rot="5400000">
-            <a:off x="4337304" y="5292566"/>
-            <a:ext cx="1554480" cy="18288"/>
-          </a:xfrm>
-          <a:custGeom>
-            <a:avLst/>
-            <a:gdLst>
-              <a:gd name="connsiteX0" fmla="*/ 0 w 1554480"/>
-              <a:gd name="connsiteY0" fmla="*/ 0 h 18288"/>
-              <a:gd name="connsiteX1" fmla="*/ 549250 w 1554480"/>
-              <a:gd name="connsiteY1" fmla="*/ 0 h 18288"/>
-              <a:gd name="connsiteX2" fmla="*/ 1082954 w 1554480"/>
-              <a:gd name="connsiteY2" fmla="*/ 0 h 18288"/>
-              <a:gd name="connsiteX3" fmla="*/ 1554480 w 1554480"/>
-              <a:gd name="connsiteY3" fmla="*/ 0 h 18288"/>
-              <a:gd name="connsiteX4" fmla="*/ 1554480 w 1554480"/>
-              <a:gd name="connsiteY4" fmla="*/ 18288 h 18288"/>
-              <a:gd name="connsiteX5" fmla="*/ 1067410 w 1554480"/>
-              <a:gd name="connsiteY5" fmla="*/ 18288 h 18288"/>
-              <a:gd name="connsiteX6" fmla="*/ 549250 w 1554480"/>
-              <a:gd name="connsiteY6" fmla="*/ 18288 h 18288"/>
-              <a:gd name="connsiteX7" fmla="*/ 0 w 1554480"/>
-              <a:gd name="connsiteY7" fmla="*/ 18288 h 18288"/>
-              <a:gd name="connsiteX8" fmla="*/ 0 w 1554480"/>
-              <a:gd name="connsiteY8" fmla="*/ 0 h 18288"/>
-            </a:gdLst>
-            <a:ahLst/>
-            <a:cxnLst>
-              <a:cxn ang="0">
-                <a:pos x="connsiteX0" y="connsiteY0"/>
-              </a:cxn>
-              <a:cxn ang="0">
-                <a:pos x="connsiteX1" y="connsiteY1"/>
-              </a:cxn>
-              <a:cxn ang="0">
-                <a:pos x="connsiteX2" y="connsiteY2"/>
-              </a:cxn>
-              <a:cxn ang="0">
-                <a:pos x="connsiteX3" y="connsiteY3"/>
-              </a:cxn>
-              <a:cxn ang="0">
-                <a:pos x="connsiteX4" y="connsiteY4"/>
-              </a:cxn>
-              <a:cxn ang="0">
-                <a:pos x="connsiteX5" y="connsiteY5"/>
-              </a:cxn>
-              <a:cxn ang="0">
-                <a:pos x="connsiteX6" y="connsiteY6"/>
-              </a:cxn>
-              <a:cxn ang="0">
-                <a:pos x="connsiteX7" y="connsiteY7"/>
-              </a:cxn>
-              <a:cxn ang="0">
-                <a:pos x="connsiteX8" y="connsiteY8"/>
-              </a:cxn>
-            </a:cxnLst>
-            <a:rect l="l" t="t" r="r" b="b"/>
-            <a:pathLst>
-              <a:path w="1554480" h="18288" fill="none" extrusionOk="0">
-                <a:moveTo>
-                  <a:pt x="0" y="0"/>
-                </a:moveTo>
-                <a:cubicBezTo>
-                  <a:pt x="114141" y="-19864"/>
-                  <a:pt x="345055" y="-1657"/>
-                  <a:pt x="549250" y="0"/>
-                </a:cubicBezTo>
-                <a:cubicBezTo>
-                  <a:pt x="753445" y="1657"/>
-                  <a:pt x="862292" y="-5674"/>
-                  <a:pt x="1082954" y="0"/>
-                </a:cubicBezTo>
-                <a:cubicBezTo>
-                  <a:pt x="1303616" y="5674"/>
-                  <a:pt x="1363530" y="4537"/>
-                  <a:pt x="1554480" y="0"/>
-                </a:cubicBezTo>
-                <a:cubicBezTo>
-                  <a:pt x="1554963" y="7176"/>
-                  <a:pt x="1553909" y="13682"/>
-                  <a:pt x="1554480" y="18288"/>
-                </a:cubicBezTo>
-                <a:cubicBezTo>
-                  <a:pt x="1338847" y="6127"/>
-                  <a:pt x="1215066" y="37851"/>
-                  <a:pt x="1067410" y="18288"/>
-                </a:cubicBezTo>
-                <a:cubicBezTo>
-                  <a:pt x="919754" y="-1275"/>
-                  <a:pt x="800465" y="3080"/>
-                  <a:pt x="549250" y="18288"/>
-                </a:cubicBezTo>
-                <a:cubicBezTo>
-                  <a:pt x="298035" y="33496"/>
-                  <a:pt x="158868" y="22769"/>
-                  <a:pt x="0" y="18288"/>
-                </a:cubicBezTo>
-                <a:cubicBezTo>
-                  <a:pt x="-655" y="13237"/>
-                  <a:pt x="709" y="4645"/>
-                  <a:pt x="0" y="0"/>
-                </a:cubicBezTo>
-                <a:close/>
-              </a:path>
-              <a:path w="1554480" h="18288" stroke="0" extrusionOk="0">
-                <a:moveTo>
-                  <a:pt x="0" y="0"/>
-                </a:moveTo>
-                <a:cubicBezTo>
-                  <a:pt x="249941" y="-58"/>
-                  <a:pt x="367334" y="23448"/>
-                  <a:pt x="502615" y="0"/>
-                </a:cubicBezTo>
-                <a:cubicBezTo>
-                  <a:pt x="637897" y="-23448"/>
-                  <a:pt x="813653" y="-20418"/>
-                  <a:pt x="974141" y="0"/>
-                </a:cubicBezTo>
-                <a:cubicBezTo>
-                  <a:pt x="1134629" y="20418"/>
-                  <a:pt x="1268772" y="6288"/>
-                  <a:pt x="1554480" y="0"/>
-                </a:cubicBezTo>
-                <a:cubicBezTo>
-                  <a:pt x="1554917" y="7222"/>
-                  <a:pt x="1555359" y="13299"/>
-                  <a:pt x="1554480" y="18288"/>
-                </a:cubicBezTo>
-                <a:cubicBezTo>
-                  <a:pt x="1336087" y="12172"/>
-                  <a:pt x="1310024" y="19759"/>
-                  <a:pt x="1067410" y="18288"/>
-                </a:cubicBezTo>
-                <a:cubicBezTo>
-                  <a:pt x="824796" y="16818"/>
-                  <a:pt x="787902" y="34647"/>
-                  <a:pt x="518160" y="18288"/>
-                </a:cubicBezTo>
-                <a:cubicBezTo>
-                  <a:pt x="248418" y="1930"/>
-                  <a:pt x="133160" y="9205"/>
-                  <a:pt x="0" y="18288"/>
-                </a:cubicBezTo>
-                <a:cubicBezTo>
-                  <a:pt x="-643" y="9451"/>
-                  <a:pt x="-340" y="7114"/>
-                  <a:pt x="0" y="0"/>
-                </a:cubicBezTo>
-                <a:close/>
-              </a:path>
-            </a:pathLst>
-          </a:custGeom>
-          <a:solidFill>
-            <a:schemeClr val="accent2"/>
-          </a:solidFill>
-          <a:ln w="41275" cap="rnd">
-            <a:solidFill>
-              <a:schemeClr val="accent2"/>
-            </a:solidFill>
-            <a:round/>
-            <a:extLst>
-              <a:ext uri="{C807C97D-BFC1-408E-A445-0C87EB9F89A2}">
-                <ask:lineSketchStyleProps xmlns:ask="http://schemas.microsoft.com/office/drawing/2018/sketchyshapes" sd="1219033472">
-                  <a:prstGeom prst="rect">
-                    <a:avLst/>
-                  </a:prstGeom>
-                  <ask:type>
-                    <ask:lineSketchFreehand/>
-                  </ask:type>
-                </ask:lineSketchStyleProps>
-              </a:ext>
-            </a:extLst>
-          </a:ln>
-        </p:spPr>
-        <p:style>
-          <a:lnRef idx="2">
-            <a:schemeClr val="accent1">
-              <a:shade val="50000"/>
-            </a:schemeClr>
-          </a:lnRef>
-          <a:fillRef idx="1">
-            <a:schemeClr val="accent1"/>
-          </a:fillRef>
-          <a:effectRef idx="0">
-            <a:schemeClr val="accent1"/>
-          </a:effectRef>
-          <a:fontRef idx="minor">
-            <a:schemeClr val="lt1"/>
-          </a:fontRef>
-        </p:style>
-        <p:txBody>
-          <a:bodyPr rtlCol="0" anchor="ctr"/>
-          <a:lstStyle/>
-          <a:p>
-            <a:pPr algn="ctr"/>
-            <a:endParaRPr lang="en-US"/>
           </a:p>
         </p:txBody>
       </p:sp>
@@ -17503,20 +17130,20 @@
         </p:nvSpPr>
         <p:spPr>
           <a:xfrm>
-            <a:off x="5333998" y="4735793"/>
-            <a:ext cx="6623539" cy="1722691"/>
+            <a:off x="838201" y="2409568"/>
+            <a:ext cx="5981278" cy="3690551"/>
           </a:xfrm>
           <a:prstGeom prst="rect">
             <a:avLst/>
           </a:prstGeom>
         </p:spPr>
         <p:txBody>
-          <a:bodyPr vert="horz" lIns="91440" tIns="45720" rIns="91440" bIns="45720" rtlCol="0" anchor="ctr">
-            <a:normAutofit fontScale="92500" lnSpcReduction="10000"/>
+          <a:bodyPr vert="horz" lIns="91440" tIns="45720" rIns="91440" bIns="45720" rtlCol="0">
+            <a:normAutofit/>
           </a:bodyPr>
           <a:lstStyle/>
           <a:p>
-            <a:pPr indent="-228600">
+            <a:pPr marL="285750" indent="-228600">
               <a:lnSpc>
                 <a:spcPct val="90000"/>
               </a:lnSpc>
@@ -17527,12 +17154,41 @@
               <a:buChar char="•"/>
             </a:pPr>
             <a:r>
-              <a:rPr lang="en-US" sz="1500" b="1" dirty="0"/>
-              <a:t>Observations:</a:t>
+              <a:rPr lang="en-US" sz="2000" dirty="0"/>
+              <a:t>Average loan interest rate is </a:t>
+            </a:r>
+            <a:r>
+              <a:rPr lang="en-US" sz="2000" b="1" dirty="0"/>
+              <a:t>11.82%</a:t>
+            </a:r>
+            <a:r>
+              <a:rPr lang="en-US" sz="2000" dirty="0"/>
+              <a:t>. </a:t>
             </a:r>
           </a:p>
           <a:p>
-            <a:pPr marL="285750" indent="-285750">
+            <a:pPr marL="285750" indent="-228600">
+              <a:lnSpc>
+                <a:spcPct val="90000"/>
+              </a:lnSpc>
+              <a:buFont typeface="Arial" panose="020B0604020202020204" pitchFamily="34" charset="0"/>
+              <a:buChar char="•"/>
+            </a:pPr>
+            <a:r>
+              <a:rPr lang="en-US" sz="2000" dirty="0"/>
+              <a:t>Most approved loans have an interest rate between </a:t>
+            </a:r>
+            <a:r>
+              <a:rPr lang="en-US" sz="2000" b="1" dirty="0"/>
+              <a:t>10-12.5%</a:t>
+            </a:r>
+            <a:r>
+              <a:rPr lang="en-US" sz="2000" dirty="0"/>
+              <a:t>.</a:t>
+            </a:r>
+          </a:p>
+          <a:p>
+            <a:pPr marL="285750" indent="-228600">
               <a:lnSpc>
                 <a:spcPct val="90000"/>
               </a:lnSpc>
@@ -17543,22 +17199,12 @@
               <a:buChar char="•"/>
             </a:pPr>
             <a:r>
-              <a:rPr lang="en-US" sz="1400" dirty="0"/>
-              <a:t>Average loan interest rate is 11.82%. </a:t>
+              <a:rPr lang="en-US" sz="2000" dirty="0"/>
+              <a:t>Loans with interest rates less than 9% have relatively less chances of default. </a:t>
             </a:r>
           </a:p>
           <a:p>
-            <a:pPr marL="285750" indent="-285750">
-              <a:buFont typeface="Arial" panose="020B0604020202020204" pitchFamily="34" charset="0"/>
-              <a:buChar char="•"/>
-            </a:pPr>
-            <a:r>
-              <a:rPr lang="en-US" sz="1400" dirty="0"/>
-              <a:t>Most approved loans have an interest rate between 10-12.5%.</a:t>
-            </a:r>
-          </a:p>
-          <a:p>
-            <a:pPr marL="285750" indent="-285750">
+            <a:pPr marL="285750" indent="-228600">
               <a:lnSpc>
                 <a:spcPct val="90000"/>
               </a:lnSpc>
@@ -17569,12 +17215,12 @@
               <a:buChar char="•"/>
             </a:pPr>
             <a:r>
-              <a:rPr lang="en-US" sz="1400" dirty="0"/>
-              <a:t>Interest rate less than 9% has very less chances of default. Interest rates are starting from minimum 5 %. </a:t>
+              <a:rPr lang="en-US" sz="2000" dirty="0"/>
+              <a:t>Interest rates are starting from minimum 5.42 %. </a:t>
             </a:r>
           </a:p>
           <a:p>
-            <a:pPr marL="285750" indent="-285750">
+            <a:pPr marL="285750" indent="-228600">
               <a:lnSpc>
                 <a:spcPct val="90000"/>
               </a:lnSpc>
@@ -17585,12 +17231,12 @@
               <a:buChar char="•"/>
             </a:pPr>
             <a:r>
-              <a:rPr lang="en-US" sz="1400" dirty="0"/>
-              <a:t>Most applicants have defaulted on loans where the interest rate was more than 15%.</a:t>
+              <a:rPr lang="en-US" sz="2000" dirty="0"/>
+              <a:t>Loans with interest rates above 15% have relatively higher chances of default.</a:t>
             </a:r>
           </a:p>
           <a:p>
-            <a:pPr marL="285750" indent="-285750">
+            <a:pPr marL="285750" indent="-228600">
               <a:lnSpc>
                 <a:spcPct val="90000"/>
               </a:lnSpc>
@@ -17601,9 +17247,23 @@
               <a:buChar char="•"/>
             </a:pPr>
             <a:r>
-              <a:rPr lang="en-US" sz="1400" dirty="0"/>
-              <a:t>Loan default proportion increases with higher interest rates.</a:t>
+              <a:rPr lang="en-IN" sz="2000" dirty="0">
+                <a:solidFill>
+                  <a:srgbClr val="0E0E0E"/>
+                </a:solidFill>
+                <a:effectLst/>
+                <a:highlight>
+                  <a:srgbClr val="FFFF00"/>
+                </a:highlight>
+                <a:latin typeface=".SF NS"/>
+              </a:rPr>
+              <a:t>The rate of loan defaults increases as the interest rate rises.</a:t>
             </a:r>
+            <a:endParaRPr lang="en-US" sz="2000" dirty="0">
+              <a:highlight>
+                <a:srgbClr val="FFFF00"/>
+              </a:highlight>
+            </a:endParaRPr>
           </a:p>
           <a:p>
             <a:pPr indent="-228600">
@@ -17616,23 +17276,86 @@
               <a:buFont typeface="Arial" panose="020B0604020202020204" pitchFamily="34" charset="0"/>
               <a:buChar char="•"/>
             </a:pPr>
-            <a:endParaRPr lang="en-US" sz="1500" dirty="0"/>
-          </a:p>
-          <a:p>
-            <a:pPr indent="-228600">
-              <a:lnSpc>
-                <a:spcPct val="90000"/>
-              </a:lnSpc>
-              <a:spcAft>
-                <a:spcPts val="600"/>
-              </a:spcAft>
-              <a:buFont typeface="Arial" panose="020B0604020202020204" pitchFamily="34" charset="0"/>
-              <a:buChar char="•"/>
-            </a:pPr>
-            <a:endParaRPr lang="en-US" sz="1500" dirty="0"/>
+            <a:endParaRPr lang="en-US" sz="2000" dirty="0"/>
           </a:p>
         </p:txBody>
       </p:sp>
+      <p:pic>
+        <p:nvPicPr>
+          <p:cNvPr id="1028" name="Picture 4">
+            <a:extLst>
+              <a:ext uri="{FF2B5EF4-FFF2-40B4-BE49-F238E27FC236}">
+                <a16:creationId xmlns:a16="http://schemas.microsoft.com/office/drawing/2014/main" id="{AD626C1D-B6B4-9805-02D2-28E5FD452620}"/>
+              </a:ext>
+            </a:extLst>
+          </p:cNvPr>
+          <p:cNvPicPr>
+            <a:picLocks noChangeAspect="1" noChangeArrowheads="1"/>
+          </p:cNvPicPr>
+          <p:nvPr/>
+        </p:nvPicPr>
+        <p:blipFill>
+          <a:blip r:embed="rId2">
+            <a:extLst>
+              <a:ext uri="{28A0092B-C50C-407E-A947-70E740481C1C}">
+                <a14:useLocalDpi xmlns:a14="http://schemas.microsoft.com/office/drawing/2010/main" val="0"/>
+              </a:ext>
+            </a:extLst>
+          </a:blip>
+          <a:stretch>
+            <a:fillRect/>
+          </a:stretch>
+        </p:blipFill>
+        <p:spPr bwMode="auto">
+          <a:xfrm>
+            <a:off x="4237583" y="156557"/>
+            <a:ext cx="7837215" cy="2096454"/>
+          </a:xfrm>
+          <a:prstGeom prst="rect">
+            <a:avLst/>
+          </a:prstGeom>
+          <a:noFill/>
+          <a:extLst>
+            <a:ext uri="{909E8E84-426E-40DD-AFC4-6F175D3DCCD1}">
+              <a14:hiddenFill xmlns:a14="http://schemas.microsoft.com/office/drawing/2010/main">
+                <a:solidFill>
+                  <a:srgbClr val="FFFFFF"/>
+                </a:solidFill>
+              </a14:hiddenFill>
+            </a:ext>
+          </a:extLst>
+        </p:spPr>
+      </p:pic>
+      <p:pic>
+        <p:nvPicPr>
+          <p:cNvPr id="6" name="Picture 5">
+            <a:extLst>
+              <a:ext uri="{FF2B5EF4-FFF2-40B4-BE49-F238E27FC236}">
+                <a16:creationId xmlns:a16="http://schemas.microsoft.com/office/drawing/2014/main" id="{B08D9007-9963-A7E9-A84A-04EDB55E8BCE}"/>
+              </a:ext>
+            </a:extLst>
+          </p:cNvPr>
+          <p:cNvPicPr>
+            <a:picLocks noChangeAspect="1"/>
+          </p:cNvPicPr>
+          <p:nvPr/>
+        </p:nvPicPr>
+        <p:blipFill>
+          <a:blip r:embed="rId3"/>
+          <a:stretch>
+            <a:fillRect/>
+          </a:stretch>
+        </p:blipFill>
+        <p:spPr>
+          <a:xfrm>
+            <a:off x="7305239" y="2409568"/>
+            <a:ext cx="4769559" cy="3577170"/>
+          </a:xfrm>
+          <a:prstGeom prst="rect">
+            <a:avLst/>
+          </a:prstGeom>
+        </p:spPr>
+      </p:pic>
     </p:spTree>
     <p:extLst>
       <p:ext uri="{BB962C8B-B14F-4D97-AF65-F5344CB8AC3E}">
@@ -17771,10 +17494,10 @@
       </p:grpSpPr>
       <p:sp useBgFill="1">
         <p:nvSpPr>
-          <p:cNvPr id="73" name="Rectangle 72">
+          <p:cNvPr id="2100" name="Rectangle 2099">
             <a:extLst>
               <a:ext uri="{FF2B5EF4-FFF2-40B4-BE49-F238E27FC236}">
-                <a16:creationId xmlns:a16="http://schemas.microsoft.com/office/drawing/2014/main" id="{49D7D860-AA6C-73E3-8366-0471D2AFD05E}"/>
+                <a16:creationId xmlns:a16="http://schemas.microsoft.com/office/drawing/2014/main" id="{84DF55BE-B4AB-4BA1-BDE1-E9F7FB3F110A}"/>
               </a:ext>
               <a:ext uri="{C183D7F6-B498-43B3-948B-1728B52AA6E4}">
                 <adec:decorative xmlns:adec="http://schemas.microsoft.com/office/drawing/2017/decorative" val="1"/>
@@ -17794,7 +17517,7 @@
         </p:nvSpPr>
         <p:spPr>
           <a:xfrm>
-            <a:off x="0" y="0"/>
+            <a:off x="-1" y="0"/>
             <a:ext cx="12188952" cy="6858000"/>
           </a:xfrm>
           <a:prstGeom prst="rect">
@@ -17824,37 +17547,8 @@
           <a:bodyPr rtlCol="0" anchor="ctr"/>
           <a:lstStyle/>
           <a:p>
-            <a:pPr marL="0" marR="0" lvl="0" indent="0" algn="ctr" defTabSz="914400" rtl="0" eaLnBrk="1" fontAlgn="auto" latinLnBrk="0" hangingPunct="1">
-              <a:lnSpc>
-                <a:spcPct val="100000"/>
-              </a:lnSpc>
-              <a:spcBef>
-                <a:spcPts val="0"/>
-              </a:spcBef>
-              <a:spcAft>
-                <a:spcPts val="0"/>
-              </a:spcAft>
-              <a:buClrTx/>
-              <a:buSzTx/>
-              <a:buFontTx/>
-              <a:buNone/>
-              <a:tabLst/>
-              <a:defRPr/>
-            </a:pPr>
-            <a:endParaRPr kumimoji="0" lang="en-US" sz="1800" b="0" i="0" u="none" strike="noStrike" kern="1200" cap="none" spc="0" normalizeH="0" baseline="0" noProof="0">
-              <a:ln>
-                <a:noFill/>
-              </a:ln>
-              <a:solidFill>
-                <a:prstClr val="white"/>
-              </a:solidFill>
-              <a:effectLst/>
-              <a:uLnTx/>
-              <a:uFillTx/>
-              <a:latin typeface="Aptos" panose="02110004020202020204"/>
-              <a:ea typeface="+mn-ea"/>
-              <a:cs typeface="+mn-cs"/>
-            </a:endParaRPr>
+            <a:pPr algn="ctr"/>
+            <a:endParaRPr lang="en-US"/>
           </a:p>
         </p:txBody>
       </p:sp>
@@ -17876,332 +17570,20 @@
         </p:nvSpPr>
         <p:spPr>
           <a:xfrm>
-            <a:off x="630936" y="4735793"/>
-            <a:ext cx="4245864" cy="1343157"/>
+            <a:off x="841249" y="539578"/>
+            <a:ext cx="5981278" cy="1684638"/>
           </a:xfrm>
         </p:spPr>
         <p:txBody>
           <a:bodyPr vert="horz" lIns="91440" tIns="45720" rIns="91440" bIns="45720" rtlCol="0" anchor="ctr">
-            <a:normAutofit fontScale="90000"/>
+            <a:normAutofit/>
           </a:bodyPr>
           <a:lstStyle/>
           <a:p>
             <a:r>
-              <a:rPr lang="en-US" sz="5400" dirty="0"/>
+              <a:rPr lang="en-US" sz="4000" dirty="0"/>
               <a:t>Annual Income</a:t>
             </a:r>
-          </a:p>
-        </p:txBody>
-      </p:sp>
-      <p:pic>
-        <p:nvPicPr>
-          <p:cNvPr id="6" name="Picture 5">
-            <a:extLst>
-              <a:ext uri="{FF2B5EF4-FFF2-40B4-BE49-F238E27FC236}">
-                <a16:creationId xmlns:a16="http://schemas.microsoft.com/office/drawing/2014/main" id="{94DA6B1A-C7ED-BED2-80CC-31E2E3DB079C}"/>
-              </a:ext>
-            </a:extLst>
-          </p:cNvPr>
-          <p:cNvPicPr>
-            <a:picLocks noChangeAspect="1"/>
-          </p:cNvPicPr>
-          <p:nvPr/>
-        </p:nvPicPr>
-        <p:blipFill>
-          <a:blip r:embed="rId2"/>
-          <a:stretch>
-            <a:fillRect/>
-          </a:stretch>
-        </p:blipFill>
-        <p:spPr>
-          <a:xfrm>
-            <a:off x="0" y="0"/>
-            <a:ext cx="5847751" cy="4385814"/>
-          </a:xfrm>
-          <a:prstGeom prst="rect">
-            <a:avLst/>
-          </a:prstGeom>
-        </p:spPr>
-      </p:pic>
-      <p:pic>
-        <p:nvPicPr>
-          <p:cNvPr id="7" name="Picture 6">
-            <a:extLst>
-              <a:ext uri="{FF2B5EF4-FFF2-40B4-BE49-F238E27FC236}">
-                <a16:creationId xmlns:a16="http://schemas.microsoft.com/office/drawing/2014/main" id="{60DCE7ED-C3FE-18FF-AD2C-497DE0DF0FA2}"/>
-              </a:ext>
-            </a:extLst>
-          </p:cNvPr>
-          <p:cNvPicPr>
-            <a:picLocks noChangeAspect="1"/>
-          </p:cNvPicPr>
-          <p:nvPr/>
-        </p:nvPicPr>
-        <p:blipFill>
-          <a:blip r:embed="rId2"/>
-          <a:stretch>
-            <a:fillRect/>
-          </a:stretch>
-        </p:blipFill>
-        <p:spPr>
-          <a:xfrm>
-            <a:off x="6341201" y="3414"/>
-            <a:ext cx="5847751" cy="4385814"/>
-          </a:xfrm>
-          <a:prstGeom prst="rect">
-            <a:avLst/>
-          </a:prstGeom>
-        </p:spPr>
-      </p:pic>
-      <p:sp>
-        <p:nvSpPr>
-          <p:cNvPr id="72" name="sketchy line">
-            <a:extLst>
-              <a:ext uri="{FF2B5EF4-FFF2-40B4-BE49-F238E27FC236}">
-                <a16:creationId xmlns:a16="http://schemas.microsoft.com/office/drawing/2014/main" id="{D6A65829-D6C6-3BC5-5DE2-9A874F569E88}"/>
-              </a:ext>
-              <a:ext uri="{C183D7F6-B498-43B3-948B-1728B52AA6E4}">
-                <adec:decorative xmlns:adec="http://schemas.microsoft.com/office/drawing/2017/decorative" val="1"/>
-              </a:ext>
-            </a:extLst>
-          </p:cNvPr>
-          <p:cNvSpPr>
-            <a:spLocks noGrp="1" noRot="1" noChangeAspect="1" noMove="1" noResize="1" noEditPoints="1" noAdjustHandles="1" noChangeArrowheads="1" noChangeShapeType="1" noTextEdit="1"/>
-          </p:cNvSpPr>
-          <p:nvPr>
-            <p:extLst>
-              <p:ext uri="{386F3935-93C4-4BCD-93E2-E3B085C9AB24}">
-                <p16:designElem xmlns:p16="http://schemas.microsoft.com/office/powerpoint/2015/main" val="1"/>
-              </p:ext>
-            </p:extLst>
-          </p:nvPr>
-        </p:nvSpPr>
-        <p:spPr>
-          <a:xfrm rot="5400000">
-            <a:off x="4337304" y="5292566"/>
-            <a:ext cx="1554480" cy="18288"/>
-          </a:xfrm>
-          <a:custGeom>
-            <a:avLst/>
-            <a:gdLst>
-              <a:gd name="connsiteX0" fmla="*/ 0 w 1554480"/>
-              <a:gd name="connsiteY0" fmla="*/ 0 h 18288"/>
-              <a:gd name="connsiteX1" fmla="*/ 549250 w 1554480"/>
-              <a:gd name="connsiteY1" fmla="*/ 0 h 18288"/>
-              <a:gd name="connsiteX2" fmla="*/ 1082954 w 1554480"/>
-              <a:gd name="connsiteY2" fmla="*/ 0 h 18288"/>
-              <a:gd name="connsiteX3" fmla="*/ 1554480 w 1554480"/>
-              <a:gd name="connsiteY3" fmla="*/ 0 h 18288"/>
-              <a:gd name="connsiteX4" fmla="*/ 1554480 w 1554480"/>
-              <a:gd name="connsiteY4" fmla="*/ 18288 h 18288"/>
-              <a:gd name="connsiteX5" fmla="*/ 1067410 w 1554480"/>
-              <a:gd name="connsiteY5" fmla="*/ 18288 h 18288"/>
-              <a:gd name="connsiteX6" fmla="*/ 549250 w 1554480"/>
-              <a:gd name="connsiteY6" fmla="*/ 18288 h 18288"/>
-              <a:gd name="connsiteX7" fmla="*/ 0 w 1554480"/>
-              <a:gd name="connsiteY7" fmla="*/ 18288 h 18288"/>
-              <a:gd name="connsiteX8" fmla="*/ 0 w 1554480"/>
-              <a:gd name="connsiteY8" fmla="*/ 0 h 18288"/>
-            </a:gdLst>
-            <a:ahLst/>
-            <a:cxnLst>
-              <a:cxn ang="0">
-                <a:pos x="connsiteX0" y="connsiteY0"/>
-              </a:cxn>
-              <a:cxn ang="0">
-                <a:pos x="connsiteX1" y="connsiteY1"/>
-              </a:cxn>
-              <a:cxn ang="0">
-                <a:pos x="connsiteX2" y="connsiteY2"/>
-              </a:cxn>
-              <a:cxn ang="0">
-                <a:pos x="connsiteX3" y="connsiteY3"/>
-              </a:cxn>
-              <a:cxn ang="0">
-                <a:pos x="connsiteX4" y="connsiteY4"/>
-              </a:cxn>
-              <a:cxn ang="0">
-                <a:pos x="connsiteX5" y="connsiteY5"/>
-              </a:cxn>
-              <a:cxn ang="0">
-                <a:pos x="connsiteX6" y="connsiteY6"/>
-              </a:cxn>
-              <a:cxn ang="0">
-                <a:pos x="connsiteX7" y="connsiteY7"/>
-              </a:cxn>
-              <a:cxn ang="0">
-                <a:pos x="connsiteX8" y="connsiteY8"/>
-              </a:cxn>
-            </a:cxnLst>
-            <a:rect l="l" t="t" r="r" b="b"/>
-            <a:pathLst>
-              <a:path w="1554480" h="18288" fill="none" extrusionOk="0">
-                <a:moveTo>
-                  <a:pt x="0" y="0"/>
-                </a:moveTo>
-                <a:cubicBezTo>
-                  <a:pt x="114141" y="-19864"/>
-                  <a:pt x="345055" y="-1657"/>
-                  <a:pt x="549250" y="0"/>
-                </a:cubicBezTo>
-                <a:cubicBezTo>
-                  <a:pt x="753445" y="1657"/>
-                  <a:pt x="862292" y="-5674"/>
-                  <a:pt x="1082954" y="0"/>
-                </a:cubicBezTo>
-                <a:cubicBezTo>
-                  <a:pt x="1303616" y="5674"/>
-                  <a:pt x="1363530" y="4537"/>
-                  <a:pt x="1554480" y="0"/>
-                </a:cubicBezTo>
-                <a:cubicBezTo>
-                  <a:pt x="1554963" y="7176"/>
-                  <a:pt x="1553909" y="13682"/>
-                  <a:pt x="1554480" y="18288"/>
-                </a:cubicBezTo>
-                <a:cubicBezTo>
-                  <a:pt x="1338847" y="6127"/>
-                  <a:pt x="1215066" y="37851"/>
-                  <a:pt x="1067410" y="18288"/>
-                </a:cubicBezTo>
-                <a:cubicBezTo>
-                  <a:pt x="919754" y="-1275"/>
-                  <a:pt x="800465" y="3080"/>
-                  <a:pt x="549250" y="18288"/>
-                </a:cubicBezTo>
-                <a:cubicBezTo>
-                  <a:pt x="298035" y="33496"/>
-                  <a:pt x="158868" y="22769"/>
-                  <a:pt x="0" y="18288"/>
-                </a:cubicBezTo>
-                <a:cubicBezTo>
-                  <a:pt x="-655" y="13237"/>
-                  <a:pt x="709" y="4645"/>
-                  <a:pt x="0" y="0"/>
-                </a:cubicBezTo>
-                <a:close/>
-              </a:path>
-              <a:path w="1554480" h="18288" stroke="0" extrusionOk="0">
-                <a:moveTo>
-                  <a:pt x="0" y="0"/>
-                </a:moveTo>
-                <a:cubicBezTo>
-                  <a:pt x="249941" y="-58"/>
-                  <a:pt x="367334" y="23448"/>
-                  <a:pt x="502615" y="0"/>
-                </a:cubicBezTo>
-                <a:cubicBezTo>
-                  <a:pt x="637897" y="-23448"/>
-                  <a:pt x="813653" y="-20418"/>
-                  <a:pt x="974141" y="0"/>
-                </a:cubicBezTo>
-                <a:cubicBezTo>
-                  <a:pt x="1134629" y="20418"/>
-                  <a:pt x="1268772" y="6288"/>
-                  <a:pt x="1554480" y="0"/>
-                </a:cubicBezTo>
-                <a:cubicBezTo>
-                  <a:pt x="1554917" y="7222"/>
-                  <a:pt x="1555359" y="13299"/>
-                  <a:pt x="1554480" y="18288"/>
-                </a:cubicBezTo>
-                <a:cubicBezTo>
-                  <a:pt x="1336087" y="12172"/>
-                  <a:pt x="1310024" y="19759"/>
-                  <a:pt x="1067410" y="18288"/>
-                </a:cubicBezTo>
-                <a:cubicBezTo>
-                  <a:pt x="824796" y="16818"/>
-                  <a:pt x="787902" y="34647"/>
-                  <a:pt x="518160" y="18288"/>
-                </a:cubicBezTo>
-                <a:cubicBezTo>
-                  <a:pt x="248418" y="1930"/>
-                  <a:pt x="133160" y="9205"/>
-                  <a:pt x="0" y="18288"/>
-                </a:cubicBezTo>
-                <a:cubicBezTo>
-                  <a:pt x="-643" y="9451"/>
-                  <a:pt x="-340" y="7114"/>
-                  <a:pt x="0" y="0"/>
-                </a:cubicBezTo>
-                <a:close/>
-              </a:path>
-            </a:pathLst>
-          </a:custGeom>
-          <a:solidFill>
-            <a:schemeClr val="accent2"/>
-          </a:solidFill>
-          <a:ln w="41275" cap="rnd">
-            <a:solidFill>
-              <a:schemeClr val="accent2"/>
-            </a:solidFill>
-            <a:round/>
-            <a:extLst>
-              <a:ext uri="{C807C97D-BFC1-408E-A445-0C87EB9F89A2}">
-                <ask:lineSketchStyleProps xmlns:ask="http://schemas.microsoft.com/office/drawing/2018/sketchyshapes" sd="1219033472">
-                  <a:prstGeom prst="rect">
-                    <a:avLst/>
-                  </a:prstGeom>
-                  <ask:type>
-                    <ask:lineSketchFreehand/>
-                  </ask:type>
-                </ask:lineSketchStyleProps>
-              </a:ext>
-            </a:extLst>
-          </a:ln>
-        </p:spPr>
-        <p:style>
-          <a:lnRef idx="2">
-            <a:schemeClr val="accent1">
-              <a:shade val="50000"/>
-            </a:schemeClr>
-          </a:lnRef>
-          <a:fillRef idx="1">
-            <a:schemeClr val="accent1"/>
-          </a:fillRef>
-          <a:effectRef idx="0">
-            <a:schemeClr val="accent1"/>
-          </a:effectRef>
-          <a:fontRef idx="minor">
-            <a:schemeClr val="lt1"/>
-          </a:fontRef>
-        </p:style>
-        <p:txBody>
-          <a:bodyPr rtlCol="0" anchor="ctr"/>
-          <a:lstStyle/>
-          <a:p>
-            <a:pPr marL="0" marR="0" lvl="0" indent="0" algn="ctr" defTabSz="914400" rtl="0" eaLnBrk="1" fontAlgn="auto" latinLnBrk="0" hangingPunct="1">
-              <a:lnSpc>
-                <a:spcPct val="100000"/>
-              </a:lnSpc>
-              <a:spcBef>
-                <a:spcPts val="0"/>
-              </a:spcBef>
-              <a:spcAft>
-                <a:spcPts val="0"/>
-              </a:spcAft>
-              <a:buClrTx/>
-              <a:buSzTx/>
-              <a:buFontTx/>
-              <a:buNone/>
-              <a:tabLst/>
-              <a:defRPr/>
-            </a:pPr>
-            <a:endParaRPr kumimoji="0" lang="en-US" sz="1800" b="0" i="0" u="none" strike="noStrike" kern="1200" cap="none" spc="0" normalizeH="0" baseline="0" noProof="0">
-              <a:ln>
-                <a:noFill/>
-              </a:ln>
-              <a:solidFill>
-                <a:prstClr val="white"/>
-              </a:solidFill>
-              <a:effectLst/>
-              <a:uLnTx/>
-              <a:uFillTx/>
-              <a:latin typeface="Aptos" panose="02110004020202020204"/>
-              <a:ea typeface="+mn-ea"/>
-              <a:cs typeface="+mn-cs"/>
-            </a:endParaRPr>
           </a:p>
         </p:txBody>
       </p:sp>
@@ -18219,20 +17601,20 @@
         </p:nvSpPr>
         <p:spPr>
           <a:xfrm>
-            <a:off x="5333999" y="4735793"/>
-            <a:ext cx="6214871" cy="1722691"/>
+            <a:off x="838201" y="2409568"/>
+            <a:ext cx="5981278" cy="3690551"/>
           </a:xfrm>
           <a:prstGeom prst="rect">
             <a:avLst/>
           </a:prstGeom>
         </p:spPr>
         <p:txBody>
-          <a:bodyPr vert="horz" lIns="91440" tIns="45720" rIns="91440" bIns="45720" rtlCol="0" anchor="ctr">
+          <a:bodyPr vert="horz" lIns="91440" tIns="45720" rIns="91440" bIns="45720" rtlCol="0">
             <a:normAutofit/>
           </a:bodyPr>
           <a:lstStyle/>
           <a:p>
-            <a:pPr marL="0" marR="0" lvl="0" indent="-228600" algn="l" defTabSz="914400" rtl="0" eaLnBrk="1" fontAlgn="auto" latinLnBrk="0" hangingPunct="1">
+            <a:pPr marL="285750" marR="0" lvl="0" indent="-228600" fontAlgn="auto">
               <a:lnSpc>
                 <a:spcPct val="90000"/>
               </a:lnSpc>
@@ -18250,25 +17632,23 @@
               <a:defRPr/>
             </a:pPr>
             <a:r>
-              <a:rPr kumimoji="0" lang="en-US" sz="1500" b="1" i="0" u="none" strike="noStrike" kern="1200" cap="none" spc="0" normalizeH="0" baseline="0" noProof="0" dirty="0">
+              <a:rPr kumimoji="0" lang="en-US" sz="2000" b="0" i="0" u="none" strike="noStrike" cap="none" spc="0" normalizeH="0" baseline="0" noProof="0" dirty="0">
                 <a:ln>
                   <a:noFill/>
                 </a:ln>
-                <a:solidFill>
-                  <a:prstClr val="black"/>
-                </a:solidFill>
                 <a:effectLst/>
                 <a:uLnTx/>
                 <a:uFillTx/>
-                <a:latin typeface="Aptos" panose="02110004020202020204"/>
-                <a:ea typeface="+mn-ea"/>
-                <a:cs typeface="+mn-cs"/>
               </a:rPr>
-              <a:t>Observations:</a:t>
+              <a:t>The median annual income is 55.5k</a:t>
+            </a:r>
+            <a:r>
+              <a:rPr lang="en-US" sz="2000" dirty="0"/>
+              <a:t>.</a:t>
             </a:r>
           </a:p>
           <a:p>
-            <a:pPr marL="285750" marR="0" lvl="0" indent="-285750" algn="l" defTabSz="914400" rtl="0" eaLnBrk="1" fontAlgn="auto" latinLnBrk="0" hangingPunct="1">
+            <a:pPr marL="285750" marR="0" lvl="0" indent="-228600" fontAlgn="auto">
               <a:lnSpc>
                 <a:spcPct val="90000"/>
               </a:lnSpc>
@@ -18286,25 +17666,12 @@
               <a:defRPr/>
             </a:pPr>
             <a:r>
-              <a:rPr kumimoji="0" lang="en-US" sz="1500" b="0" i="0" u="none" strike="noStrike" kern="1200" cap="none" spc="0" normalizeH="0" baseline="0" noProof="0" dirty="0">
-                <a:ln>
-                  <a:noFill/>
-                </a:ln>
-                <a:solidFill>
-                  <a:prstClr val="black"/>
-                </a:solidFill>
-                <a:effectLst/>
-                <a:uLnTx/>
-                <a:uFillTx/>
-                <a:latin typeface="Aptos" panose="02110004020202020204"/>
-                <a:ea typeface="+mn-ea"/>
-                <a:cs typeface="+mn-cs"/>
-              </a:rPr>
-              <a:t>Interest rate less than 9% has very less chances of default. Interest rates are starting from minimum 5 %.</a:t>
+              <a:rPr lang="en-US" sz="2000" dirty="0"/>
+              <a:t>Borrowers with an annual income of 40-60k apply for more loans than any other income bracket. </a:t>
             </a:r>
           </a:p>
           <a:p>
-            <a:pPr marL="0" marR="0" lvl="0" indent="-228600" algn="l" defTabSz="914400" rtl="0" eaLnBrk="1" fontAlgn="auto" latinLnBrk="0" hangingPunct="1">
+            <a:pPr marL="285750" marR="0" lvl="0" indent="-228600" fontAlgn="auto">
               <a:lnSpc>
                 <a:spcPct val="90000"/>
               </a:lnSpc>
@@ -18322,25 +17689,16 @@
               <a:defRPr/>
             </a:pPr>
             <a:r>
-              <a:rPr kumimoji="0" lang="en-US" sz="1500" b="0" i="0" u="none" strike="noStrike" kern="1200" cap="none" spc="0" normalizeH="0" baseline="0" noProof="0" dirty="0">
-                <a:ln>
-                  <a:noFill/>
-                </a:ln>
-                <a:solidFill>
-                  <a:prstClr val="black"/>
-                </a:solidFill>
-                <a:effectLst/>
-                <a:uLnTx/>
-                <a:uFillTx/>
-                <a:latin typeface="Aptos" panose="02110004020202020204"/>
-                <a:ea typeface="+mn-ea"/>
-                <a:cs typeface="+mn-cs"/>
+              <a:rPr lang="en-US" sz="2000" dirty="0">
+                <a:highlight>
+                  <a:srgbClr val="FFFF00"/>
+                </a:highlight>
               </a:rPr>
-              <a:t>  Most applicants have defaulted on loans where the interest rate was more than 15%.</a:t>
+              <a:t>The rate of loan defaults decrease with increase in borrower’s annual salary. </a:t>
             </a:r>
           </a:p>
           <a:p>
-            <a:pPr marL="285750" marR="0" lvl="0" indent="-285750" algn="l" defTabSz="914400" rtl="0" eaLnBrk="1" fontAlgn="auto" latinLnBrk="0" hangingPunct="1">
+            <a:pPr marL="285750" marR="0" lvl="0" indent="-228600" fontAlgn="auto">
               <a:lnSpc>
                 <a:spcPct val="90000"/>
               </a:lnSpc>
@@ -18357,26 +17715,17 @@
               <a:tabLst/>
               <a:defRPr/>
             </a:pPr>
-            <a:r>
-              <a:rPr kumimoji="0" lang="en-US" sz="1500" b="0" i="0" u="none" strike="noStrike" kern="1200" cap="none" spc="0" normalizeH="0" baseline="0" noProof="0" dirty="0">
-                <a:ln>
-                  <a:noFill/>
-                </a:ln>
-                <a:solidFill>
-                  <a:prstClr val="black"/>
-                </a:solidFill>
-                <a:effectLst/>
-                <a:uLnTx/>
-                <a:uFillTx/>
-                <a:latin typeface="Aptos" panose="02110004020202020204"/>
-                <a:ea typeface="+mn-ea"/>
-                <a:cs typeface="+mn-cs"/>
-              </a:rPr>
-              <a:t>Loan default proportion increases with higher interest rates.</a:t>
-            </a:r>
+            <a:endParaRPr kumimoji="0" lang="en-US" sz="2000" b="0" i="0" u="none" strike="noStrike" cap="none" spc="0" normalizeH="0" baseline="0" noProof="0" dirty="0">
+              <a:ln>
+                <a:noFill/>
+              </a:ln>
+              <a:effectLst/>
+              <a:uLnTx/>
+              <a:uFillTx/>
+            </a:endParaRPr>
           </a:p>
           <a:p>
-            <a:pPr marL="0" marR="0" lvl="0" indent="-228600" algn="l" defTabSz="914400" rtl="0" eaLnBrk="1" fontAlgn="auto" latinLnBrk="0" hangingPunct="1">
+            <a:pPr marL="0" marR="0" lvl="0" indent="-228600" fontAlgn="auto">
               <a:lnSpc>
                 <a:spcPct val="90000"/>
               </a:lnSpc>
@@ -18393,56 +17742,109 @@
               <a:tabLst/>
               <a:defRPr/>
             </a:pPr>
-            <a:endParaRPr kumimoji="0" lang="en-US" sz="1500" b="0" i="0" u="none" strike="noStrike" kern="1200" cap="none" spc="0" normalizeH="0" baseline="0" noProof="0" dirty="0">
+            <a:endParaRPr kumimoji="0" lang="en-US" sz="2000" b="0" i="0" u="none" strike="noStrike" cap="none" spc="0" normalizeH="0" baseline="0" noProof="0" dirty="0">
               <a:ln>
                 <a:noFill/>
               </a:ln>
-              <a:solidFill>
-                <a:prstClr val="black"/>
-              </a:solidFill>
               <a:effectLst/>
               <a:uLnTx/>
               <a:uFillTx/>
-              <a:latin typeface="Aptos" panose="02110004020202020204"/>
-              <a:ea typeface="+mn-ea"/>
-              <a:cs typeface="+mn-cs"/>
-            </a:endParaRPr>
-          </a:p>
-          <a:p>
-            <a:pPr marL="0" marR="0" lvl="0" indent="-228600" algn="l" defTabSz="914400" rtl="0" eaLnBrk="1" fontAlgn="auto" latinLnBrk="0" hangingPunct="1">
-              <a:lnSpc>
-                <a:spcPct val="90000"/>
-              </a:lnSpc>
-              <a:spcBef>
-                <a:spcPts val="0"/>
-              </a:spcBef>
-              <a:spcAft>
-                <a:spcPts val="600"/>
-              </a:spcAft>
-              <a:buClrTx/>
-              <a:buSzTx/>
-              <a:buFont typeface="Arial" panose="020B0604020202020204" pitchFamily="34" charset="0"/>
-              <a:buChar char="•"/>
-              <a:tabLst/>
-              <a:defRPr/>
-            </a:pPr>
-            <a:endParaRPr kumimoji="0" lang="en-US" sz="1500" b="0" i="0" u="none" strike="noStrike" kern="1200" cap="none" spc="0" normalizeH="0" baseline="0" noProof="0" dirty="0">
-              <a:ln>
-                <a:noFill/>
-              </a:ln>
-              <a:solidFill>
-                <a:prstClr val="black"/>
-              </a:solidFill>
-              <a:effectLst/>
-              <a:uLnTx/>
-              <a:uFillTx/>
-              <a:latin typeface="Aptos" panose="02110004020202020204"/>
-              <a:ea typeface="+mn-ea"/>
-              <a:cs typeface="+mn-cs"/>
             </a:endParaRPr>
           </a:p>
         </p:txBody>
       </p:sp>
+      <p:pic>
+        <p:nvPicPr>
+          <p:cNvPr id="2052" name="Picture 4">
+            <a:extLst>
+              <a:ext uri="{FF2B5EF4-FFF2-40B4-BE49-F238E27FC236}">
+                <a16:creationId xmlns:a16="http://schemas.microsoft.com/office/drawing/2014/main" id="{7847CB9D-E3C4-CF0C-5E9B-3D7DD083CEC6}"/>
+              </a:ext>
+            </a:extLst>
+          </p:cNvPr>
+          <p:cNvPicPr>
+            <a:picLocks noChangeAspect="1" noChangeArrowheads="1"/>
+          </p:cNvPicPr>
+          <p:nvPr/>
+        </p:nvPicPr>
+        <p:blipFill>
+          <a:blip r:embed="rId2">
+            <a:extLst>
+              <a:ext uri="{28A0092B-C50C-407E-A947-70E740481C1C}">
+                <a14:useLocalDpi xmlns:a14="http://schemas.microsoft.com/office/drawing/2010/main" val="0"/>
+              </a:ext>
+            </a:extLst>
+          </a:blip>
+          <a:stretch>
+            <a:fillRect/>
+          </a:stretch>
+        </p:blipFill>
+        <p:spPr bwMode="auto">
+          <a:xfrm>
+            <a:off x="7037179" y="62848"/>
+            <a:ext cx="4931024" cy="2638097"/>
+          </a:xfrm>
+          <a:prstGeom prst="rect">
+            <a:avLst/>
+          </a:prstGeom>
+          <a:noFill/>
+          <a:extLst>
+            <a:ext uri="{909E8E84-426E-40DD-AFC4-6F175D3DCCD1}">
+              <a14:hiddenFill xmlns:a14="http://schemas.microsoft.com/office/drawing/2010/main">
+                <a:solidFill>
+                  <a:srgbClr val="FFFFFF"/>
+                </a:solidFill>
+              </a14:hiddenFill>
+            </a:ext>
+          </a:extLst>
+        </p:spPr>
+      </p:pic>
+      <p:pic>
+        <p:nvPicPr>
+          <p:cNvPr id="2054" name="Picture 6">
+            <a:extLst>
+              <a:ext uri="{FF2B5EF4-FFF2-40B4-BE49-F238E27FC236}">
+                <a16:creationId xmlns:a16="http://schemas.microsoft.com/office/drawing/2014/main" id="{DCEA2F97-E7A5-A34C-C0B0-3999208CB6E0}"/>
+              </a:ext>
+            </a:extLst>
+          </p:cNvPr>
+          <p:cNvPicPr>
+            <a:picLocks noChangeAspect="1" noChangeArrowheads="1"/>
+          </p:cNvPicPr>
+          <p:nvPr/>
+        </p:nvPicPr>
+        <p:blipFill>
+          <a:blip r:embed="rId3">
+            <a:extLst>
+              <a:ext uri="{28A0092B-C50C-407E-A947-70E740481C1C}">
+                <a14:useLocalDpi xmlns:a14="http://schemas.microsoft.com/office/drawing/2010/main" val="0"/>
+              </a:ext>
+            </a:extLst>
+          </a:blip>
+          <a:stretch>
+            <a:fillRect/>
+          </a:stretch>
+        </p:blipFill>
+        <p:spPr bwMode="auto">
+          <a:xfrm>
+            <a:off x="7077664" y="2845888"/>
+            <a:ext cx="4920734" cy="3690551"/>
+          </a:xfrm>
+          <a:prstGeom prst="rect">
+            <a:avLst/>
+          </a:prstGeom>
+          <a:noFill/>
+          <a:extLst>
+            <a:ext uri="{909E8E84-426E-40DD-AFC4-6F175D3DCCD1}">
+              <a14:hiddenFill xmlns:a14="http://schemas.microsoft.com/office/drawing/2010/main">
+                <a:solidFill>
+                  <a:srgbClr val="FFFFFF"/>
+                </a:solidFill>
+              </a14:hiddenFill>
+            </a:ext>
+          </a:extLst>
+        </p:spPr>
+      </p:pic>
     </p:spTree>
     <p:extLst>
       <p:ext uri="{BB962C8B-B14F-4D97-AF65-F5344CB8AC3E}">
@@ -18581,10 +17983,10 @@
       </p:grpSpPr>
       <p:sp useBgFill="1">
         <p:nvSpPr>
-          <p:cNvPr id="73" name="Rectangle 72">
+          <p:cNvPr id="3093" name="Rectangle 3092">
             <a:extLst>
               <a:ext uri="{FF2B5EF4-FFF2-40B4-BE49-F238E27FC236}">
-                <a16:creationId xmlns:a16="http://schemas.microsoft.com/office/drawing/2014/main" id="{CA13D552-8391-5121-2D0F-2C8F0970DD9B}"/>
+                <a16:creationId xmlns:a16="http://schemas.microsoft.com/office/drawing/2014/main" id="{84DF55BE-B4AB-4BA1-BDE1-E9F7FB3F110A}"/>
               </a:ext>
               <a:ext uri="{C183D7F6-B498-43B3-948B-1728B52AA6E4}">
                 <adec:decorative xmlns:adec="http://schemas.microsoft.com/office/drawing/2017/decorative" val="1"/>
@@ -18604,7 +18006,7 @@
         </p:nvSpPr>
         <p:spPr>
           <a:xfrm>
-            <a:off x="0" y="0"/>
+            <a:off x="-1" y="0"/>
             <a:ext cx="12188952" cy="6858000"/>
           </a:xfrm>
           <a:prstGeom prst="rect">
@@ -18634,37 +18036,8 @@
           <a:bodyPr rtlCol="0" anchor="ctr"/>
           <a:lstStyle/>
           <a:p>
-            <a:pPr marL="0" marR="0" lvl="0" indent="0" algn="ctr" defTabSz="914400" rtl="0" eaLnBrk="1" fontAlgn="auto" latinLnBrk="0" hangingPunct="1">
-              <a:lnSpc>
-                <a:spcPct val="100000"/>
-              </a:lnSpc>
-              <a:spcBef>
-                <a:spcPts val="0"/>
-              </a:spcBef>
-              <a:spcAft>
-                <a:spcPts val="0"/>
-              </a:spcAft>
-              <a:buClrTx/>
-              <a:buSzTx/>
-              <a:buFontTx/>
-              <a:buNone/>
-              <a:tabLst/>
-              <a:defRPr/>
-            </a:pPr>
-            <a:endParaRPr kumimoji="0" lang="en-US" sz="1800" b="0" i="0" u="none" strike="noStrike" kern="1200" cap="none" spc="0" normalizeH="0" baseline="0" noProof="0">
-              <a:ln>
-                <a:noFill/>
-              </a:ln>
-              <a:solidFill>
-                <a:prstClr val="white"/>
-              </a:solidFill>
-              <a:effectLst/>
-              <a:uLnTx/>
-              <a:uFillTx/>
-              <a:latin typeface="Aptos" panose="02110004020202020204"/>
-              <a:ea typeface="+mn-ea"/>
-              <a:cs typeface="+mn-cs"/>
-            </a:endParaRPr>
+            <a:pPr algn="ctr"/>
+            <a:endParaRPr lang="en-US"/>
           </a:p>
         </p:txBody>
       </p:sp>
@@ -18686,8 +18059,8 @@
         </p:nvSpPr>
         <p:spPr>
           <a:xfrm>
-            <a:off x="630936" y="4735793"/>
-            <a:ext cx="4245864" cy="1343157"/>
+            <a:off x="841249" y="539578"/>
+            <a:ext cx="5981278" cy="1684638"/>
           </a:xfrm>
         </p:spPr>
         <p:txBody>
@@ -18697,321 +18070,9 @@
           <a:lstStyle/>
           <a:p>
             <a:r>
-              <a:rPr lang="en-US" sz="5400" dirty="0"/>
+              <a:rPr lang="en-US" sz="4000" dirty="0"/>
               <a:t>Loan Amount</a:t>
             </a:r>
-          </a:p>
-        </p:txBody>
-      </p:sp>
-      <p:pic>
-        <p:nvPicPr>
-          <p:cNvPr id="6" name="Picture 5">
-            <a:extLst>
-              <a:ext uri="{FF2B5EF4-FFF2-40B4-BE49-F238E27FC236}">
-                <a16:creationId xmlns:a16="http://schemas.microsoft.com/office/drawing/2014/main" id="{597159D0-89BF-3E5F-107A-D06995F192D8}"/>
-              </a:ext>
-            </a:extLst>
-          </p:cNvPr>
-          <p:cNvPicPr>
-            <a:picLocks noChangeAspect="1"/>
-          </p:cNvPicPr>
-          <p:nvPr/>
-        </p:nvPicPr>
-        <p:blipFill>
-          <a:blip r:embed="rId2"/>
-          <a:stretch>
-            <a:fillRect/>
-          </a:stretch>
-        </p:blipFill>
-        <p:spPr>
-          <a:xfrm>
-            <a:off x="0" y="0"/>
-            <a:ext cx="5847751" cy="4385814"/>
-          </a:xfrm>
-          <a:prstGeom prst="rect">
-            <a:avLst/>
-          </a:prstGeom>
-        </p:spPr>
-      </p:pic>
-      <p:pic>
-        <p:nvPicPr>
-          <p:cNvPr id="7" name="Picture 6">
-            <a:extLst>
-              <a:ext uri="{FF2B5EF4-FFF2-40B4-BE49-F238E27FC236}">
-                <a16:creationId xmlns:a16="http://schemas.microsoft.com/office/drawing/2014/main" id="{96132829-3AC2-B08F-2614-D76ED90ABA06}"/>
-              </a:ext>
-            </a:extLst>
-          </p:cNvPr>
-          <p:cNvPicPr>
-            <a:picLocks noChangeAspect="1"/>
-          </p:cNvPicPr>
-          <p:nvPr/>
-        </p:nvPicPr>
-        <p:blipFill>
-          <a:blip r:embed="rId2"/>
-          <a:stretch>
-            <a:fillRect/>
-          </a:stretch>
-        </p:blipFill>
-        <p:spPr>
-          <a:xfrm>
-            <a:off x="6341201" y="3414"/>
-            <a:ext cx="5847751" cy="4385814"/>
-          </a:xfrm>
-          <a:prstGeom prst="rect">
-            <a:avLst/>
-          </a:prstGeom>
-        </p:spPr>
-      </p:pic>
-      <p:sp>
-        <p:nvSpPr>
-          <p:cNvPr id="72" name="sketchy line">
-            <a:extLst>
-              <a:ext uri="{FF2B5EF4-FFF2-40B4-BE49-F238E27FC236}">
-                <a16:creationId xmlns:a16="http://schemas.microsoft.com/office/drawing/2014/main" id="{C9F3C730-A547-BE89-CBF9-EFAB0467EB95}"/>
-              </a:ext>
-              <a:ext uri="{C183D7F6-B498-43B3-948B-1728B52AA6E4}">
-                <adec:decorative xmlns:adec="http://schemas.microsoft.com/office/drawing/2017/decorative" val="1"/>
-              </a:ext>
-            </a:extLst>
-          </p:cNvPr>
-          <p:cNvSpPr>
-            <a:spLocks noGrp="1" noRot="1" noChangeAspect="1" noMove="1" noResize="1" noEditPoints="1" noAdjustHandles="1" noChangeArrowheads="1" noChangeShapeType="1" noTextEdit="1"/>
-          </p:cNvSpPr>
-          <p:nvPr>
-            <p:extLst>
-              <p:ext uri="{386F3935-93C4-4BCD-93E2-E3B085C9AB24}">
-                <p16:designElem xmlns:p16="http://schemas.microsoft.com/office/powerpoint/2015/main" val="1"/>
-              </p:ext>
-            </p:extLst>
-          </p:nvPr>
-        </p:nvSpPr>
-        <p:spPr>
-          <a:xfrm rot="5400000">
-            <a:off x="4337304" y="5292566"/>
-            <a:ext cx="1554480" cy="18288"/>
-          </a:xfrm>
-          <a:custGeom>
-            <a:avLst/>
-            <a:gdLst>
-              <a:gd name="connsiteX0" fmla="*/ 0 w 1554480"/>
-              <a:gd name="connsiteY0" fmla="*/ 0 h 18288"/>
-              <a:gd name="connsiteX1" fmla="*/ 549250 w 1554480"/>
-              <a:gd name="connsiteY1" fmla="*/ 0 h 18288"/>
-              <a:gd name="connsiteX2" fmla="*/ 1082954 w 1554480"/>
-              <a:gd name="connsiteY2" fmla="*/ 0 h 18288"/>
-              <a:gd name="connsiteX3" fmla="*/ 1554480 w 1554480"/>
-              <a:gd name="connsiteY3" fmla="*/ 0 h 18288"/>
-              <a:gd name="connsiteX4" fmla="*/ 1554480 w 1554480"/>
-              <a:gd name="connsiteY4" fmla="*/ 18288 h 18288"/>
-              <a:gd name="connsiteX5" fmla="*/ 1067410 w 1554480"/>
-              <a:gd name="connsiteY5" fmla="*/ 18288 h 18288"/>
-              <a:gd name="connsiteX6" fmla="*/ 549250 w 1554480"/>
-              <a:gd name="connsiteY6" fmla="*/ 18288 h 18288"/>
-              <a:gd name="connsiteX7" fmla="*/ 0 w 1554480"/>
-              <a:gd name="connsiteY7" fmla="*/ 18288 h 18288"/>
-              <a:gd name="connsiteX8" fmla="*/ 0 w 1554480"/>
-              <a:gd name="connsiteY8" fmla="*/ 0 h 18288"/>
-            </a:gdLst>
-            <a:ahLst/>
-            <a:cxnLst>
-              <a:cxn ang="0">
-                <a:pos x="connsiteX0" y="connsiteY0"/>
-              </a:cxn>
-              <a:cxn ang="0">
-                <a:pos x="connsiteX1" y="connsiteY1"/>
-              </a:cxn>
-              <a:cxn ang="0">
-                <a:pos x="connsiteX2" y="connsiteY2"/>
-              </a:cxn>
-              <a:cxn ang="0">
-                <a:pos x="connsiteX3" y="connsiteY3"/>
-              </a:cxn>
-              <a:cxn ang="0">
-                <a:pos x="connsiteX4" y="connsiteY4"/>
-              </a:cxn>
-              <a:cxn ang="0">
-                <a:pos x="connsiteX5" y="connsiteY5"/>
-              </a:cxn>
-              <a:cxn ang="0">
-                <a:pos x="connsiteX6" y="connsiteY6"/>
-              </a:cxn>
-              <a:cxn ang="0">
-                <a:pos x="connsiteX7" y="connsiteY7"/>
-              </a:cxn>
-              <a:cxn ang="0">
-                <a:pos x="connsiteX8" y="connsiteY8"/>
-              </a:cxn>
-            </a:cxnLst>
-            <a:rect l="l" t="t" r="r" b="b"/>
-            <a:pathLst>
-              <a:path w="1554480" h="18288" fill="none" extrusionOk="0">
-                <a:moveTo>
-                  <a:pt x="0" y="0"/>
-                </a:moveTo>
-                <a:cubicBezTo>
-                  <a:pt x="114141" y="-19864"/>
-                  <a:pt x="345055" y="-1657"/>
-                  <a:pt x="549250" y="0"/>
-                </a:cubicBezTo>
-                <a:cubicBezTo>
-                  <a:pt x="753445" y="1657"/>
-                  <a:pt x="862292" y="-5674"/>
-                  <a:pt x="1082954" y="0"/>
-                </a:cubicBezTo>
-                <a:cubicBezTo>
-                  <a:pt x="1303616" y="5674"/>
-                  <a:pt x="1363530" y="4537"/>
-                  <a:pt x="1554480" y="0"/>
-                </a:cubicBezTo>
-                <a:cubicBezTo>
-                  <a:pt x="1554963" y="7176"/>
-                  <a:pt x="1553909" y="13682"/>
-                  <a:pt x="1554480" y="18288"/>
-                </a:cubicBezTo>
-                <a:cubicBezTo>
-                  <a:pt x="1338847" y="6127"/>
-                  <a:pt x="1215066" y="37851"/>
-                  <a:pt x="1067410" y="18288"/>
-                </a:cubicBezTo>
-                <a:cubicBezTo>
-                  <a:pt x="919754" y="-1275"/>
-                  <a:pt x="800465" y="3080"/>
-                  <a:pt x="549250" y="18288"/>
-                </a:cubicBezTo>
-                <a:cubicBezTo>
-                  <a:pt x="298035" y="33496"/>
-                  <a:pt x="158868" y="22769"/>
-                  <a:pt x="0" y="18288"/>
-                </a:cubicBezTo>
-                <a:cubicBezTo>
-                  <a:pt x="-655" y="13237"/>
-                  <a:pt x="709" y="4645"/>
-                  <a:pt x="0" y="0"/>
-                </a:cubicBezTo>
-                <a:close/>
-              </a:path>
-              <a:path w="1554480" h="18288" stroke="0" extrusionOk="0">
-                <a:moveTo>
-                  <a:pt x="0" y="0"/>
-                </a:moveTo>
-                <a:cubicBezTo>
-                  <a:pt x="249941" y="-58"/>
-                  <a:pt x="367334" y="23448"/>
-                  <a:pt x="502615" y="0"/>
-                </a:cubicBezTo>
-                <a:cubicBezTo>
-                  <a:pt x="637897" y="-23448"/>
-                  <a:pt x="813653" y="-20418"/>
-                  <a:pt x="974141" y="0"/>
-                </a:cubicBezTo>
-                <a:cubicBezTo>
-                  <a:pt x="1134629" y="20418"/>
-                  <a:pt x="1268772" y="6288"/>
-                  <a:pt x="1554480" y="0"/>
-                </a:cubicBezTo>
-                <a:cubicBezTo>
-                  <a:pt x="1554917" y="7222"/>
-                  <a:pt x="1555359" y="13299"/>
-                  <a:pt x="1554480" y="18288"/>
-                </a:cubicBezTo>
-                <a:cubicBezTo>
-                  <a:pt x="1336087" y="12172"/>
-                  <a:pt x="1310024" y="19759"/>
-                  <a:pt x="1067410" y="18288"/>
-                </a:cubicBezTo>
-                <a:cubicBezTo>
-                  <a:pt x="824796" y="16818"/>
-                  <a:pt x="787902" y="34647"/>
-                  <a:pt x="518160" y="18288"/>
-                </a:cubicBezTo>
-                <a:cubicBezTo>
-                  <a:pt x="248418" y="1930"/>
-                  <a:pt x="133160" y="9205"/>
-                  <a:pt x="0" y="18288"/>
-                </a:cubicBezTo>
-                <a:cubicBezTo>
-                  <a:pt x="-643" y="9451"/>
-                  <a:pt x="-340" y="7114"/>
-                  <a:pt x="0" y="0"/>
-                </a:cubicBezTo>
-                <a:close/>
-              </a:path>
-            </a:pathLst>
-          </a:custGeom>
-          <a:solidFill>
-            <a:schemeClr val="accent2"/>
-          </a:solidFill>
-          <a:ln w="41275" cap="rnd">
-            <a:solidFill>
-              <a:schemeClr val="accent2"/>
-            </a:solidFill>
-            <a:round/>
-            <a:extLst>
-              <a:ext uri="{C807C97D-BFC1-408E-A445-0C87EB9F89A2}">
-                <ask:lineSketchStyleProps xmlns:ask="http://schemas.microsoft.com/office/drawing/2018/sketchyshapes" sd="1219033472">
-                  <a:prstGeom prst="rect">
-                    <a:avLst/>
-                  </a:prstGeom>
-                  <ask:type>
-                    <ask:lineSketchFreehand/>
-                  </ask:type>
-                </ask:lineSketchStyleProps>
-              </a:ext>
-            </a:extLst>
-          </a:ln>
-        </p:spPr>
-        <p:style>
-          <a:lnRef idx="2">
-            <a:schemeClr val="accent1">
-              <a:shade val="50000"/>
-            </a:schemeClr>
-          </a:lnRef>
-          <a:fillRef idx="1">
-            <a:schemeClr val="accent1"/>
-          </a:fillRef>
-          <a:effectRef idx="0">
-            <a:schemeClr val="accent1"/>
-          </a:effectRef>
-          <a:fontRef idx="minor">
-            <a:schemeClr val="lt1"/>
-          </a:fontRef>
-        </p:style>
-        <p:txBody>
-          <a:bodyPr rtlCol="0" anchor="ctr"/>
-          <a:lstStyle/>
-          <a:p>
-            <a:pPr marL="0" marR="0" lvl="0" indent="0" algn="ctr" defTabSz="914400" rtl="0" eaLnBrk="1" fontAlgn="auto" latinLnBrk="0" hangingPunct="1">
-              <a:lnSpc>
-                <a:spcPct val="100000"/>
-              </a:lnSpc>
-              <a:spcBef>
-                <a:spcPts val="0"/>
-              </a:spcBef>
-              <a:spcAft>
-                <a:spcPts val="0"/>
-              </a:spcAft>
-              <a:buClrTx/>
-              <a:buSzTx/>
-              <a:buFontTx/>
-              <a:buNone/>
-              <a:tabLst/>
-              <a:defRPr/>
-            </a:pPr>
-            <a:endParaRPr kumimoji="0" lang="en-US" sz="1800" b="0" i="0" u="none" strike="noStrike" kern="1200" cap="none" spc="0" normalizeH="0" baseline="0" noProof="0">
-              <a:ln>
-                <a:noFill/>
-              </a:ln>
-              <a:solidFill>
-                <a:prstClr val="white"/>
-              </a:solidFill>
-              <a:effectLst/>
-              <a:uLnTx/>
-              <a:uFillTx/>
-              <a:latin typeface="Aptos" panose="02110004020202020204"/>
-              <a:ea typeface="+mn-ea"/>
-              <a:cs typeface="+mn-cs"/>
-            </a:endParaRPr>
           </a:p>
         </p:txBody>
       </p:sp>
@@ -19029,20 +18090,201 @@
         </p:nvSpPr>
         <p:spPr>
           <a:xfrm>
-            <a:off x="5333999" y="4735793"/>
-            <a:ext cx="6214871" cy="1722691"/>
+            <a:off x="838201" y="2409568"/>
+            <a:ext cx="5489022" cy="3690551"/>
           </a:xfrm>
           <a:prstGeom prst="rect">
             <a:avLst/>
           </a:prstGeom>
         </p:spPr>
         <p:txBody>
-          <a:bodyPr vert="horz" lIns="91440" tIns="45720" rIns="91440" bIns="45720" rtlCol="0" anchor="ctr">
+          <a:bodyPr vert="horz" lIns="91440" tIns="45720" rIns="91440" bIns="45720" rtlCol="0">
             <a:normAutofit/>
           </a:bodyPr>
           <a:lstStyle/>
           <a:p>
-            <a:pPr marL="0" marR="0" lvl="0" indent="-228600" algn="l" defTabSz="914400" rtl="0" eaLnBrk="1" fontAlgn="auto" latinLnBrk="0" hangingPunct="1">
+            <a:pPr indent="-228600">
+              <a:lnSpc>
+                <a:spcPct val="90000"/>
+              </a:lnSpc>
+              <a:spcAft>
+                <a:spcPts val="600"/>
+              </a:spcAft>
+              <a:buFont typeface="Arial" panose="020B0604020202020204" pitchFamily="34" charset="0"/>
+              <a:buChar char="•"/>
+              <a:defRPr/>
+            </a:pPr>
+            <a:r>
+              <a:rPr lang="en-IN" sz="2000" dirty="0">
+                <a:solidFill>
+                  <a:srgbClr val="0E0E0E"/>
+                </a:solidFill>
+                <a:effectLst/>
+                <a:latin typeface=".SF NS"/>
+              </a:rPr>
+              <a:t>Most loans fall within the </a:t>
+            </a:r>
+            <a:r>
+              <a:rPr lang="en-IN" sz="2000" b="1" dirty="0">
+                <a:solidFill>
+                  <a:srgbClr val="0E0E0E"/>
+                </a:solidFill>
+                <a:latin typeface=".SF NS"/>
+              </a:rPr>
+              <a:t>5k</a:t>
+            </a:r>
+            <a:r>
+              <a:rPr lang="en-IN" sz="2000" b="1" dirty="0">
+                <a:solidFill>
+                  <a:srgbClr val="0E0E0E"/>
+                </a:solidFill>
+                <a:effectLst/>
+                <a:latin typeface=".SF NS"/>
+              </a:rPr>
+              <a:t> to 10k </a:t>
+            </a:r>
+            <a:r>
+              <a:rPr lang="en-IN" sz="2000" dirty="0">
+                <a:solidFill>
+                  <a:srgbClr val="0E0E0E"/>
+                </a:solidFill>
+                <a:effectLst/>
+                <a:latin typeface=".SF NS"/>
+              </a:rPr>
+              <a:t>range, but these loans do not have the highest default rates, indicating that borrowers may be more capable of repaying smaller loans. </a:t>
+            </a:r>
+          </a:p>
+          <a:p>
+            <a:pPr indent="-228600">
+              <a:lnSpc>
+                <a:spcPct val="90000"/>
+              </a:lnSpc>
+              <a:spcAft>
+                <a:spcPts val="600"/>
+              </a:spcAft>
+              <a:buFont typeface="Arial" panose="020B0604020202020204" pitchFamily="34" charset="0"/>
+              <a:buChar char="•"/>
+              <a:defRPr/>
+            </a:pPr>
+            <a:endParaRPr lang="en-IN" sz="2000" dirty="0">
+              <a:solidFill>
+                <a:srgbClr val="0E0E0E"/>
+              </a:solidFill>
+              <a:effectLst/>
+              <a:latin typeface=".SF NS"/>
+            </a:endParaRPr>
+          </a:p>
+          <a:p>
+            <a:pPr indent="-228600">
+              <a:lnSpc>
+                <a:spcPct val="90000"/>
+              </a:lnSpc>
+              <a:spcAft>
+                <a:spcPts val="600"/>
+              </a:spcAft>
+              <a:buFont typeface="Arial" panose="020B0604020202020204" pitchFamily="34" charset="0"/>
+              <a:buChar char="•"/>
+              <a:defRPr/>
+            </a:pPr>
+            <a:r>
+              <a:rPr lang="en-IN" sz="2000" dirty="0">
+                <a:solidFill>
+                  <a:srgbClr val="0E0E0E"/>
+                </a:solidFill>
+                <a:effectLst/>
+                <a:latin typeface=".SF NS"/>
+              </a:rPr>
+              <a:t>The highest rate of default is observed in the </a:t>
+            </a:r>
+            <a:r>
+              <a:rPr lang="en-IN" sz="2000" b="1" dirty="0">
+                <a:solidFill>
+                  <a:srgbClr val="0E0E0E"/>
+                </a:solidFill>
+                <a:effectLst/>
+                <a:latin typeface=".SF NS"/>
+              </a:rPr>
+              <a:t>$25,000 and above</a:t>
+            </a:r>
+            <a:r>
+              <a:rPr lang="en-IN" sz="2000" dirty="0">
+                <a:solidFill>
+                  <a:srgbClr val="0E0E0E"/>
+                </a:solidFill>
+                <a:effectLst/>
+                <a:latin typeface=".SF NS"/>
+              </a:rPr>
+              <a:t> category, with a default rate of </a:t>
+            </a:r>
+            <a:r>
+              <a:rPr lang="en-IN" sz="2000" b="1" dirty="0">
+                <a:solidFill>
+                  <a:srgbClr val="0E0E0E"/>
+                </a:solidFill>
+                <a:effectLst/>
+                <a:latin typeface=".SF NS"/>
+              </a:rPr>
+              <a:t>20.05%. </a:t>
+            </a:r>
+          </a:p>
+          <a:p>
+            <a:pPr indent="-228600">
+              <a:lnSpc>
+                <a:spcPct val="90000"/>
+              </a:lnSpc>
+              <a:spcAft>
+                <a:spcPts val="600"/>
+              </a:spcAft>
+              <a:buFont typeface="Arial" panose="020B0604020202020204" pitchFamily="34" charset="0"/>
+              <a:buChar char="•"/>
+              <a:defRPr/>
+            </a:pPr>
+            <a:endParaRPr lang="en-IN" sz="2000" b="1" dirty="0">
+              <a:solidFill>
+                <a:srgbClr val="0E0E0E"/>
+              </a:solidFill>
+              <a:effectLst/>
+              <a:latin typeface=".SF NS"/>
+            </a:endParaRPr>
+          </a:p>
+          <a:p>
+            <a:pPr indent="-228600">
+              <a:lnSpc>
+                <a:spcPct val="90000"/>
+              </a:lnSpc>
+              <a:spcAft>
+                <a:spcPts val="600"/>
+              </a:spcAft>
+              <a:buFont typeface="Arial" panose="020B0604020202020204" pitchFamily="34" charset="0"/>
+              <a:buChar char="•"/>
+              <a:defRPr/>
+            </a:pPr>
+            <a:r>
+              <a:rPr lang="en-IN" sz="2000" dirty="0">
+                <a:solidFill>
+                  <a:srgbClr val="0E0E0E"/>
+                </a:solidFill>
+                <a:effectLst/>
+                <a:highlight>
+                  <a:srgbClr val="FFFF00"/>
+                </a:highlight>
+                <a:latin typeface=".SF NS"/>
+              </a:rPr>
+              <a:t>The default rate generally increases with the loan amount.</a:t>
+            </a:r>
+            <a:r>
+              <a:rPr lang="en-IN" sz="2000" dirty="0">
+                <a:solidFill>
+                  <a:srgbClr val="0E0E0E"/>
+                </a:solidFill>
+                <a:effectLst/>
+                <a:latin typeface=".SF NS"/>
+              </a:rPr>
+              <a:t> </a:t>
+            </a:r>
+          </a:p>
+          <a:p>
+            <a:pPr marL="0" marR="0" lvl="0" indent="-228600" fontAlgn="auto">
               <a:lnSpc>
                 <a:spcPct val="90000"/>
               </a:lnSpc>
@@ -19059,200 +18301,109 @@
               <a:tabLst/>
               <a:defRPr/>
             </a:pPr>
-            <a:r>
-              <a:rPr kumimoji="0" lang="en-US" sz="1500" b="1" i="0" u="none" strike="noStrike" kern="1200" cap="none" spc="0" normalizeH="0" baseline="0" noProof="0" dirty="0">
-                <a:ln>
-                  <a:noFill/>
-                </a:ln>
-                <a:solidFill>
-                  <a:prstClr val="black"/>
-                </a:solidFill>
-                <a:effectLst/>
-                <a:uLnTx/>
-                <a:uFillTx/>
-                <a:latin typeface="Aptos" panose="02110004020202020204"/>
-                <a:ea typeface="+mn-ea"/>
-                <a:cs typeface="+mn-cs"/>
-              </a:rPr>
-              <a:t>Observations:</a:t>
-            </a:r>
-          </a:p>
-          <a:p>
-            <a:pPr marL="285750" marR="0" lvl="0" indent="-285750" algn="l" defTabSz="914400" rtl="0" eaLnBrk="1" fontAlgn="auto" latinLnBrk="0" hangingPunct="1">
-              <a:lnSpc>
-                <a:spcPct val="90000"/>
-              </a:lnSpc>
-              <a:spcBef>
-                <a:spcPts val="0"/>
-              </a:spcBef>
-              <a:spcAft>
-                <a:spcPts val="600"/>
-              </a:spcAft>
-              <a:buClrTx/>
-              <a:buSzTx/>
-              <a:buFont typeface="Arial" panose="020B0604020202020204" pitchFamily="34" charset="0"/>
-              <a:buChar char="•"/>
-              <a:tabLst/>
-              <a:defRPr/>
-            </a:pPr>
-            <a:r>
-              <a:rPr kumimoji="0" lang="en-US" sz="1500" b="0" i="0" u="none" strike="noStrike" kern="1200" cap="none" spc="0" normalizeH="0" baseline="0" noProof="0" dirty="0">
-                <a:ln>
-                  <a:noFill/>
-                </a:ln>
-                <a:solidFill>
-                  <a:prstClr val="black"/>
-                </a:solidFill>
-                <a:effectLst/>
-                <a:uLnTx/>
-                <a:uFillTx/>
-                <a:latin typeface="Aptos" panose="02110004020202020204"/>
-                <a:ea typeface="+mn-ea"/>
-                <a:cs typeface="+mn-cs"/>
-              </a:rPr>
-              <a:t>Interest rate less than 9% has very less chances of default. Interest rates are starting from minimum 5 %.</a:t>
-            </a:r>
-          </a:p>
-          <a:p>
-            <a:pPr marL="0" marR="0" lvl="0" indent="-228600" algn="l" defTabSz="914400" rtl="0" eaLnBrk="1" fontAlgn="auto" latinLnBrk="0" hangingPunct="1">
-              <a:lnSpc>
-                <a:spcPct val="90000"/>
-              </a:lnSpc>
-              <a:spcBef>
-                <a:spcPts val="0"/>
-              </a:spcBef>
-              <a:spcAft>
-                <a:spcPts val="600"/>
-              </a:spcAft>
-              <a:buClrTx/>
-              <a:buSzTx/>
-              <a:buFont typeface="Arial" panose="020B0604020202020204" pitchFamily="34" charset="0"/>
-              <a:buChar char="•"/>
-              <a:tabLst/>
-              <a:defRPr/>
-            </a:pPr>
-            <a:r>
-              <a:rPr kumimoji="0" lang="en-US" sz="1500" b="0" i="0" u="none" strike="noStrike" kern="1200" cap="none" spc="0" normalizeH="0" baseline="0" noProof="0" dirty="0">
-                <a:ln>
-                  <a:noFill/>
-                </a:ln>
-                <a:solidFill>
-                  <a:prstClr val="black"/>
-                </a:solidFill>
-                <a:effectLst/>
-                <a:uLnTx/>
-                <a:uFillTx/>
-                <a:latin typeface="Aptos" panose="02110004020202020204"/>
-                <a:ea typeface="+mn-ea"/>
-                <a:cs typeface="+mn-cs"/>
-              </a:rPr>
-              <a:t>  Most applicants have defaulted on loans where the interest rate was more than 15%.</a:t>
-            </a:r>
-          </a:p>
-          <a:p>
-            <a:pPr marL="285750" marR="0" lvl="0" indent="-285750" algn="l" defTabSz="914400" rtl="0" eaLnBrk="1" fontAlgn="auto" latinLnBrk="0" hangingPunct="1">
-              <a:lnSpc>
-                <a:spcPct val="90000"/>
-              </a:lnSpc>
-              <a:spcBef>
-                <a:spcPts val="0"/>
-              </a:spcBef>
-              <a:spcAft>
-                <a:spcPts val="600"/>
-              </a:spcAft>
-              <a:buClrTx/>
-              <a:buSzTx/>
-              <a:buFont typeface="Arial" panose="020B0604020202020204" pitchFamily="34" charset="0"/>
-              <a:buChar char="•"/>
-              <a:tabLst/>
-              <a:defRPr/>
-            </a:pPr>
-            <a:r>
-              <a:rPr kumimoji="0" lang="en-US" sz="1500" b="0" i="0" u="none" strike="noStrike" kern="1200" cap="none" spc="0" normalizeH="0" baseline="0" noProof="0" dirty="0">
-                <a:ln>
-                  <a:noFill/>
-                </a:ln>
-                <a:solidFill>
-                  <a:prstClr val="black"/>
-                </a:solidFill>
-                <a:effectLst/>
-                <a:uLnTx/>
-                <a:uFillTx/>
-                <a:latin typeface="Aptos" panose="02110004020202020204"/>
-                <a:ea typeface="+mn-ea"/>
-                <a:cs typeface="+mn-cs"/>
-              </a:rPr>
-              <a:t>Loan default proportion increases with higher interest rates.</a:t>
-            </a:r>
-          </a:p>
-          <a:p>
-            <a:pPr marL="0" marR="0" lvl="0" indent="-228600" algn="l" defTabSz="914400" rtl="0" eaLnBrk="1" fontAlgn="auto" latinLnBrk="0" hangingPunct="1">
-              <a:lnSpc>
-                <a:spcPct val="90000"/>
-              </a:lnSpc>
-              <a:spcBef>
-                <a:spcPts val="0"/>
-              </a:spcBef>
-              <a:spcAft>
-                <a:spcPts val="600"/>
-              </a:spcAft>
-              <a:buClrTx/>
-              <a:buSzTx/>
-              <a:buFont typeface="Arial" panose="020B0604020202020204" pitchFamily="34" charset="0"/>
-              <a:buChar char="•"/>
-              <a:tabLst/>
-              <a:defRPr/>
-            </a:pPr>
-            <a:endParaRPr kumimoji="0" lang="en-US" sz="1500" b="0" i="0" u="none" strike="noStrike" kern="1200" cap="none" spc="0" normalizeH="0" baseline="0" noProof="0" dirty="0">
+            <a:endParaRPr kumimoji="0" lang="en-US" sz="2000" b="0" i="0" u="none" strike="noStrike" cap="none" spc="0" normalizeH="0" baseline="0" noProof="0" dirty="0">
               <a:ln>
                 <a:noFill/>
               </a:ln>
-              <a:solidFill>
-                <a:prstClr val="black"/>
-              </a:solidFill>
               <a:effectLst/>
               <a:uLnTx/>
               <a:uFillTx/>
-              <a:latin typeface="Aptos" panose="02110004020202020204"/>
-              <a:ea typeface="+mn-ea"/>
-              <a:cs typeface="+mn-cs"/>
-            </a:endParaRPr>
-          </a:p>
-          <a:p>
-            <a:pPr marL="0" marR="0" lvl="0" indent="-228600" algn="l" defTabSz="914400" rtl="0" eaLnBrk="1" fontAlgn="auto" latinLnBrk="0" hangingPunct="1">
-              <a:lnSpc>
-                <a:spcPct val="90000"/>
-              </a:lnSpc>
-              <a:spcBef>
-                <a:spcPts val="0"/>
-              </a:spcBef>
-              <a:spcAft>
-                <a:spcPts val="600"/>
-              </a:spcAft>
-              <a:buClrTx/>
-              <a:buSzTx/>
-              <a:buFont typeface="Arial" panose="020B0604020202020204" pitchFamily="34" charset="0"/>
-              <a:buChar char="•"/>
-              <a:tabLst/>
-              <a:defRPr/>
-            </a:pPr>
-            <a:endParaRPr kumimoji="0" lang="en-US" sz="1500" b="0" i="0" u="none" strike="noStrike" kern="1200" cap="none" spc="0" normalizeH="0" baseline="0" noProof="0" dirty="0">
-              <a:ln>
-                <a:noFill/>
-              </a:ln>
-              <a:solidFill>
-                <a:prstClr val="black"/>
-              </a:solidFill>
-              <a:effectLst/>
-              <a:uLnTx/>
-              <a:uFillTx/>
-              <a:latin typeface="Aptos" panose="02110004020202020204"/>
-              <a:ea typeface="+mn-ea"/>
-              <a:cs typeface="+mn-cs"/>
             </a:endParaRPr>
           </a:p>
         </p:txBody>
       </p:sp>
+      <p:pic>
+        <p:nvPicPr>
+          <p:cNvPr id="3074" name="Picture 2">
+            <a:extLst>
+              <a:ext uri="{FF2B5EF4-FFF2-40B4-BE49-F238E27FC236}">
+                <a16:creationId xmlns:a16="http://schemas.microsoft.com/office/drawing/2014/main" id="{43DF5939-EBFB-563F-0640-678DD5306A5D}"/>
+              </a:ext>
+            </a:extLst>
+          </p:cNvPr>
+          <p:cNvPicPr>
+            <a:picLocks noChangeAspect="1" noChangeArrowheads="1"/>
+          </p:cNvPicPr>
+          <p:nvPr/>
+        </p:nvPicPr>
+        <p:blipFill>
+          <a:blip r:embed="rId2">
+            <a:extLst>
+              <a:ext uri="{28A0092B-C50C-407E-A947-70E740481C1C}">
+                <a14:useLocalDpi xmlns:a14="http://schemas.microsoft.com/office/drawing/2010/main" val="0"/>
+              </a:ext>
+            </a:extLst>
+          </a:blip>
+          <a:stretch>
+            <a:fillRect/>
+          </a:stretch>
+        </p:blipFill>
+        <p:spPr bwMode="auto">
+          <a:xfrm>
+            <a:off x="6451049" y="9320"/>
+            <a:ext cx="5614076" cy="3003530"/>
+          </a:xfrm>
+          <a:prstGeom prst="rect">
+            <a:avLst/>
+          </a:prstGeom>
+          <a:noFill/>
+          <a:extLst>
+            <a:ext uri="{909E8E84-426E-40DD-AFC4-6F175D3DCCD1}">
+              <a14:hiddenFill xmlns:a14="http://schemas.microsoft.com/office/drawing/2010/main">
+                <a:solidFill>
+                  <a:srgbClr val="FFFFFF"/>
+                </a:solidFill>
+              </a14:hiddenFill>
+            </a:ext>
+          </a:extLst>
+        </p:spPr>
+      </p:pic>
+      <p:pic>
+        <p:nvPicPr>
+          <p:cNvPr id="3078" name="Picture 6">
+            <a:extLst>
+              <a:ext uri="{FF2B5EF4-FFF2-40B4-BE49-F238E27FC236}">
+                <a16:creationId xmlns:a16="http://schemas.microsoft.com/office/drawing/2014/main" id="{92031391-BE4D-7211-9B5C-2BCFDA37FC19}"/>
+              </a:ext>
+            </a:extLst>
+          </p:cNvPr>
+          <p:cNvPicPr>
+            <a:picLocks noChangeAspect="1" noChangeArrowheads="1"/>
+          </p:cNvPicPr>
+          <p:nvPr/>
+        </p:nvPicPr>
+        <p:blipFill>
+          <a:blip r:embed="rId3">
+            <a:extLst>
+              <a:ext uri="{28A0092B-C50C-407E-A947-70E740481C1C}">
+                <a14:useLocalDpi xmlns:a14="http://schemas.microsoft.com/office/drawing/2010/main" val="0"/>
+              </a:ext>
+            </a:extLst>
+          </a:blip>
+          <a:stretch>
+            <a:fillRect/>
+          </a:stretch>
+        </p:blipFill>
+        <p:spPr bwMode="auto">
+          <a:xfrm>
+            <a:off x="6942342" y="3022169"/>
+            <a:ext cx="5123746" cy="3817192"/>
+          </a:xfrm>
+          <a:prstGeom prst="rect">
+            <a:avLst/>
+          </a:prstGeom>
+          <a:noFill/>
+          <a:extLst>
+            <a:ext uri="{909E8E84-426E-40DD-AFC4-6F175D3DCCD1}">
+              <a14:hiddenFill xmlns:a14="http://schemas.microsoft.com/office/drawing/2010/main">
+                <a:solidFill>
+                  <a:srgbClr val="FFFFFF"/>
+                </a:solidFill>
+              </a14:hiddenFill>
+            </a:ext>
+          </a:extLst>
+        </p:spPr>
+      </p:pic>
     </p:spTree>
     <p:extLst>
       <p:ext uri="{BB962C8B-B14F-4D97-AF65-F5344CB8AC3E}">
@@ -19391,10 +18542,10 @@
       </p:grpSpPr>
       <p:sp useBgFill="1">
         <p:nvSpPr>
-          <p:cNvPr id="73" name="Rectangle 72">
+          <p:cNvPr id="4112" name="Rectangle 4111">
             <a:extLst>
               <a:ext uri="{FF2B5EF4-FFF2-40B4-BE49-F238E27FC236}">
-                <a16:creationId xmlns:a16="http://schemas.microsoft.com/office/drawing/2014/main" id="{9E2B8DC4-82CC-8ADE-BB0B-B6BFBAA38052}"/>
+                <a16:creationId xmlns:a16="http://schemas.microsoft.com/office/drawing/2014/main" id="{84DF55BE-B4AB-4BA1-BDE1-E9F7FB3F110A}"/>
               </a:ext>
               <a:ext uri="{C183D7F6-B498-43B3-948B-1728B52AA6E4}">
                 <adec:decorative xmlns:adec="http://schemas.microsoft.com/office/drawing/2017/decorative" val="1"/>
@@ -19414,7 +18565,7 @@
         </p:nvSpPr>
         <p:spPr>
           <a:xfrm>
-            <a:off x="0" y="0"/>
+            <a:off x="-1" y="0"/>
             <a:ext cx="12188952" cy="6858000"/>
           </a:xfrm>
           <a:prstGeom prst="rect">
@@ -19444,37 +18595,8 @@
           <a:bodyPr rtlCol="0" anchor="ctr"/>
           <a:lstStyle/>
           <a:p>
-            <a:pPr marL="0" marR="0" lvl="0" indent="0" algn="ctr" defTabSz="914400" rtl="0" eaLnBrk="1" fontAlgn="auto" latinLnBrk="0" hangingPunct="1">
-              <a:lnSpc>
-                <a:spcPct val="100000"/>
-              </a:lnSpc>
-              <a:spcBef>
-                <a:spcPts val="0"/>
-              </a:spcBef>
-              <a:spcAft>
-                <a:spcPts val="0"/>
-              </a:spcAft>
-              <a:buClrTx/>
-              <a:buSzTx/>
-              <a:buFontTx/>
-              <a:buNone/>
-              <a:tabLst/>
-              <a:defRPr/>
-            </a:pPr>
-            <a:endParaRPr kumimoji="0" lang="en-US" sz="1800" b="0" i="0" u="none" strike="noStrike" kern="1200" cap="none" spc="0" normalizeH="0" baseline="0" noProof="0">
-              <a:ln>
-                <a:noFill/>
-              </a:ln>
-              <a:solidFill>
-                <a:prstClr val="white"/>
-              </a:solidFill>
-              <a:effectLst/>
-              <a:uLnTx/>
-              <a:uFillTx/>
-              <a:latin typeface="Aptos" panose="02110004020202020204"/>
-              <a:ea typeface="+mn-ea"/>
-              <a:cs typeface="+mn-cs"/>
-            </a:endParaRPr>
+            <a:pPr algn="ctr"/>
+            <a:endParaRPr lang="en-US"/>
           </a:p>
         </p:txBody>
       </p:sp>
@@ -19496,8 +18618,8 @@
         </p:nvSpPr>
         <p:spPr>
           <a:xfrm>
-            <a:off x="630936" y="4735793"/>
-            <a:ext cx="4245864" cy="1343157"/>
+            <a:off x="841249" y="539578"/>
+            <a:ext cx="5981278" cy="1684638"/>
           </a:xfrm>
         </p:spPr>
         <p:txBody>
@@ -19507,321 +18629,9 @@
           <a:lstStyle/>
           <a:p>
             <a:r>
-              <a:rPr lang="en-US" sz="5400" dirty="0"/>
-              <a:t>Grade</a:t>
+              <a:rPr lang="en-US" sz="4000" dirty="0"/>
+              <a:t>Loan Grade</a:t>
             </a:r>
-          </a:p>
-        </p:txBody>
-      </p:sp>
-      <p:pic>
-        <p:nvPicPr>
-          <p:cNvPr id="6" name="Picture 5">
-            <a:extLst>
-              <a:ext uri="{FF2B5EF4-FFF2-40B4-BE49-F238E27FC236}">
-                <a16:creationId xmlns:a16="http://schemas.microsoft.com/office/drawing/2014/main" id="{04A1AA97-4778-5DEC-2F72-18A2FEC77887}"/>
-              </a:ext>
-            </a:extLst>
-          </p:cNvPr>
-          <p:cNvPicPr>
-            <a:picLocks noChangeAspect="1"/>
-          </p:cNvPicPr>
-          <p:nvPr/>
-        </p:nvPicPr>
-        <p:blipFill>
-          <a:blip r:embed="rId2"/>
-          <a:stretch>
-            <a:fillRect/>
-          </a:stretch>
-        </p:blipFill>
-        <p:spPr>
-          <a:xfrm>
-            <a:off x="0" y="0"/>
-            <a:ext cx="5847751" cy="4385814"/>
-          </a:xfrm>
-          <a:prstGeom prst="rect">
-            <a:avLst/>
-          </a:prstGeom>
-        </p:spPr>
-      </p:pic>
-      <p:pic>
-        <p:nvPicPr>
-          <p:cNvPr id="7" name="Picture 6">
-            <a:extLst>
-              <a:ext uri="{FF2B5EF4-FFF2-40B4-BE49-F238E27FC236}">
-                <a16:creationId xmlns:a16="http://schemas.microsoft.com/office/drawing/2014/main" id="{C54C546E-48EF-01CD-FB62-2B7D28925A4F}"/>
-              </a:ext>
-            </a:extLst>
-          </p:cNvPr>
-          <p:cNvPicPr>
-            <a:picLocks noChangeAspect="1"/>
-          </p:cNvPicPr>
-          <p:nvPr/>
-        </p:nvPicPr>
-        <p:blipFill>
-          <a:blip r:embed="rId2"/>
-          <a:stretch>
-            <a:fillRect/>
-          </a:stretch>
-        </p:blipFill>
-        <p:spPr>
-          <a:xfrm>
-            <a:off x="6341201" y="3414"/>
-            <a:ext cx="5847751" cy="4385814"/>
-          </a:xfrm>
-          <a:prstGeom prst="rect">
-            <a:avLst/>
-          </a:prstGeom>
-        </p:spPr>
-      </p:pic>
-      <p:sp>
-        <p:nvSpPr>
-          <p:cNvPr id="72" name="sketchy line">
-            <a:extLst>
-              <a:ext uri="{FF2B5EF4-FFF2-40B4-BE49-F238E27FC236}">
-                <a16:creationId xmlns:a16="http://schemas.microsoft.com/office/drawing/2014/main" id="{C94DE1C1-9B99-2204-D18C-F64C048EE7A5}"/>
-              </a:ext>
-              <a:ext uri="{C183D7F6-B498-43B3-948B-1728B52AA6E4}">
-                <adec:decorative xmlns:adec="http://schemas.microsoft.com/office/drawing/2017/decorative" val="1"/>
-              </a:ext>
-            </a:extLst>
-          </p:cNvPr>
-          <p:cNvSpPr>
-            <a:spLocks noGrp="1" noRot="1" noChangeAspect="1" noMove="1" noResize="1" noEditPoints="1" noAdjustHandles="1" noChangeArrowheads="1" noChangeShapeType="1" noTextEdit="1"/>
-          </p:cNvSpPr>
-          <p:nvPr>
-            <p:extLst>
-              <p:ext uri="{386F3935-93C4-4BCD-93E2-E3B085C9AB24}">
-                <p16:designElem xmlns:p16="http://schemas.microsoft.com/office/powerpoint/2015/main" val="1"/>
-              </p:ext>
-            </p:extLst>
-          </p:nvPr>
-        </p:nvSpPr>
-        <p:spPr>
-          <a:xfrm rot="5400000">
-            <a:off x="4337304" y="5292566"/>
-            <a:ext cx="1554480" cy="18288"/>
-          </a:xfrm>
-          <a:custGeom>
-            <a:avLst/>
-            <a:gdLst>
-              <a:gd name="connsiteX0" fmla="*/ 0 w 1554480"/>
-              <a:gd name="connsiteY0" fmla="*/ 0 h 18288"/>
-              <a:gd name="connsiteX1" fmla="*/ 549250 w 1554480"/>
-              <a:gd name="connsiteY1" fmla="*/ 0 h 18288"/>
-              <a:gd name="connsiteX2" fmla="*/ 1082954 w 1554480"/>
-              <a:gd name="connsiteY2" fmla="*/ 0 h 18288"/>
-              <a:gd name="connsiteX3" fmla="*/ 1554480 w 1554480"/>
-              <a:gd name="connsiteY3" fmla="*/ 0 h 18288"/>
-              <a:gd name="connsiteX4" fmla="*/ 1554480 w 1554480"/>
-              <a:gd name="connsiteY4" fmla="*/ 18288 h 18288"/>
-              <a:gd name="connsiteX5" fmla="*/ 1067410 w 1554480"/>
-              <a:gd name="connsiteY5" fmla="*/ 18288 h 18288"/>
-              <a:gd name="connsiteX6" fmla="*/ 549250 w 1554480"/>
-              <a:gd name="connsiteY6" fmla="*/ 18288 h 18288"/>
-              <a:gd name="connsiteX7" fmla="*/ 0 w 1554480"/>
-              <a:gd name="connsiteY7" fmla="*/ 18288 h 18288"/>
-              <a:gd name="connsiteX8" fmla="*/ 0 w 1554480"/>
-              <a:gd name="connsiteY8" fmla="*/ 0 h 18288"/>
-            </a:gdLst>
-            <a:ahLst/>
-            <a:cxnLst>
-              <a:cxn ang="0">
-                <a:pos x="connsiteX0" y="connsiteY0"/>
-              </a:cxn>
-              <a:cxn ang="0">
-                <a:pos x="connsiteX1" y="connsiteY1"/>
-              </a:cxn>
-              <a:cxn ang="0">
-                <a:pos x="connsiteX2" y="connsiteY2"/>
-              </a:cxn>
-              <a:cxn ang="0">
-                <a:pos x="connsiteX3" y="connsiteY3"/>
-              </a:cxn>
-              <a:cxn ang="0">
-                <a:pos x="connsiteX4" y="connsiteY4"/>
-              </a:cxn>
-              <a:cxn ang="0">
-                <a:pos x="connsiteX5" y="connsiteY5"/>
-              </a:cxn>
-              <a:cxn ang="0">
-                <a:pos x="connsiteX6" y="connsiteY6"/>
-              </a:cxn>
-              <a:cxn ang="0">
-                <a:pos x="connsiteX7" y="connsiteY7"/>
-              </a:cxn>
-              <a:cxn ang="0">
-                <a:pos x="connsiteX8" y="connsiteY8"/>
-              </a:cxn>
-            </a:cxnLst>
-            <a:rect l="l" t="t" r="r" b="b"/>
-            <a:pathLst>
-              <a:path w="1554480" h="18288" fill="none" extrusionOk="0">
-                <a:moveTo>
-                  <a:pt x="0" y="0"/>
-                </a:moveTo>
-                <a:cubicBezTo>
-                  <a:pt x="114141" y="-19864"/>
-                  <a:pt x="345055" y="-1657"/>
-                  <a:pt x="549250" y="0"/>
-                </a:cubicBezTo>
-                <a:cubicBezTo>
-                  <a:pt x="753445" y="1657"/>
-                  <a:pt x="862292" y="-5674"/>
-                  <a:pt x="1082954" y="0"/>
-                </a:cubicBezTo>
-                <a:cubicBezTo>
-                  <a:pt x="1303616" y="5674"/>
-                  <a:pt x="1363530" y="4537"/>
-                  <a:pt x="1554480" y="0"/>
-                </a:cubicBezTo>
-                <a:cubicBezTo>
-                  <a:pt x="1554963" y="7176"/>
-                  <a:pt x="1553909" y="13682"/>
-                  <a:pt x="1554480" y="18288"/>
-                </a:cubicBezTo>
-                <a:cubicBezTo>
-                  <a:pt x="1338847" y="6127"/>
-                  <a:pt x="1215066" y="37851"/>
-                  <a:pt x="1067410" y="18288"/>
-                </a:cubicBezTo>
-                <a:cubicBezTo>
-                  <a:pt x="919754" y="-1275"/>
-                  <a:pt x="800465" y="3080"/>
-                  <a:pt x="549250" y="18288"/>
-                </a:cubicBezTo>
-                <a:cubicBezTo>
-                  <a:pt x="298035" y="33496"/>
-                  <a:pt x="158868" y="22769"/>
-                  <a:pt x="0" y="18288"/>
-                </a:cubicBezTo>
-                <a:cubicBezTo>
-                  <a:pt x="-655" y="13237"/>
-                  <a:pt x="709" y="4645"/>
-                  <a:pt x="0" y="0"/>
-                </a:cubicBezTo>
-                <a:close/>
-              </a:path>
-              <a:path w="1554480" h="18288" stroke="0" extrusionOk="0">
-                <a:moveTo>
-                  <a:pt x="0" y="0"/>
-                </a:moveTo>
-                <a:cubicBezTo>
-                  <a:pt x="249941" y="-58"/>
-                  <a:pt x="367334" y="23448"/>
-                  <a:pt x="502615" y="0"/>
-                </a:cubicBezTo>
-                <a:cubicBezTo>
-                  <a:pt x="637897" y="-23448"/>
-                  <a:pt x="813653" y="-20418"/>
-                  <a:pt x="974141" y="0"/>
-                </a:cubicBezTo>
-                <a:cubicBezTo>
-                  <a:pt x="1134629" y="20418"/>
-                  <a:pt x="1268772" y="6288"/>
-                  <a:pt x="1554480" y="0"/>
-                </a:cubicBezTo>
-                <a:cubicBezTo>
-                  <a:pt x="1554917" y="7222"/>
-                  <a:pt x="1555359" y="13299"/>
-                  <a:pt x="1554480" y="18288"/>
-                </a:cubicBezTo>
-                <a:cubicBezTo>
-                  <a:pt x="1336087" y="12172"/>
-                  <a:pt x="1310024" y="19759"/>
-                  <a:pt x="1067410" y="18288"/>
-                </a:cubicBezTo>
-                <a:cubicBezTo>
-                  <a:pt x="824796" y="16818"/>
-                  <a:pt x="787902" y="34647"/>
-                  <a:pt x="518160" y="18288"/>
-                </a:cubicBezTo>
-                <a:cubicBezTo>
-                  <a:pt x="248418" y="1930"/>
-                  <a:pt x="133160" y="9205"/>
-                  <a:pt x="0" y="18288"/>
-                </a:cubicBezTo>
-                <a:cubicBezTo>
-                  <a:pt x="-643" y="9451"/>
-                  <a:pt x="-340" y="7114"/>
-                  <a:pt x="0" y="0"/>
-                </a:cubicBezTo>
-                <a:close/>
-              </a:path>
-            </a:pathLst>
-          </a:custGeom>
-          <a:solidFill>
-            <a:schemeClr val="accent2"/>
-          </a:solidFill>
-          <a:ln w="41275" cap="rnd">
-            <a:solidFill>
-              <a:schemeClr val="accent2"/>
-            </a:solidFill>
-            <a:round/>
-            <a:extLst>
-              <a:ext uri="{C807C97D-BFC1-408E-A445-0C87EB9F89A2}">
-                <ask:lineSketchStyleProps xmlns:ask="http://schemas.microsoft.com/office/drawing/2018/sketchyshapes" sd="1219033472">
-                  <a:prstGeom prst="rect">
-                    <a:avLst/>
-                  </a:prstGeom>
-                  <ask:type>
-                    <ask:lineSketchFreehand/>
-                  </ask:type>
-                </ask:lineSketchStyleProps>
-              </a:ext>
-            </a:extLst>
-          </a:ln>
-        </p:spPr>
-        <p:style>
-          <a:lnRef idx="2">
-            <a:schemeClr val="accent1">
-              <a:shade val="50000"/>
-            </a:schemeClr>
-          </a:lnRef>
-          <a:fillRef idx="1">
-            <a:schemeClr val="accent1"/>
-          </a:fillRef>
-          <a:effectRef idx="0">
-            <a:schemeClr val="accent1"/>
-          </a:effectRef>
-          <a:fontRef idx="minor">
-            <a:schemeClr val="lt1"/>
-          </a:fontRef>
-        </p:style>
-        <p:txBody>
-          <a:bodyPr rtlCol="0" anchor="ctr"/>
-          <a:lstStyle/>
-          <a:p>
-            <a:pPr marL="0" marR="0" lvl="0" indent="0" algn="ctr" defTabSz="914400" rtl="0" eaLnBrk="1" fontAlgn="auto" latinLnBrk="0" hangingPunct="1">
-              <a:lnSpc>
-                <a:spcPct val="100000"/>
-              </a:lnSpc>
-              <a:spcBef>
-                <a:spcPts val="0"/>
-              </a:spcBef>
-              <a:spcAft>
-                <a:spcPts val="0"/>
-              </a:spcAft>
-              <a:buClrTx/>
-              <a:buSzTx/>
-              <a:buFontTx/>
-              <a:buNone/>
-              <a:tabLst/>
-              <a:defRPr/>
-            </a:pPr>
-            <a:endParaRPr kumimoji="0" lang="en-US" sz="1800" b="0" i="0" u="none" strike="noStrike" kern="1200" cap="none" spc="0" normalizeH="0" baseline="0" noProof="0">
-              <a:ln>
-                <a:noFill/>
-              </a:ln>
-              <a:solidFill>
-                <a:prstClr val="white"/>
-              </a:solidFill>
-              <a:effectLst/>
-              <a:uLnTx/>
-              <a:uFillTx/>
-              <a:latin typeface="Aptos" panose="02110004020202020204"/>
-              <a:ea typeface="+mn-ea"/>
-              <a:cs typeface="+mn-cs"/>
-            </a:endParaRPr>
           </a:p>
         </p:txBody>
       </p:sp>
@@ -19839,230 +18649,198 @@
         </p:nvSpPr>
         <p:spPr>
           <a:xfrm>
-            <a:off x="5333999" y="4735793"/>
-            <a:ext cx="6214871" cy="1722691"/>
+            <a:off x="838201" y="2409568"/>
+            <a:ext cx="4418363" cy="3690551"/>
           </a:xfrm>
           <a:prstGeom prst="rect">
             <a:avLst/>
           </a:prstGeom>
         </p:spPr>
         <p:txBody>
-          <a:bodyPr vert="horz" lIns="91440" tIns="45720" rIns="91440" bIns="45720" rtlCol="0" anchor="ctr">
+          <a:bodyPr vert="horz" lIns="91440" tIns="45720" rIns="91440" bIns="45720" rtlCol="0">
             <a:normAutofit/>
           </a:bodyPr>
           <a:lstStyle/>
           <a:p>
-            <a:pPr marL="0" marR="0" lvl="0" indent="-228600" algn="l" defTabSz="914400" rtl="0" eaLnBrk="1" fontAlgn="auto" latinLnBrk="0" hangingPunct="1">
+            <a:pPr indent="-228600">
               <a:lnSpc>
                 <a:spcPct val="90000"/>
               </a:lnSpc>
-              <a:spcBef>
-                <a:spcPts val="0"/>
-              </a:spcBef>
               <a:spcAft>
                 <a:spcPts val="600"/>
               </a:spcAft>
-              <a:buClrTx/>
-              <a:buSzTx/>
               <a:buFont typeface="Arial" panose="020B0604020202020204" pitchFamily="34" charset="0"/>
               <a:buChar char="•"/>
-              <a:tabLst/>
               <a:defRPr/>
             </a:pPr>
             <a:r>
-              <a:rPr kumimoji="0" lang="en-US" sz="1500" b="1" i="0" u="none" strike="noStrike" kern="1200" cap="none" spc="0" normalizeH="0" baseline="0" noProof="0" dirty="0">
-                <a:ln>
-                  <a:noFill/>
-                </a:ln>
+              <a:rPr lang="en-IN" sz="2000" dirty="0">
                 <a:solidFill>
-                  <a:prstClr val="black"/>
+                  <a:srgbClr val="0E0E0E"/>
+                </a:solidFill>
+                <a:latin typeface=".SF NS"/>
+              </a:rPr>
+              <a:t>Lower grades have the highest rates of default despite having lower proportions. </a:t>
+            </a:r>
+            <a:endParaRPr lang="en-US" sz="2000" dirty="0">
+              <a:solidFill>
+                <a:srgbClr val="0E0E0E"/>
+              </a:solidFill>
+              <a:latin typeface=".SF NS"/>
+            </a:endParaRPr>
+          </a:p>
+          <a:p>
+            <a:pPr indent="-228600">
+              <a:lnSpc>
+                <a:spcPct val="90000"/>
+              </a:lnSpc>
+              <a:spcAft>
+                <a:spcPts val="600"/>
+              </a:spcAft>
+              <a:buFont typeface="Arial" panose="020B0604020202020204" pitchFamily="34" charset="0"/>
+              <a:buChar char="•"/>
+              <a:defRPr/>
+            </a:pPr>
+            <a:r>
+              <a:rPr lang="en-IN" sz="2000" dirty="0">
+                <a:solidFill>
+                  <a:srgbClr val="0E0E0E"/>
                 </a:solidFill>
                 <a:effectLst/>
-                <a:uLnTx/>
-                <a:uFillTx/>
-                <a:latin typeface="Aptos" panose="02110004020202020204"/>
-                <a:ea typeface="+mn-ea"/>
-                <a:cs typeface="+mn-cs"/>
+                <a:latin typeface=".SF NS"/>
               </a:rPr>
-              <a:t>Observations:</a:t>
+              <a:t>Lower grades have significantly higher default rates compared to higher grades.</a:t>
             </a:r>
           </a:p>
           <a:p>
-            <a:pPr marL="285750" marR="0" lvl="0" indent="-285750" algn="l" defTabSz="914400" rtl="0" eaLnBrk="1" fontAlgn="auto" latinLnBrk="0" hangingPunct="1">
+            <a:pPr indent="-228600">
               <a:lnSpc>
                 <a:spcPct val="90000"/>
               </a:lnSpc>
-              <a:spcBef>
-                <a:spcPts val="0"/>
-              </a:spcBef>
               <a:spcAft>
                 <a:spcPts val="600"/>
               </a:spcAft>
-              <a:buClrTx/>
-              <a:buSzTx/>
               <a:buFont typeface="Arial" panose="020B0604020202020204" pitchFamily="34" charset="0"/>
               <a:buChar char="•"/>
-              <a:tabLst/>
               <a:defRPr/>
             </a:pPr>
             <a:r>
-              <a:rPr kumimoji="0" lang="en-US" sz="1500" b="0" i="0" u="none" strike="noStrike" kern="1200" cap="none" spc="0" normalizeH="0" baseline="0" noProof="0" dirty="0">
-                <a:ln>
-                  <a:noFill/>
-                </a:ln>
+              <a:rPr lang="en-IN" sz="2000" dirty="0">
                 <a:solidFill>
-                  <a:prstClr val="black"/>
+                  <a:srgbClr val="0E0E0E"/>
                 </a:solidFill>
-                <a:effectLst/>
-                <a:uLnTx/>
-                <a:uFillTx/>
-                <a:latin typeface="Aptos" panose="02110004020202020204"/>
-                <a:ea typeface="+mn-ea"/>
-                <a:cs typeface="+mn-cs"/>
+                <a:highlight>
+                  <a:srgbClr val="FFFF00"/>
+                </a:highlight>
+                <a:latin typeface=".SF NS"/>
               </a:rPr>
-              <a:t>Interest rate less than 9% has very less chances of default. Interest rates are starting from minimum 5 %.</a:t>
+              <a:t>There is an inverse correlation between loan grade and rate of default. The lower the grade, higher the chances of default. </a:t>
             </a:r>
-          </a:p>
-          <a:p>
-            <a:pPr marL="0" marR="0" lvl="0" indent="-228600" algn="l" defTabSz="914400" rtl="0" eaLnBrk="1" fontAlgn="auto" latinLnBrk="0" hangingPunct="1">
-              <a:lnSpc>
-                <a:spcPct val="90000"/>
-              </a:lnSpc>
-              <a:spcBef>
-                <a:spcPts val="0"/>
-              </a:spcBef>
-              <a:spcAft>
-                <a:spcPts val="600"/>
-              </a:spcAft>
-              <a:buClrTx/>
-              <a:buSzTx/>
-              <a:buFont typeface="Arial" panose="020B0604020202020204" pitchFamily="34" charset="0"/>
-              <a:buChar char="•"/>
-              <a:tabLst/>
-              <a:defRPr/>
-            </a:pPr>
-            <a:r>
-              <a:rPr kumimoji="0" lang="en-US" sz="1500" b="0" i="0" u="none" strike="noStrike" kern="1200" cap="none" spc="0" normalizeH="0" baseline="0" noProof="0" dirty="0">
-                <a:ln>
-                  <a:noFill/>
-                </a:ln>
-                <a:solidFill>
-                  <a:prstClr val="black"/>
-                </a:solidFill>
-                <a:effectLst/>
-                <a:uLnTx/>
-                <a:uFillTx/>
-                <a:latin typeface="Aptos" panose="02110004020202020204"/>
-                <a:ea typeface="+mn-ea"/>
-                <a:cs typeface="+mn-cs"/>
-              </a:rPr>
-              <a:t>  Most applicants have defaulted on loans where the interest rate was more than 15%.</a:t>
-            </a:r>
-          </a:p>
-          <a:p>
-            <a:pPr marL="285750" marR="0" lvl="0" indent="-285750" algn="l" defTabSz="914400" rtl="0" eaLnBrk="1" fontAlgn="auto" latinLnBrk="0" hangingPunct="1">
-              <a:lnSpc>
-                <a:spcPct val="90000"/>
-              </a:lnSpc>
-              <a:spcBef>
-                <a:spcPts val="0"/>
-              </a:spcBef>
-              <a:spcAft>
-                <a:spcPts val="600"/>
-              </a:spcAft>
-              <a:buClrTx/>
-              <a:buSzTx/>
-              <a:buFont typeface="Arial" panose="020B0604020202020204" pitchFamily="34" charset="0"/>
-              <a:buChar char="•"/>
-              <a:tabLst/>
-              <a:defRPr/>
-            </a:pPr>
-            <a:r>
-              <a:rPr kumimoji="0" lang="en-US" sz="1500" b="0" i="0" u="none" strike="noStrike" kern="1200" cap="none" spc="0" normalizeH="0" baseline="0" noProof="0" dirty="0">
-                <a:ln>
-                  <a:noFill/>
-                </a:ln>
-                <a:solidFill>
-                  <a:prstClr val="black"/>
-                </a:solidFill>
-                <a:effectLst/>
-                <a:uLnTx/>
-                <a:uFillTx/>
-                <a:latin typeface="Aptos" panose="02110004020202020204"/>
-                <a:ea typeface="+mn-ea"/>
-                <a:cs typeface="+mn-cs"/>
-              </a:rPr>
-              <a:t>Loan default proportion increases with higher interest rates.</a:t>
-            </a:r>
-          </a:p>
-          <a:p>
-            <a:pPr marL="0" marR="0" lvl="0" indent="-228600" algn="l" defTabSz="914400" rtl="0" eaLnBrk="1" fontAlgn="auto" latinLnBrk="0" hangingPunct="1">
-              <a:lnSpc>
-                <a:spcPct val="90000"/>
-              </a:lnSpc>
-              <a:spcBef>
-                <a:spcPts val="0"/>
-              </a:spcBef>
-              <a:spcAft>
-                <a:spcPts val="600"/>
-              </a:spcAft>
-              <a:buClrTx/>
-              <a:buSzTx/>
-              <a:buFont typeface="Arial" panose="020B0604020202020204" pitchFamily="34" charset="0"/>
-              <a:buChar char="•"/>
-              <a:tabLst/>
-              <a:defRPr/>
-            </a:pPr>
-            <a:endParaRPr kumimoji="0" lang="en-US" sz="1500" b="0" i="0" u="none" strike="noStrike" kern="1200" cap="none" spc="0" normalizeH="0" baseline="0" noProof="0" dirty="0">
-              <a:ln>
-                <a:noFill/>
-              </a:ln>
+            <a:endParaRPr lang="en-IN" sz="2000" dirty="0">
               <a:solidFill>
-                <a:prstClr val="black"/>
+                <a:srgbClr val="0E0E0E"/>
               </a:solidFill>
               <a:effectLst/>
-              <a:uLnTx/>
-              <a:uFillTx/>
-              <a:latin typeface="Aptos" panose="02110004020202020204"/>
-              <a:ea typeface="+mn-ea"/>
-              <a:cs typeface="+mn-cs"/>
-            </a:endParaRPr>
-          </a:p>
-          <a:p>
-            <a:pPr marL="0" marR="0" lvl="0" indent="-228600" algn="l" defTabSz="914400" rtl="0" eaLnBrk="1" fontAlgn="auto" latinLnBrk="0" hangingPunct="1">
-              <a:lnSpc>
-                <a:spcPct val="90000"/>
-              </a:lnSpc>
-              <a:spcBef>
-                <a:spcPts val="0"/>
-              </a:spcBef>
-              <a:spcAft>
-                <a:spcPts val="600"/>
-              </a:spcAft>
-              <a:buClrTx/>
-              <a:buSzTx/>
-              <a:buFont typeface="Arial" panose="020B0604020202020204" pitchFamily="34" charset="0"/>
-              <a:buChar char="•"/>
-              <a:tabLst/>
-              <a:defRPr/>
-            </a:pPr>
-            <a:endParaRPr kumimoji="0" lang="en-US" sz="1500" b="0" i="0" u="none" strike="noStrike" kern="1200" cap="none" spc="0" normalizeH="0" baseline="0" noProof="0" dirty="0">
-              <a:ln>
-                <a:noFill/>
-              </a:ln>
-              <a:solidFill>
-                <a:prstClr val="black"/>
-              </a:solidFill>
-              <a:effectLst/>
-              <a:uLnTx/>
-              <a:uFillTx/>
-              <a:latin typeface="Aptos" panose="02110004020202020204"/>
-              <a:ea typeface="+mn-ea"/>
-              <a:cs typeface="+mn-cs"/>
+              <a:highlight>
+                <a:srgbClr val="FFFF00"/>
+              </a:highlight>
+              <a:latin typeface=".SF NS"/>
             </a:endParaRPr>
           </a:p>
         </p:txBody>
       </p:sp>
+      <p:pic>
+        <p:nvPicPr>
+          <p:cNvPr id="4098" name="Picture 2">
+            <a:extLst>
+              <a:ext uri="{FF2B5EF4-FFF2-40B4-BE49-F238E27FC236}">
+                <a16:creationId xmlns:a16="http://schemas.microsoft.com/office/drawing/2014/main" id="{C4961D19-2456-6442-BEE9-DD3A59CCD8E3}"/>
+              </a:ext>
+            </a:extLst>
+          </p:cNvPr>
+          <p:cNvPicPr>
+            <a:picLocks noChangeAspect="1" noChangeArrowheads="1"/>
+          </p:cNvPicPr>
+          <p:nvPr/>
+        </p:nvPicPr>
+        <p:blipFill>
+          <a:blip r:embed="rId2">
+            <a:extLst>
+              <a:ext uri="{28A0092B-C50C-407E-A947-70E740481C1C}">
+                <a14:useLocalDpi xmlns:a14="http://schemas.microsoft.com/office/drawing/2010/main" val="0"/>
+              </a:ext>
+            </a:extLst>
+          </a:blip>
+          <a:stretch>
+            <a:fillRect/>
+          </a:stretch>
+        </p:blipFill>
+        <p:spPr bwMode="auto">
+          <a:xfrm>
+            <a:off x="5256564" y="117781"/>
+            <a:ext cx="6674249" cy="2469472"/>
+          </a:xfrm>
+          <a:prstGeom prst="rect">
+            <a:avLst/>
+          </a:prstGeom>
+          <a:noFill/>
+          <a:extLst>
+            <a:ext uri="{909E8E84-426E-40DD-AFC4-6F175D3DCCD1}">
+              <a14:hiddenFill xmlns:a14="http://schemas.microsoft.com/office/drawing/2010/main">
+                <a:solidFill>
+                  <a:srgbClr val="FFFFFF"/>
+                </a:solidFill>
+              </a14:hiddenFill>
+            </a:ext>
+          </a:extLst>
+        </p:spPr>
+      </p:pic>
+      <p:pic>
+        <p:nvPicPr>
+          <p:cNvPr id="4100" name="Picture 4">
+            <a:extLst>
+              <a:ext uri="{FF2B5EF4-FFF2-40B4-BE49-F238E27FC236}">
+                <a16:creationId xmlns:a16="http://schemas.microsoft.com/office/drawing/2014/main" id="{7CEC1964-9DB3-FA37-2CA1-A65E513A0319}"/>
+              </a:ext>
+            </a:extLst>
+          </p:cNvPr>
+          <p:cNvPicPr>
+            <a:picLocks noChangeAspect="1" noChangeArrowheads="1"/>
+          </p:cNvPicPr>
+          <p:nvPr/>
+        </p:nvPicPr>
+        <p:blipFill>
+          <a:blip r:embed="rId3">
+            <a:extLst>
+              <a:ext uri="{28A0092B-C50C-407E-A947-70E740481C1C}">
+                <a14:useLocalDpi xmlns:a14="http://schemas.microsoft.com/office/drawing/2010/main" val="0"/>
+              </a:ext>
+            </a:extLst>
+          </a:blip>
+          <a:stretch>
+            <a:fillRect/>
+          </a:stretch>
+        </p:blipFill>
+        <p:spPr bwMode="auto">
+          <a:xfrm>
+            <a:off x="6819479" y="2705034"/>
+            <a:ext cx="5111334" cy="3807944"/>
+          </a:xfrm>
+          <a:prstGeom prst="rect">
+            <a:avLst/>
+          </a:prstGeom>
+          <a:noFill/>
+          <a:extLst>
+            <a:ext uri="{909E8E84-426E-40DD-AFC4-6F175D3DCCD1}">
+              <a14:hiddenFill xmlns:a14="http://schemas.microsoft.com/office/drawing/2010/main">
+                <a:solidFill>
+                  <a:srgbClr val="FFFFFF"/>
+                </a:solidFill>
+              </a14:hiddenFill>
+            </a:ext>
+          </a:extLst>
+        </p:spPr>
+      </p:pic>
     </p:spTree>
     <p:extLst>
       <p:ext uri="{BB962C8B-B14F-4D97-AF65-F5344CB8AC3E}">
@@ -20201,10 +18979,10 @@
       </p:grpSpPr>
       <p:sp useBgFill="1">
         <p:nvSpPr>
-          <p:cNvPr id="73" name="Rectangle 72">
+          <p:cNvPr id="5127" name="Rectangle 5126">
             <a:extLst>
               <a:ext uri="{FF2B5EF4-FFF2-40B4-BE49-F238E27FC236}">
-                <a16:creationId xmlns:a16="http://schemas.microsoft.com/office/drawing/2014/main" id="{D99BB613-60E8-753A-C570-367711A214BE}"/>
+                <a16:creationId xmlns:a16="http://schemas.microsoft.com/office/drawing/2014/main" id="{743AA782-23D1-4521-8CAD-47662984AA08}"/>
               </a:ext>
               <a:ext uri="{C183D7F6-B498-43B3-948B-1728B52AA6E4}">
                 <adec:decorative xmlns:adec="http://schemas.microsoft.com/office/drawing/2017/decorative" val="1"/>
@@ -20225,7 +19003,7 @@
         <p:spPr>
           <a:xfrm>
             <a:off x="0" y="0"/>
-            <a:ext cx="12188952" cy="6858000"/>
+            <a:ext cx="12192000" cy="6858000"/>
           </a:xfrm>
           <a:prstGeom prst="rect">
             <a:avLst/>
@@ -20254,37 +19032,8 @@
           <a:bodyPr rtlCol="0" anchor="ctr"/>
           <a:lstStyle/>
           <a:p>
-            <a:pPr marL="0" marR="0" lvl="0" indent="0" algn="ctr" defTabSz="914400" rtl="0" eaLnBrk="1" fontAlgn="auto" latinLnBrk="0" hangingPunct="1">
-              <a:lnSpc>
-                <a:spcPct val="100000"/>
-              </a:lnSpc>
-              <a:spcBef>
-                <a:spcPts val="0"/>
-              </a:spcBef>
-              <a:spcAft>
-                <a:spcPts val="0"/>
-              </a:spcAft>
-              <a:buClrTx/>
-              <a:buSzTx/>
-              <a:buFontTx/>
-              <a:buNone/>
-              <a:tabLst/>
-              <a:defRPr/>
-            </a:pPr>
-            <a:endParaRPr kumimoji="0" lang="en-US" sz="1800" b="0" i="0" u="none" strike="noStrike" kern="1200" cap="none" spc="0" normalizeH="0" baseline="0" noProof="0">
-              <a:ln>
-                <a:noFill/>
-              </a:ln>
-              <a:solidFill>
-                <a:prstClr val="white"/>
-              </a:solidFill>
-              <a:effectLst/>
-              <a:uLnTx/>
-              <a:uFillTx/>
-              <a:latin typeface="Aptos" panose="02110004020202020204"/>
-              <a:ea typeface="+mn-ea"/>
-              <a:cs typeface="+mn-cs"/>
-            </a:endParaRPr>
+            <a:pPr algn="ctr"/>
+            <a:endParaRPr lang="en-US"/>
           </a:p>
         </p:txBody>
       </p:sp>
@@ -20306,29 +19055,36 @@
         </p:nvSpPr>
         <p:spPr>
           <a:xfrm>
-            <a:off x="630936" y="4735793"/>
-            <a:ext cx="4245864" cy="1343157"/>
+            <a:off x="630936" y="640080"/>
+            <a:ext cx="4818888" cy="1481328"/>
           </a:xfrm>
         </p:spPr>
         <p:txBody>
-          <a:bodyPr vert="horz" lIns="91440" tIns="45720" rIns="91440" bIns="45720" rtlCol="0" anchor="ctr">
+          <a:bodyPr vert="horz" lIns="91440" tIns="45720" rIns="91440" bIns="45720" rtlCol="0" anchor="b">
             <a:normAutofit/>
           </a:bodyPr>
           <a:lstStyle/>
           <a:p>
             <a:r>
-              <a:rPr lang="en-US" sz="5400" dirty="0"/>
-              <a:t>Purpose</a:t>
+              <a:rPr lang="en-US" sz="5400" kern="1200" dirty="0">
+                <a:solidFill>
+                  <a:schemeClr val="tx1"/>
+                </a:solidFill>
+                <a:latin typeface="+mj-lt"/>
+                <a:ea typeface="+mj-ea"/>
+                <a:cs typeface="+mj-cs"/>
+              </a:rPr>
+              <a:t>Purpose of loan</a:t>
             </a:r>
           </a:p>
         </p:txBody>
       </p:sp>
       <p:sp>
         <p:nvSpPr>
-          <p:cNvPr id="72" name="sketchy line">
+          <p:cNvPr id="5129" name="sketch line">
             <a:extLst>
               <a:ext uri="{FF2B5EF4-FFF2-40B4-BE49-F238E27FC236}">
-                <a16:creationId xmlns:a16="http://schemas.microsoft.com/office/drawing/2014/main" id="{8CF1A284-C12F-C61B-956F-3E676237015C}"/>
+                <a16:creationId xmlns:a16="http://schemas.microsoft.com/office/drawing/2014/main" id="{650D18FE-0824-4A46-B22C-A86B52E5780A}"/>
               </a:ext>
               <a:ext uri="{C183D7F6-B498-43B3-948B-1728B52AA6E4}">
                 <adec:decorative xmlns:adec="http://schemas.microsoft.com/office/drawing/2017/decorative" val="1"/>
@@ -20347,31 +19103,37 @@
           </p:nvPr>
         </p:nvSpPr>
         <p:spPr>
-          <a:xfrm rot="5400000">
-            <a:off x="4337304" y="5292566"/>
-            <a:ext cx="1554480" cy="18288"/>
+          <a:xfrm>
+            <a:off x="643278" y="2372868"/>
+            <a:ext cx="3255095" cy="18288"/>
           </a:xfrm>
           <a:custGeom>
             <a:avLst/>
             <a:gdLst>
-              <a:gd name="connsiteX0" fmla="*/ 0 w 1554480"/>
+              <a:gd name="connsiteX0" fmla="*/ 0 w 3255095"/>
               <a:gd name="connsiteY0" fmla="*/ 0 h 18288"/>
-              <a:gd name="connsiteX1" fmla="*/ 549250 w 1554480"/>
+              <a:gd name="connsiteX1" fmla="*/ 618468 w 3255095"/>
               <a:gd name="connsiteY1" fmla="*/ 0 h 18288"/>
-              <a:gd name="connsiteX2" fmla="*/ 1082954 w 1554480"/>
+              <a:gd name="connsiteX2" fmla="*/ 1269487 w 3255095"/>
               <a:gd name="connsiteY2" fmla="*/ 0 h 18288"/>
-              <a:gd name="connsiteX3" fmla="*/ 1554480 w 1554480"/>
+              <a:gd name="connsiteX3" fmla="*/ 1953057 w 3255095"/>
               <a:gd name="connsiteY3" fmla="*/ 0 h 18288"/>
-              <a:gd name="connsiteX4" fmla="*/ 1554480 w 1554480"/>
-              <a:gd name="connsiteY4" fmla="*/ 18288 h 18288"/>
-              <a:gd name="connsiteX5" fmla="*/ 1067410 w 1554480"/>
-              <a:gd name="connsiteY5" fmla="*/ 18288 h 18288"/>
-              <a:gd name="connsiteX6" fmla="*/ 549250 w 1554480"/>
+              <a:gd name="connsiteX4" fmla="*/ 2636627 w 3255095"/>
+              <a:gd name="connsiteY4" fmla="*/ 0 h 18288"/>
+              <a:gd name="connsiteX5" fmla="*/ 3255095 w 3255095"/>
+              <a:gd name="connsiteY5" fmla="*/ 0 h 18288"/>
+              <a:gd name="connsiteX6" fmla="*/ 3255095 w 3255095"/>
               <a:gd name="connsiteY6" fmla="*/ 18288 h 18288"/>
-              <a:gd name="connsiteX7" fmla="*/ 0 w 1554480"/>
+              <a:gd name="connsiteX7" fmla="*/ 2538974 w 3255095"/>
               <a:gd name="connsiteY7" fmla="*/ 18288 h 18288"/>
-              <a:gd name="connsiteX8" fmla="*/ 0 w 1554480"/>
-              <a:gd name="connsiteY8" fmla="*/ 0 h 18288"/>
+              <a:gd name="connsiteX8" fmla="*/ 1822853 w 3255095"/>
+              <a:gd name="connsiteY8" fmla="*/ 18288 h 18288"/>
+              <a:gd name="connsiteX9" fmla="*/ 1171834 w 3255095"/>
+              <a:gd name="connsiteY9" fmla="*/ 18288 h 18288"/>
+              <a:gd name="connsiteX10" fmla="*/ 0 w 3255095"/>
+              <a:gd name="connsiteY10" fmla="*/ 18288 h 18288"/>
+              <a:gd name="connsiteX11" fmla="*/ 0 w 3255095"/>
+              <a:gd name="connsiteY11" fmla="*/ 0 h 18288"/>
             </a:gdLst>
             <a:ahLst/>
             <a:cxnLst>
@@ -20402,97 +19164,141 @@
               <a:cxn ang="0">
                 <a:pos x="connsiteX8" y="connsiteY8"/>
               </a:cxn>
+              <a:cxn ang="0">
+                <a:pos x="connsiteX9" y="connsiteY9"/>
+              </a:cxn>
+              <a:cxn ang="0">
+                <a:pos x="connsiteX10" y="connsiteY10"/>
+              </a:cxn>
+              <a:cxn ang="0">
+                <a:pos x="connsiteX11" y="connsiteY11"/>
+              </a:cxn>
             </a:cxnLst>
             <a:rect l="l" t="t" r="r" b="b"/>
             <a:pathLst>
-              <a:path w="1554480" h="18288" fill="none" extrusionOk="0">
+              <a:path w="3255095" h="18288" fill="none" extrusionOk="0">
                 <a:moveTo>
                   <a:pt x="0" y="0"/>
                 </a:moveTo>
                 <a:cubicBezTo>
-                  <a:pt x="114141" y="-19864"/>
-                  <a:pt x="345055" y="-1657"/>
-                  <a:pt x="549250" y="0"/>
+                  <a:pt x="240201" y="-22123"/>
+                  <a:pt x="462021" y="-19623"/>
+                  <a:pt x="618468" y="0"/>
                 </a:cubicBezTo>
                 <a:cubicBezTo>
-                  <a:pt x="753445" y="1657"/>
-                  <a:pt x="862292" y="-5674"/>
-                  <a:pt x="1082954" y="0"/>
+                  <a:pt x="774915" y="19623"/>
+                  <a:pt x="974734" y="2035"/>
+                  <a:pt x="1269487" y="0"/>
                 </a:cubicBezTo>
                 <a:cubicBezTo>
-                  <a:pt x="1303616" y="5674"/>
-                  <a:pt x="1363530" y="4537"/>
-                  <a:pt x="1554480" y="0"/>
+                  <a:pt x="1564240" y="-2035"/>
+                  <a:pt x="1733579" y="10639"/>
+                  <a:pt x="1953057" y="0"/>
                 </a:cubicBezTo>
                 <a:cubicBezTo>
-                  <a:pt x="1554963" y="7176"/>
-                  <a:pt x="1553909" y="13682"/>
-                  <a:pt x="1554480" y="18288"/>
+                  <a:pt x="2172535" y="-10639"/>
+                  <a:pt x="2453962" y="14018"/>
+                  <a:pt x="2636627" y="0"/>
                 </a:cubicBezTo>
                 <a:cubicBezTo>
-                  <a:pt x="1338847" y="6127"/>
-                  <a:pt x="1215066" y="37851"/>
-                  <a:pt x="1067410" y="18288"/>
+                  <a:pt x="2819292" y="-14018"/>
+                  <a:pt x="3121375" y="5399"/>
+                  <a:pt x="3255095" y="0"/>
                 </a:cubicBezTo>
                 <a:cubicBezTo>
-                  <a:pt x="919754" y="-1275"/>
-                  <a:pt x="800465" y="3080"/>
-                  <a:pt x="549250" y="18288"/>
+                  <a:pt x="3254386" y="8157"/>
+                  <a:pt x="3254682" y="12125"/>
+                  <a:pt x="3255095" y="18288"/>
                 </a:cubicBezTo>
                 <a:cubicBezTo>
-                  <a:pt x="298035" y="33496"/>
-                  <a:pt x="158868" y="22769"/>
+                  <a:pt x="3088545" y="23203"/>
+                  <a:pt x="2687475" y="7419"/>
+                  <a:pt x="2538974" y="18288"/>
+                </a:cubicBezTo>
+                <a:cubicBezTo>
+                  <a:pt x="2390473" y="29157"/>
+                  <a:pt x="2137381" y="-8959"/>
+                  <a:pt x="1822853" y="18288"/>
+                </a:cubicBezTo>
+                <a:cubicBezTo>
+                  <a:pt x="1508325" y="45535"/>
+                  <a:pt x="1466437" y="20385"/>
+                  <a:pt x="1171834" y="18288"/>
+                </a:cubicBezTo>
+                <a:cubicBezTo>
+                  <a:pt x="877231" y="16191"/>
+                  <a:pt x="561097" y="37643"/>
                   <a:pt x="0" y="18288"/>
                 </a:cubicBezTo>
                 <a:cubicBezTo>
-                  <a:pt x="-655" y="13237"/>
-                  <a:pt x="709" y="4645"/>
+                  <a:pt x="-46" y="12483"/>
+                  <a:pt x="-203" y="6491"/>
                   <a:pt x="0" y="0"/>
                 </a:cubicBezTo>
                 <a:close/>
               </a:path>
-              <a:path w="1554480" h="18288" stroke="0" extrusionOk="0">
+              <a:path w="3255095" h="18288" stroke="0" extrusionOk="0">
                 <a:moveTo>
                   <a:pt x="0" y="0"/>
                 </a:moveTo>
                 <a:cubicBezTo>
-                  <a:pt x="249941" y="-58"/>
-                  <a:pt x="367334" y="23448"/>
-                  <a:pt x="502615" y="0"/>
+                  <a:pt x="291965" y="19429"/>
+                  <a:pt x="363155" y="8568"/>
+                  <a:pt x="618468" y="0"/>
                 </a:cubicBezTo>
                 <a:cubicBezTo>
-                  <a:pt x="637897" y="-23448"/>
-                  <a:pt x="813653" y="-20418"/>
-                  <a:pt x="974141" y="0"/>
+                  <a:pt x="873781" y="-8568"/>
+                  <a:pt x="904459" y="-19505"/>
+                  <a:pt x="1171834" y="0"/>
                 </a:cubicBezTo>
                 <a:cubicBezTo>
-                  <a:pt x="1134629" y="20418"/>
-                  <a:pt x="1268772" y="6288"/>
-                  <a:pt x="1554480" y="0"/>
+                  <a:pt x="1439209" y="19505"/>
+                  <a:pt x="1744369" y="9790"/>
+                  <a:pt x="1887955" y="0"/>
                 </a:cubicBezTo>
                 <a:cubicBezTo>
-                  <a:pt x="1554917" y="7222"/>
-                  <a:pt x="1555359" y="13299"/>
-                  <a:pt x="1554480" y="18288"/>
+                  <a:pt x="2031541" y="-9790"/>
+                  <a:pt x="2346378" y="21240"/>
+                  <a:pt x="2506423" y="0"/>
                 </a:cubicBezTo>
                 <a:cubicBezTo>
-                  <a:pt x="1336087" y="12172"/>
-                  <a:pt x="1310024" y="19759"/>
-                  <a:pt x="1067410" y="18288"/>
+                  <a:pt x="2666468" y="-21240"/>
+                  <a:pt x="2990257" y="30414"/>
+                  <a:pt x="3255095" y="0"/>
                 </a:cubicBezTo>
                 <a:cubicBezTo>
-                  <a:pt x="824796" y="16818"/>
-                  <a:pt x="787902" y="34647"/>
-                  <a:pt x="518160" y="18288"/>
+                  <a:pt x="3254831" y="4493"/>
+                  <a:pt x="3255479" y="9472"/>
+                  <a:pt x="3255095" y="18288"/>
                 </a:cubicBezTo>
                 <a:cubicBezTo>
-                  <a:pt x="248418" y="1930"/>
-                  <a:pt x="133160" y="9205"/>
+                  <a:pt x="3120743" y="16690"/>
+                  <a:pt x="2759628" y="42462"/>
+                  <a:pt x="2604076" y="18288"/>
+                </a:cubicBezTo>
+                <a:cubicBezTo>
+                  <a:pt x="2448524" y="-5886"/>
+                  <a:pt x="2184336" y="19599"/>
+                  <a:pt x="1887955" y="18288"/>
+                </a:cubicBezTo>
+                <a:cubicBezTo>
+                  <a:pt x="1591574" y="16977"/>
+                  <a:pt x="1548845" y="6870"/>
+                  <a:pt x="1334589" y="18288"/>
+                </a:cubicBezTo>
+                <a:cubicBezTo>
+                  <a:pt x="1120333" y="29706"/>
+                  <a:pt x="996014" y="9662"/>
+                  <a:pt x="683570" y="18288"/>
+                </a:cubicBezTo>
+                <a:cubicBezTo>
+                  <a:pt x="371126" y="26914"/>
+                  <a:pt x="198687" y="16167"/>
                   <a:pt x="0" y="18288"/>
                 </a:cubicBezTo>
                 <a:cubicBezTo>
-                  <a:pt x="-643" y="9451"/>
-                  <a:pt x="-340" y="7114"/>
+                  <a:pt x="843" y="9577"/>
+                  <a:pt x="371" y="6900"/>
                   <a:pt x="0" y="0"/>
                 </a:cubicBezTo>
                 <a:close/>
@@ -20502,7 +19308,7 @@
           <a:solidFill>
             <a:schemeClr val="accent2"/>
           </a:solidFill>
-          <a:ln w="41275" cap="rnd">
+          <a:ln w="38100" cap="rnd">
             <a:solidFill>
               <a:schemeClr val="accent2"/>
             </a:solidFill>
@@ -20541,37 +19347,8 @@
           <a:bodyPr rtlCol="0" anchor="ctr"/>
           <a:lstStyle/>
           <a:p>
-            <a:pPr marL="0" marR="0" lvl="0" indent="0" algn="ctr" defTabSz="914400" rtl="0" eaLnBrk="1" fontAlgn="auto" latinLnBrk="0" hangingPunct="1">
-              <a:lnSpc>
-                <a:spcPct val="100000"/>
-              </a:lnSpc>
-              <a:spcBef>
-                <a:spcPts val="0"/>
-              </a:spcBef>
-              <a:spcAft>
-                <a:spcPts val="0"/>
-              </a:spcAft>
-              <a:buClrTx/>
-              <a:buSzTx/>
-              <a:buFontTx/>
-              <a:buNone/>
-              <a:tabLst/>
-              <a:defRPr/>
-            </a:pPr>
-            <a:endParaRPr kumimoji="0" lang="en-US" sz="1800" b="0" i="0" u="none" strike="noStrike" kern="1200" cap="none" spc="0" normalizeH="0" baseline="0" noProof="0">
-              <a:ln>
-                <a:noFill/>
-              </a:ln>
-              <a:solidFill>
-                <a:prstClr val="white"/>
-              </a:solidFill>
-              <a:effectLst/>
-              <a:uLnTx/>
-              <a:uFillTx/>
-              <a:latin typeface="Aptos" panose="02110004020202020204"/>
-              <a:ea typeface="+mn-ea"/>
-              <a:cs typeface="+mn-cs"/>
-            </a:endParaRPr>
+            <a:pPr algn="ctr"/>
+            <a:endParaRPr lang="en-US"/>
           </a:p>
         </p:txBody>
       </p:sp>
@@ -20589,258 +19366,148 @@
         </p:nvSpPr>
         <p:spPr>
           <a:xfrm>
-            <a:off x="5333999" y="4735793"/>
-            <a:ext cx="6214871" cy="1722691"/>
+            <a:off x="630936" y="2660904"/>
+            <a:ext cx="4696438" cy="3547872"/>
           </a:xfrm>
           <a:prstGeom prst="rect">
             <a:avLst/>
           </a:prstGeom>
         </p:spPr>
         <p:txBody>
-          <a:bodyPr vert="horz" lIns="91440" tIns="45720" rIns="91440" bIns="45720" rtlCol="0" anchor="ctr">
+          <a:bodyPr vert="horz" lIns="91440" tIns="45720" rIns="91440" bIns="45720" rtlCol="0" anchor="t">
             <a:normAutofit/>
           </a:bodyPr>
           <a:lstStyle/>
           <a:p>
-            <a:pPr marL="0" marR="0" lvl="0" indent="-228600" algn="l" defTabSz="914400" rtl="0" eaLnBrk="1" fontAlgn="auto" latinLnBrk="0" hangingPunct="1">
+            <a:pPr indent="-228600">
               <a:lnSpc>
                 <a:spcPct val="90000"/>
               </a:lnSpc>
-              <a:spcBef>
-                <a:spcPts val="0"/>
-              </a:spcBef>
               <a:spcAft>
                 <a:spcPts val="600"/>
               </a:spcAft>
-              <a:buClrTx/>
-              <a:buSzTx/>
               <a:buFont typeface="Arial" panose="020B0604020202020204" pitchFamily="34" charset="0"/>
               <a:buChar char="•"/>
-              <a:tabLst/>
               <a:defRPr/>
             </a:pPr>
             <a:r>
-              <a:rPr kumimoji="0" lang="en-US" sz="1500" b="1" i="0" u="none" strike="noStrike" kern="1200" cap="none" spc="0" normalizeH="0" baseline="0" noProof="0" dirty="0">
+              <a:rPr lang="en-IN" sz="2400" b="1" dirty="0">
+                <a:solidFill>
+                  <a:srgbClr val="0E0E0E"/>
+                </a:solidFill>
+                <a:effectLst/>
+                <a:latin typeface=".SF NS"/>
+              </a:rPr>
+              <a:t>Debt Consolidation</a:t>
+            </a:r>
+            <a:r>
+              <a:rPr lang="en-IN" sz="2400" dirty="0">
+                <a:solidFill>
+                  <a:srgbClr val="0E0E0E"/>
+                </a:solidFill>
+                <a:effectLst/>
+                <a:latin typeface=".SF NS"/>
+              </a:rPr>
+              <a:t> is the most popular purpose (</a:t>
+            </a:r>
+            <a:r>
+              <a:rPr lang="en-IN" sz="2400" b="1" dirty="0">
+                <a:solidFill>
+                  <a:srgbClr val="0E0E0E"/>
+                </a:solidFill>
+                <a:effectLst/>
+                <a:latin typeface=".SF NS"/>
+              </a:rPr>
+              <a:t>47.3% of total loans). </a:t>
+            </a:r>
+          </a:p>
+          <a:p>
+            <a:pPr indent="-228600">
+              <a:lnSpc>
+                <a:spcPct val="90000"/>
+              </a:lnSpc>
+              <a:spcAft>
+                <a:spcPts val="600"/>
+              </a:spcAft>
+              <a:buFont typeface="Arial" panose="020B0604020202020204" pitchFamily="34" charset="0"/>
+              <a:buChar char="•"/>
+              <a:defRPr/>
+            </a:pPr>
+            <a:r>
+              <a:rPr kumimoji="0" lang="en-US" sz="2200" b="0" i="0" u="none" strike="noStrike" cap="none" spc="0" normalizeH="0" baseline="0" noProof="0" dirty="0">
                 <a:ln>
                   <a:noFill/>
                 </a:ln>
-                <a:solidFill>
-                  <a:prstClr val="black"/>
-                </a:solidFill>
                 <a:effectLst/>
+                <a:highlight>
+                  <a:srgbClr val="FFFF00"/>
+                </a:highlight>
                 <a:uLnTx/>
                 <a:uFillTx/>
-                <a:latin typeface="Aptos" panose="02110004020202020204"/>
-                <a:ea typeface="+mn-ea"/>
-                <a:cs typeface="+mn-cs"/>
               </a:rPr>
-              <a:t>Observations:</a:t>
+              <a:t>Small business loans and renewable energy loans are the riskiest loans with 26.19% and 18% default rate respectively.</a:t>
             </a:r>
           </a:p>
           <a:p>
-            <a:pPr marL="285750" marR="0" lvl="0" indent="-285750" algn="l" defTabSz="914400" rtl="0" eaLnBrk="1" fontAlgn="auto" latinLnBrk="0" hangingPunct="1">
+            <a:pPr indent="-228600">
               <a:lnSpc>
                 <a:spcPct val="90000"/>
               </a:lnSpc>
-              <a:spcBef>
-                <a:spcPts val="0"/>
-              </a:spcBef>
               <a:spcAft>
                 <a:spcPts val="600"/>
               </a:spcAft>
-              <a:buClrTx/>
-              <a:buSzTx/>
               <a:buFont typeface="Arial" panose="020B0604020202020204" pitchFamily="34" charset="0"/>
               <a:buChar char="•"/>
-              <a:tabLst/>
               <a:defRPr/>
             </a:pPr>
-            <a:r>
-              <a:rPr kumimoji="0" lang="en-US" sz="1500" b="0" i="0" u="none" strike="noStrike" kern="1200" cap="none" spc="0" normalizeH="0" baseline="0" noProof="0" dirty="0">
-                <a:ln>
-                  <a:noFill/>
-                </a:ln>
-                <a:solidFill>
-                  <a:prstClr val="black"/>
-                </a:solidFill>
-                <a:effectLst/>
-                <a:uLnTx/>
-                <a:uFillTx/>
-                <a:latin typeface="Aptos" panose="02110004020202020204"/>
-                <a:ea typeface="+mn-ea"/>
-                <a:cs typeface="+mn-cs"/>
-              </a:rPr>
-              <a:t>Interest rate less than 9% has very less chances of default. Interest rates are starting from minimum 5 %.</a:t>
-            </a:r>
-          </a:p>
-          <a:p>
-            <a:pPr marL="0" marR="0" lvl="0" indent="-228600" algn="l" defTabSz="914400" rtl="0" eaLnBrk="1" fontAlgn="auto" latinLnBrk="0" hangingPunct="1">
-              <a:lnSpc>
-                <a:spcPct val="90000"/>
-              </a:lnSpc>
-              <a:spcBef>
-                <a:spcPts val="0"/>
-              </a:spcBef>
-              <a:spcAft>
-                <a:spcPts val="600"/>
-              </a:spcAft>
-              <a:buClrTx/>
-              <a:buSzTx/>
-              <a:buFont typeface="Arial" panose="020B0604020202020204" pitchFamily="34" charset="0"/>
-              <a:buChar char="•"/>
-              <a:tabLst/>
-              <a:defRPr/>
-            </a:pPr>
-            <a:r>
-              <a:rPr kumimoji="0" lang="en-US" sz="1500" b="0" i="0" u="none" strike="noStrike" kern="1200" cap="none" spc="0" normalizeH="0" baseline="0" noProof="0" dirty="0">
-                <a:ln>
-                  <a:noFill/>
-                </a:ln>
-                <a:solidFill>
-                  <a:prstClr val="black"/>
-                </a:solidFill>
-                <a:effectLst/>
-                <a:uLnTx/>
-                <a:uFillTx/>
-                <a:latin typeface="Aptos" panose="02110004020202020204"/>
-                <a:ea typeface="+mn-ea"/>
-                <a:cs typeface="+mn-cs"/>
-              </a:rPr>
-              <a:t>  Most applicants have defaulted on loans where the interest rate was more than 15%.</a:t>
-            </a:r>
-          </a:p>
-          <a:p>
-            <a:pPr marL="285750" marR="0" lvl="0" indent="-285750" algn="l" defTabSz="914400" rtl="0" eaLnBrk="1" fontAlgn="auto" latinLnBrk="0" hangingPunct="1">
-              <a:lnSpc>
-                <a:spcPct val="90000"/>
-              </a:lnSpc>
-              <a:spcBef>
-                <a:spcPts val="0"/>
-              </a:spcBef>
-              <a:spcAft>
-                <a:spcPts val="600"/>
-              </a:spcAft>
-              <a:buClrTx/>
-              <a:buSzTx/>
-              <a:buFont typeface="Arial" panose="020B0604020202020204" pitchFamily="34" charset="0"/>
-              <a:buChar char="•"/>
-              <a:tabLst/>
-              <a:defRPr/>
-            </a:pPr>
-            <a:r>
-              <a:rPr kumimoji="0" lang="en-US" sz="1500" b="0" i="0" u="none" strike="noStrike" kern="1200" cap="none" spc="0" normalizeH="0" baseline="0" noProof="0" dirty="0">
-                <a:ln>
-                  <a:noFill/>
-                </a:ln>
-                <a:solidFill>
-                  <a:prstClr val="black"/>
-                </a:solidFill>
-                <a:effectLst/>
-                <a:uLnTx/>
-                <a:uFillTx/>
-                <a:latin typeface="Aptos" panose="02110004020202020204"/>
-                <a:ea typeface="+mn-ea"/>
-                <a:cs typeface="+mn-cs"/>
-              </a:rPr>
-              <a:t>Loan default proportion increases with higher interest rates.</a:t>
-            </a:r>
-          </a:p>
-          <a:p>
-            <a:pPr marL="0" marR="0" lvl="0" indent="-228600" algn="l" defTabSz="914400" rtl="0" eaLnBrk="1" fontAlgn="auto" latinLnBrk="0" hangingPunct="1">
-              <a:lnSpc>
-                <a:spcPct val="90000"/>
-              </a:lnSpc>
-              <a:spcBef>
-                <a:spcPts val="0"/>
-              </a:spcBef>
-              <a:spcAft>
-                <a:spcPts val="600"/>
-              </a:spcAft>
-              <a:buClrTx/>
-              <a:buSzTx/>
-              <a:buFont typeface="Arial" panose="020B0604020202020204" pitchFamily="34" charset="0"/>
-              <a:buChar char="•"/>
-              <a:tabLst/>
-              <a:defRPr/>
-            </a:pPr>
-            <a:endParaRPr kumimoji="0" lang="en-US" sz="1500" b="0" i="0" u="none" strike="noStrike" kern="1200" cap="none" spc="0" normalizeH="0" baseline="0" noProof="0" dirty="0">
-              <a:ln>
-                <a:noFill/>
-              </a:ln>
-              <a:solidFill>
-                <a:prstClr val="black"/>
-              </a:solidFill>
-              <a:effectLst/>
-              <a:uLnTx/>
-              <a:uFillTx/>
-              <a:latin typeface="Aptos" panose="02110004020202020204"/>
-              <a:ea typeface="+mn-ea"/>
-              <a:cs typeface="+mn-cs"/>
-            </a:endParaRPr>
-          </a:p>
-          <a:p>
-            <a:pPr marL="0" marR="0" lvl="0" indent="-228600" algn="l" defTabSz="914400" rtl="0" eaLnBrk="1" fontAlgn="auto" latinLnBrk="0" hangingPunct="1">
-              <a:lnSpc>
-                <a:spcPct val="90000"/>
-              </a:lnSpc>
-              <a:spcBef>
-                <a:spcPts val="0"/>
-              </a:spcBef>
-              <a:spcAft>
-                <a:spcPts val="600"/>
-              </a:spcAft>
-              <a:buClrTx/>
-              <a:buSzTx/>
-              <a:buFont typeface="Arial" panose="020B0604020202020204" pitchFamily="34" charset="0"/>
-              <a:buChar char="•"/>
-              <a:tabLst/>
-              <a:defRPr/>
-            </a:pPr>
-            <a:endParaRPr kumimoji="0" lang="en-US" sz="1500" b="0" i="0" u="none" strike="noStrike" kern="1200" cap="none" spc="0" normalizeH="0" baseline="0" noProof="0" dirty="0">
-              <a:ln>
-                <a:noFill/>
-              </a:ln>
-              <a:solidFill>
-                <a:prstClr val="black"/>
-              </a:solidFill>
-              <a:effectLst/>
-              <a:uLnTx/>
-              <a:uFillTx/>
-              <a:latin typeface="Aptos" panose="02110004020202020204"/>
-              <a:ea typeface="+mn-ea"/>
-              <a:cs typeface="+mn-cs"/>
-            </a:endParaRPr>
+            <a:endParaRPr lang="en-US" sz="2200" dirty="0"/>
           </a:p>
         </p:txBody>
       </p:sp>
       <p:pic>
         <p:nvPicPr>
-          <p:cNvPr id="3" name="Picture 2">
+          <p:cNvPr id="5122" name="Picture 2">
             <a:extLst>
               <a:ext uri="{FF2B5EF4-FFF2-40B4-BE49-F238E27FC236}">
-                <a16:creationId xmlns:a16="http://schemas.microsoft.com/office/drawing/2014/main" id="{4EC983FA-6907-D811-D167-95C0F2FCCAD4}"/>
+                <a16:creationId xmlns:a16="http://schemas.microsoft.com/office/drawing/2014/main" id="{1F315E91-6693-71DB-16B2-7B9E697D14F2}"/>
               </a:ext>
             </a:extLst>
           </p:cNvPr>
           <p:cNvPicPr>
-            <a:picLocks noChangeAspect="1"/>
+            <a:picLocks noChangeAspect="1" noChangeArrowheads="1"/>
           </p:cNvPicPr>
           <p:nvPr/>
         </p:nvPicPr>
         <p:blipFill>
-          <a:blip r:embed="rId2"/>
+          <a:blip r:embed="rId2">
+            <a:extLst>
+              <a:ext uri="{28A0092B-C50C-407E-A947-70E740481C1C}">
+                <a14:useLocalDpi xmlns:a14="http://schemas.microsoft.com/office/drawing/2010/main" val="0"/>
+              </a:ext>
+            </a:extLst>
+          </a:blip>
           <a:stretch>
             <a:fillRect/>
           </a:stretch>
         </p:blipFill>
-        <p:spPr>
+        <p:spPr bwMode="auto">
           <a:xfrm>
-            <a:off x="0" y="1"/>
-            <a:ext cx="12192000" cy="4406296"/>
+            <a:off x="5411259" y="36576"/>
+            <a:ext cx="6767886" cy="6784847"/>
           </a:xfrm>
           <a:prstGeom prst="rect">
             <a:avLst/>
           </a:prstGeom>
+          <a:noFill/>
+          <a:extLst>
+            <a:ext uri="{909E8E84-426E-40DD-AFC4-6F175D3DCCD1}">
+              <a14:hiddenFill xmlns:a14="http://schemas.microsoft.com/office/drawing/2010/main">
+                <a:solidFill>
+                  <a:srgbClr val="FFFFFF"/>
+                </a:solidFill>
+              </a14:hiddenFill>
+            </a:ext>
+          </a:extLst>
         </p:spPr>
       </p:pic>
     </p:spTree>

</xml_diff>

<commit_message>
formating ppt and readme
</commit_message>
<xml_diff>
--- a/Lending Club Case Study.pptx
+++ b/Lending Club Case Study.pptx
@@ -12,10 +12,10 @@
     <p:sldId id="260" r:id="rId6"/>
     <p:sldId id="282" r:id="rId7"/>
     <p:sldId id="283" r:id="rId8"/>
-    <p:sldId id="284" r:id="rId9"/>
-    <p:sldId id="287" r:id="rId10"/>
-    <p:sldId id="285" r:id="rId11"/>
-    <p:sldId id="286" r:id="rId12"/>
+    <p:sldId id="288" r:id="rId9"/>
+    <p:sldId id="284" r:id="rId10"/>
+    <p:sldId id="287" r:id="rId11"/>
+    <p:sldId id="289" r:id="rId12"/>
     <p:sldId id="275" r:id="rId13"/>
     <p:sldId id="267" r:id="rId14"/>
   </p:sldIdLst>
@@ -2764,8 +2764,8 @@
     </dgm:pt>
   </dgm:ptLst>
   <dgm:cxnLst>
+    <dgm:cxn modelId="{EDBEB35C-BC36-423E-A7AE-EFBC96A1AC21}" srcId="{46942F89-7408-4143-A04E-2E5FCA761BB0}" destId="{70E5059F-BE4F-42AC-950E-28736A35CF35}" srcOrd="0" destOrd="0" parTransId="{4B6F9F15-5643-4F50-9123-FC2C5A628143}" sibTransId="{CDA12E66-93A4-47F4-A552-6A51DF9D11A3}"/>
     <dgm:cxn modelId="{7676A246-4A72-461E-B1F2-B9971D3A84A5}" type="presOf" srcId="{3C4CDE7B-DEAD-45A1-93CF-F457CC09E9BF}" destId="{0FF0B6D4-D5A1-4CF0-A704-F7732984552D}" srcOrd="1" destOrd="0" presId="urn:microsoft.com/office/officeart/2005/8/layout/vProcess5"/>
-    <dgm:cxn modelId="{EDBEB35C-BC36-423E-A7AE-EFBC96A1AC21}" srcId="{46942F89-7408-4143-A04E-2E5FCA761BB0}" destId="{70E5059F-BE4F-42AC-950E-28736A35CF35}" srcOrd="0" destOrd="0" parTransId="{4B6F9F15-5643-4F50-9123-FC2C5A628143}" sibTransId="{CDA12E66-93A4-47F4-A552-6A51DF9D11A3}"/>
     <dgm:cxn modelId="{BE7D00A8-C92D-4BA1-BC65-D93A442F8967}" type="presOf" srcId="{CDA12E66-93A4-47F4-A552-6A51DF9D11A3}" destId="{03A4F8E2-501E-4B19-B2FF-2BC6A48319E0}" srcOrd="0" destOrd="0" presId="urn:microsoft.com/office/officeart/2005/8/layout/vProcess5"/>
     <dgm:cxn modelId="{D9A193AC-B630-4CD6-905E-32DEA596B942}" srcId="{46942F89-7408-4143-A04E-2E5FCA761BB0}" destId="{3C4CDE7B-DEAD-45A1-93CF-F457CC09E9BF}" srcOrd="1" destOrd="0" parTransId="{00D80EAC-CAC9-4A51-A341-55442D134721}" sibTransId="{F7283870-52F6-479E-9FAF-83E32F6A9453}"/>
     <dgm:cxn modelId="{8A71A7E0-3199-4C31-B928-D70965989316}" type="presOf" srcId="{70E5059F-BE4F-42AC-950E-28736A35CF35}" destId="{A5E2B134-293F-437C-9FC5-18E7DA905CBB}" srcOrd="0" destOrd="0" presId="urn:microsoft.com/office/officeart/2005/8/layout/vProcess5"/>
@@ -3249,12 +3249,12 @@
     <dgm:cxn modelId="{25C7EF26-C808-4D3A-A29E-498FD7D9EA5B}" type="presOf" srcId="{F27BB194-C5A6-485F-B7B2-1045249D6FA8}" destId="{764C10EB-98B1-460A-9F00-441B3C676616}" srcOrd="0" destOrd="0" presId="urn:microsoft.com/office/officeart/2016/7/layout/RepeatingBendingProcessNew"/>
     <dgm:cxn modelId="{8966D327-A017-4E14-B0FA-CBACE4F95D92}" type="presOf" srcId="{9B368393-1B97-4AC5-841C-60BD6C66D4A4}" destId="{F349DA9B-9599-45E1-B864-C4DFE5087D4F}" srcOrd="1" destOrd="0" presId="urn:microsoft.com/office/officeart/2016/7/layout/RepeatingBendingProcessNew"/>
     <dgm:cxn modelId="{CBC6E739-30BD-4D3A-8F77-3B6BA32A5217}" srcId="{E82AF63D-4D60-4DAE-905F-D29CD31363C8}" destId="{4129CFBD-3D5A-4926-9E7B-DA65E818255F}" srcOrd="2" destOrd="0" parTransId="{2825E212-48ED-4179-A1B1-D1B0243F4361}" sibTransId="{86E4539D-8FEE-456B-9871-6F846FACFD52}"/>
+    <dgm:cxn modelId="{6E7B8E5C-9F27-4F58-B12B-206C8F478CEA}" type="presOf" srcId="{04FAC872-8DFE-4CB1-AB5E-1AB213161C7A}" destId="{44307A02-BAAC-43C9-A936-3C8FE70902BC}" srcOrd="0" destOrd="2" presId="urn:microsoft.com/office/officeart/2016/7/layout/RepeatingBendingProcessNew"/>
     <dgm:cxn modelId="{FBEFC041-584E-4884-95A2-A09864B4B385}" type="presOf" srcId="{F27BB194-C5A6-485F-B7B2-1045249D6FA8}" destId="{100659C1-7284-44CA-951C-82836D94A6E5}" srcOrd="1" destOrd="0" presId="urn:microsoft.com/office/officeart/2016/7/layout/RepeatingBendingProcessNew"/>
+    <dgm:cxn modelId="{A30C4666-B197-4174-A6A2-D4FCC13162B5}" type="presOf" srcId="{1FA136F0-C748-47AE-A148-5F27844DCEBE}" destId="{80488D83-6EA4-452D-88B5-AFEDE4919FF0}" srcOrd="0" destOrd="0" presId="urn:microsoft.com/office/officeart/2016/7/layout/RepeatingBendingProcessNew"/>
     <dgm:cxn modelId="{7F19264C-9FBB-4B38-B217-7DB33474931D}" type="presOf" srcId="{F620FAB2-DE09-4CBF-98BF-475A77F3EC57}" destId="{6E71D10D-8AA0-4210-9CB5-56A018C37844}" srcOrd="1" destOrd="0" presId="urn:microsoft.com/office/officeart/2016/7/layout/RepeatingBendingProcessNew"/>
     <dgm:cxn modelId="{D2E65650-8615-42F6-9DF3-D737A8F24B0C}" type="presOf" srcId="{4129CFBD-3D5A-4926-9E7B-DA65E818255F}" destId="{44307A02-BAAC-43C9-A936-3C8FE70902BC}" srcOrd="0" destOrd="3" presId="urn:microsoft.com/office/officeart/2016/7/layout/RepeatingBendingProcessNew"/>
     <dgm:cxn modelId="{597BD752-1628-4EE1-BA4D-1CFB9380D660}" type="presOf" srcId="{E82AF63D-4D60-4DAE-905F-D29CD31363C8}" destId="{44307A02-BAAC-43C9-A936-3C8FE70902BC}" srcOrd="0" destOrd="0" presId="urn:microsoft.com/office/officeart/2016/7/layout/RepeatingBendingProcessNew"/>
-    <dgm:cxn modelId="{6E7B8E5C-9F27-4F58-B12B-206C8F478CEA}" type="presOf" srcId="{04FAC872-8DFE-4CB1-AB5E-1AB213161C7A}" destId="{44307A02-BAAC-43C9-A936-3C8FE70902BC}" srcOrd="0" destOrd="2" presId="urn:microsoft.com/office/officeart/2016/7/layout/RepeatingBendingProcessNew"/>
-    <dgm:cxn modelId="{A30C4666-B197-4174-A6A2-D4FCC13162B5}" type="presOf" srcId="{1FA136F0-C748-47AE-A148-5F27844DCEBE}" destId="{80488D83-6EA4-452D-88B5-AFEDE4919FF0}" srcOrd="0" destOrd="0" presId="urn:microsoft.com/office/officeart/2016/7/layout/RepeatingBendingProcessNew"/>
     <dgm:cxn modelId="{8DE3C978-FF78-4323-A640-824CAF750103}" type="presOf" srcId="{BB4EBCED-A00F-47C2-ADDD-DB7EA0453683}" destId="{FF55B818-920F-46BF-A11E-619B21BC9DB4}" srcOrd="0" destOrd="0" presId="urn:microsoft.com/office/officeart/2016/7/layout/RepeatingBendingProcessNew"/>
     <dgm:cxn modelId="{3E550879-5B01-4DB3-A3C0-07C462790425}" type="presOf" srcId="{BAFB70B2-D29F-459F-BCE8-F58247016A59}" destId="{44307A02-BAAC-43C9-A936-3C8FE70902BC}" srcOrd="0" destOrd="1" presId="urn:microsoft.com/office/officeart/2016/7/layout/RepeatingBendingProcessNew"/>
     <dgm:cxn modelId="{43F39680-C811-4623-B6DE-66200B8901EE}" type="presOf" srcId="{084F3510-B883-4378-AA67-8E9B243BDFE8}" destId="{27D2CF87-7972-4C41-8E90-81554A6B0D6D}" srcOrd="0" destOrd="0" presId="urn:microsoft.com/office/officeart/2016/7/layout/RepeatingBendingProcessNew"/>
@@ -3666,12 +3666,12 @@
   <dgm:cxnLst>
     <dgm:cxn modelId="{8D70A43D-8FFF-493E-A5DC-A5A96C5ECFCB}" srcId="{FDEADEFB-3108-4D39-A68E-B73CF1DD7101}" destId="{826B85A4-4088-4D2D-9EAE-47BCA1002C8D}" srcOrd="6" destOrd="0" parTransId="{8CDC87FD-CD92-4A39-BA00-225AD67275A9}" sibTransId="{74A0AE8C-6714-4C90-B392-3245DC99E599}"/>
     <dgm:cxn modelId="{BD0E9B43-FCF4-41B6-BB7D-D61B5FBA65A0}" srcId="{FDEADEFB-3108-4D39-A68E-B73CF1DD7101}" destId="{D7203C3C-ABF3-4280-B55B-9691A4796D67}" srcOrd="1" destOrd="0" parTransId="{11318669-9E14-48C6-AC27-1D87620E4633}" sibTransId="{71B6CC12-E636-4B16-9501-2C5C15AD1EC1}"/>
+    <dgm:cxn modelId="{7A8FFE66-DFE0-48A7-BE74-EB1EB88788FB}" srcId="{FDEADEFB-3108-4D39-A68E-B73CF1DD7101}" destId="{0490B504-3B2D-4673-BF3F-2534905C3FE6}" srcOrd="0" destOrd="0" parTransId="{767800B4-51C8-4A31-837D-B687470A329B}" sibTransId="{2CECAB72-49B0-46C2-9BC3-784541449D0E}"/>
+    <dgm:cxn modelId="{2730BF68-3F76-43BD-8B20-951225939A0C}" srcId="{FDEADEFB-3108-4D39-A68E-B73CF1DD7101}" destId="{1F24A6A8-50A1-4D68-8FD9-D8AF9FD6593E}" srcOrd="3" destOrd="0" parTransId="{094EEE90-ADA2-4387-BB76-F03FC5E397F9}" sibTransId="{38039BFD-78C7-4BF2-8181-54484D8D3CD2}"/>
     <dgm:cxn modelId="{473B654B-4AD6-4C83-9883-31B4CA25084B}" type="presOf" srcId="{A1450AEC-5BEA-4458-9763-94D6A5963846}" destId="{119EE1E9-A66E-4A8F-9043-595DFF0FFFFE}" srcOrd="0" destOrd="0" presId="urn:microsoft.com/office/officeart/2005/8/layout/vList2"/>
     <dgm:cxn modelId="{47ABBF4F-1655-4858-9FC6-D0EE6DA47295}" type="presOf" srcId="{1F24A6A8-50A1-4D68-8FD9-D8AF9FD6593E}" destId="{7A6CEEBF-6134-43DD-8D10-4C1F2988559A}" srcOrd="0" destOrd="0" presId="urn:microsoft.com/office/officeart/2005/8/layout/vList2"/>
     <dgm:cxn modelId="{DC886E52-3EDF-41DB-88CC-EBFB22CE2FA9}" srcId="{FDEADEFB-3108-4D39-A68E-B73CF1DD7101}" destId="{CC91DEB0-66D2-442A-8096-15F4AB7361BA}" srcOrd="2" destOrd="0" parTransId="{6F7330B0-B824-4573-A33B-BF94FC8E0AA6}" sibTransId="{C025D44F-9549-48EC-A42C-E489CD58E0B0}"/>
     <dgm:cxn modelId="{B2AD0F55-35C7-4A38-B6EE-760DAEA08975}" srcId="{FDEADEFB-3108-4D39-A68E-B73CF1DD7101}" destId="{F1ECB717-3901-4630-A9EA-BF84630F1253}" srcOrd="5" destOrd="0" parTransId="{37129F61-FF6A-433C-AB5A-DB0A88F5AA8C}" sibTransId="{EB7E1D43-F769-48D0-9EF1-9E47D78EC194}"/>
-    <dgm:cxn modelId="{7A8FFE66-DFE0-48A7-BE74-EB1EB88788FB}" srcId="{FDEADEFB-3108-4D39-A68E-B73CF1DD7101}" destId="{0490B504-3B2D-4673-BF3F-2534905C3FE6}" srcOrd="0" destOrd="0" parTransId="{767800B4-51C8-4A31-837D-B687470A329B}" sibTransId="{2CECAB72-49B0-46C2-9BC3-784541449D0E}"/>
-    <dgm:cxn modelId="{2730BF68-3F76-43BD-8B20-951225939A0C}" srcId="{FDEADEFB-3108-4D39-A68E-B73CF1DD7101}" destId="{1F24A6A8-50A1-4D68-8FD9-D8AF9FD6593E}" srcOrd="3" destOrd="0" parTransId="{094EEE90-ADA2-4387-BB76-F03FC5E397F9}" sibTransId="{38039BFD-78C7-4BF2-8181-54484D8D3CD2}"/>
     <dgm:cxn modelId="{7FD9E58D-248E-4DC1-BC04-D9F6E4874F65}" type="presOf" srcId="{FDEADEFB-3108-4D39-A68E-B73CF1DD7101}" destId="{57950189-7760-452B-A1A5-336FE40175E1}" srcOrd="0" destOrd="0" presId="urn:microsoft.com/office/officeart/2005/8/layout/vList2"/>
     <dgm:cxn modelId="{A1AECE93-0545-4BE8-A56F-DDCF00BDF3E4}" type="presOf" srcId="{CC91DEB0-66D2-442A-8096-15F4AB7361BA}" destId="{831CE515-3AAA-4D0E-BC15-F133498C8322}" srcOrd="0" destOrd="0" presId="urn:microsoft.com/office/officeart/2005/8/layout/vList2"/>
     <dgm:cxn modelId="{29A18EA9-802C-41F8-9FDF-2D4BBEDAE4EA}" type="presOf" srcId="{F1ECB717-3901-4630-A9EA-BF84630F1253}" destId="{0BFE404D-0655-4872-9BB1-92F347D9E73C}" srcOrd="0" destOrd="0" presId="urn:microsoft.com/office/officeart/2005/8/layout/vList2"/>
@@ -3799,7 +3799,7 @@
       </dsp:nvSpPr>
       <dsp:spPr>
         <a:xfrm>
-          <a:off x="1577340" y="2393235"/>
+          <a:off x="1577339" y="2393235"/>
           <a:ext cx="8938260" cy="1958102"/>
         </a:xfrm>
         <a:prstGeom prst="roundRect">
@@ -3809,7 +3809,7 @@
         </a:prstGeom>
         <a:solidFill>
           <a:schemeClr val="accent2">
-            <a:hueOff val="6443612"/>
+            <a:hueOff val="6443614"/>
             <a:satOff val="-18493"/>
             <a:lumOff val="-29609"/>
             <a:alphaOff val="0"/>
@@ -3892,7 +3892,7 @@
         </a:p>
       </dsp:txBody>
       <dsp:txXfrm>
-        <a:off x="1634691" y="2450586"/>
+        <a:off x="1634690" y="2450586"/>
         <a:ext cx="5973451" cy="1843400"/>
       </dsp:txXfrm>
     </dsp:sp>
@@ -5038,7 +5038,7 @@
         </a:prstGeom>
         <a:solidFill>
           <a:schemeClr val="accent2">
-            <a:hueOff val="1073935"/>
+            <a:hueOff val="1073936"/>
             <a:satOff val="-3082"/>
             <a:lumOff val="-4935"/>
             <a:alphaOff val="0"/>
@@ -5194,7 +5194,7 @@
         </a:prstGeom>
         <a:solidFill>
           <a:schemeClr val="accent2">
-            <a:hueOff val="3221806"/>
+            <a:hueOff val="3221807"/>
             <a:satOff val="-9246"/>
             <a:lumOff val="-14805"/>
             <a:alphaOff val="0"/>
@@ -5264,7 +5264,7 @@
       </dsp:nvSpPr>
       <dsp:spPr>
         <a:xfrm>
-          <a:off x="0" y="3192128"/>
+          <a:off x="0" y="3192129"/>
           <a:ext cx="5257800" cy="712530"/>
         </a:xfrm>
         <a:prstGeom prst="roundRect">
@@ -5272,7 +5272,7 @@
         </a:prstGeom>
         <a:solidFill>
           <a:schemeClr val="accent2">
-            <a:hueOff val="4295742"/>
+            <a:hueOff val="4295743"/>
             <a:satOff val="-12329"/>
             <a:lumOff val="-19739"/>
             <a:alphaOff val="0"/>
@@ -5331,7 +5331,7 @@
         </a:p>
       </dsp:txBody>
       <dsp:txXfrm>
-        <a:off x="34783" y="3226911"/>
+        <a:off x="34783" y="3226912"/>
         <a:ext cx="5188234" cy="642964"/>
       </dsp:txXfrm>
     </dsp:sp>
@@ -5342,7 +5342,7 @@
       </dsp:nvSpPr>
       <dsp:spPr>
         <a:xfrm>
-          <a:off x="0" y="3988178"/>
+          <a:off x="0" y="3988179"/>
           <a:ext cx="5257800" cy="712530"/>
         </a:xfrm>
         <a:prstGeom prst="roundRect">
@@ -5350,7 +5350,7 @@
         </a:prstGeom>
         <a:solidFill>
           <a:schemeClr val="accent2">
-            <a:hueOff val="5369677"/>
+            <a:hueOff val="5369678"/>
             <a:satOff val="-15411"/>
             <a:lumOff val="-24674"/>
             <a:alphaOff val="0"/>
@@ -5409,7 +5409,7 @@
         </a:p>
       </dsp:txBody>
       <dsp:txXfrm>
-        <a:off x="34783" y="4022961"/>
+        <a:off x="34783" y="4022962"/>
         <a:ext cx="5188234" cy="642964"/>
       </dsp:txXfrm>
     </dsp:sp>
@@ -5428,7 +5428,7 @@
         </a:prstGeom>
         <a:solidFill>
           <a:schemeClr val="accent2">
-            <a:hueOff val="6443612"/>
+            <a:hueOff val="6443614"/>
             <a:satOff val="-18493"/>
             <a:lumOff val="-29609"/>
             <a:alphaOff val="0"/>
@@ -10329,7 +10329,7 @@
           <a:p>
             <a:fld id="{09DB4100-8DFC-4BC4-A1F4-D7F8BEC7BC16}" type="datetimeFigureOut">
               <a:rPr lang="en-US" smtClean="0"/>
-              <a:t>8/21/24</a:t>
+              <a:t>8/21/2024</a:t>
             </a:fld>
             <a:endParaRPr lang="en-US"/>
           </a:p>
@@ -10527,7 +10527,7 @@
           <a:p>
             <a:fld id="{09DB4100-8DFC-4BC4-A1F4-D7F8BEC7BC16}" type="datetimeFigureOut">
               <a:rPr lang="en-US" smtClean="0"/>
-              <a:t>8/21/24</a:t>
+              <a:t>8/21/2024</a:t>
             </a:fld>
             <a:endParaRPr lang="en-US"/>
           </a:p>
@@ -10735,7 +10735,7 @@
           <a:p>
             <a:fld id="{09DB4100-8DFC-4BC4-A1F4-D7F8BEC7BC16}" type="datetimeFigureOut">
               <a:rPr lang="en-US" smtClean="0"/>
-              <a:t>8/21/24</a:t>
+              <a:t>8/21/2024</a:t>
             </a:fld>
             <a:endParaRPr lang="en-US"/>
           </a:p>
@@ -10933,7 +10933,7 @@
           <a:p>
             <a:fld id="{09DB4100-8DFC-4BC4-A1F4-D7F8BEC7BC16}" type="datetimeFigureOut">
               <a:rPr lang="en-US" smtClean="0"/>
-              <a:t>8/21/24</a:t>
+              <a:t>8/21/2024</a:t>
             </a:fld>
             <a:endParaRPr lang="en-US"/>
           </a:p>
@@ -11208,7 +11208,7 @@
           <a:p>
             <a:fld id="{09DB4100-8DFC-4BC4-A1F4-D7F8BEC7BC16}" type="datetimeFigureOut">
               <a:rPr lang="en-US" smtClean="0"/>
-              <a:t>8/21/24</a:t>
+              <a:t>8/21/2024</a:t>
             </a:fld>
             <a:endParaRPr lang="en-US"/>
           </a:p>
@@ -11473,7 +11473,7 @@
           <a:p>
             <a:fld id="{09DB4100-8DFC-4BC4-A1F4-D7F8BEC7BC16}" type="datetimeFigureOut">
               <a:rPr lang="en-US" smtClean="0"/>
-              <a:t>8/21/24</a:t>
+              <a:t>8/21/2024</a:t>
             </a:fld>
             <a:endParaRPr lang="en-US"/>
           </a:p>
@@ -11885,7 +11885,7 @@
           <a:p>
             <a:fld id="{09DB4100-8DFC-4BC4-A1F4-D7F8BEC7BC16}" type="datetimeFigureOut">
               <a:rPr lang="en-US" smtClean="0"/>
-              <a:t>8/21/24</a:t>
+              <a:t>8/21/2024</a:t>
             </a:fld>
             <a:endParaRPr lang="en-US"/>
           </a:p>
@@ -12026,7 +12026,7 @@
           <a:p>
             <a:fld id="{09DB4100-8DFC-4BC4-A1F4-D7F8BEC7BC16}" type="datetimeFigureOut">
               <a:rPr lang="en-US" smtClean="0"/>
-              <a:t>8/21/24</a:t>
+              <a:t>8/21/2024</a:t>
             </a:fld>
             <a:endParaRPr lang="en-US"/>
           </a:p>
@@ -12139,7 +12139,7 @@
           <a:p>
             <a:fld id="{09DB4100-8DFC-4BC4-A1F4-D7F8BEC7BC16}" type="datetimeFigureOut">
               <a:rPr lang="en-US" smtClean="0"/>
-              <a:t>8/21/24</a:t>
+              <a:t>8/21/2024</a:t>
             </a:fld>
             <a:endParaRPr lang="en-US"/>
           </a:p>
@@ -12450,7 +12450,7 @@
           <a:p>
             <a:fld id="{09DB4100-8DFC-4BC4-A1F4-D7F8BEC7BC16}" type="datetimeFigureOut">
               <a:rPr lang="en-US" smtClean="0"/>
-              <a:t>8/21/24</a:t>
+              <a:t>8/21/2024</a:t>
             </a:fld>
             <a:endParaRPr lang="en-US"/>
           </a:p>
@@ -12738,7 +12738,7 @@
           <a:p>
             <a:fld id="{09DB4100-8DFC-4BC4-A1F4-D7F8BEC7BC16}" type="datetimeFigureOut">
               <a:rPr lang="en-US" smtClean="0"/>
-              <a:t>8/21/24</a:t>
+              <a:t>8/21/2024</a:t>
             </a:fld>
             <a:endParaRPr lang="en-US"/>
           </a:p>
@@ -12979,7 +12979,7 @@
           <a:p>
             <a:fld id="{09DB4100-8DFC-4BC4-A1F4-D7F8BEC7BC16}" type="datetimeFigureOut">
               <a:rPr lang="en-US" smtClean="0"/>
-              <a:t>8/21/24</a:t>
+              <a:t>8/21/2024</a:t>
             </a:fld>
             <a:endParaRPr lang="en-US"/>
           </a:p>
@@ -13801,7 +13801,7 @@
         <p:cNvPr id="1" name="">
           <a:extLst>
             <a:ext uri="{FF2B5EF4-FFF2-40B4-BE49-F238E27FC236}">
-              <a16:creationId xmlns:a16="http://schemas.microsoft.com/office/drawing/2014/main" id="{CE0D9ACD-2D4D-C9A9-E655-8A66E5DA200D}"/>
+              <a16:creationId xmlns:a16="http://schemas.microsoft.com/office/drawing/2014/main" id="{8119757D-EA40-4809-AABF-217776FCED82}"/>
             </a:ext>
           </a:extLst>
         </p:cNvPr>
@@ -13818,10 +13818,10 @@
       </p:grpSpPr>
       <p:sp useBgFill="1">
         <p:nvSpPr>
-          <p:cNvPr id="73" name="Rectangle 72">
+          <p:cNvPr id="5127" name="Rectangle 5126">
             <a:extLst>
               <a:ext uri="{FF2B5EF4-FFF2-40B4-BE49-F238E27FC236}">
-                <a16:creationId xmlns:a16="http://schemas.microsoft.com/office/drawing/2014/main" id="{1F6A05AA-BE5F-26AE-BBC9-D3B009E01BEF}"/>
+                <a16:creationId xmlns:a16="http://schemas.microsoft.com/office/drawing/2014/main" id="{743AA782-23D1-4521-8CAD-47662984AA08}"/>
               </a:ext>
               <a:ext uri="{C183D7F6-B498-43B3-948B-1728B52AA6E4}">
                 <adec:decorative xmlns:adec="http://schemas.microsoft.com/office/drawing/2017/decorative" val="1"/>
@@ -13842,7 +13842,7 @@
         <p:spPr>
           <a:xfrm>
             <a:off x="0" y="0"/>
-            <a:ext cx="12188952" cy="6858000"/>
+            <a:ext cx="12192000" cy="6858000"/>
           </a:xfrm>
           <a:prstGeom prst="rect">
             <a:avLst/>
@@ -13871,37 +13871,8 @@
           <a:bodyPr rtlCol="0" anchor="ctr"/>
           <a:lstStyle/>
           <a:p>
-            <a:pPr marL="0" marR="0" lvl="0" indent="0" algn="ctr" defTabSz="914400" rtl="0" eaLnBrk="1" fontAlgn="auto" latinLnBrk="0" hangingPunct="1">
-              <a:lnSpc>
-                <a:spcPct val="100000"/>
-              </a:lnSpc>
-              <a:spcBef>
-                <a:spcPts val="0"/>
-              </a:spcBef>
-              <a:spcAft>
-                <a:spcPts val="0"/>
-              </a:spcAft>
-              <a:buClrTx/>
-              <a:buSzTx/>
-              <a:buFontTx/>
-              <a:buNone/>
-              <a:tabLst/>
-              <a:defRPr/>
-            </a:pPr>
-            <a:endParaRPr kumimoji="0" lang="en-US" sz="1800" b="0" i="0" u="none" strike="noStrike" kern="1200" cap="none" spc="0" normalizeH="0" baseline="0" noProof="0">
-              <a:ln>
-                <a:noFill/>
-              </a:ln>
-              <a:solidFill>
-                <a:prstClr val="white"/>
-              </a:solidFill>
-              <a:effectLst/>
-              <a:uLnTx/>
-              <a:uFillTx/>
-              <a:latin typeface="Aptos" panose="02110004020202020204"/>
-              <a:ea typeface="+mn-ea"/>
-              <a:cs typeface="+mn-cs"/>
-            </a:endParaRPr>
+            <a:pPr algn="ctr"/>
+            <a:endParaRPr lang="en-US"/>
           </a:p>
         </p:txBody>
       </p:sp>
@@ -13910,7 +13881,7 @@
           <p:cNvPr id="2" name="Title 1">
             <a:extLst>
               <a:ext uri="{FF2B5EF4-FFF2-40B4-BE49-F238E27FC236}">
-                <a16:creationId xmlns:a16="http://schemas.microsoft.com/office/drawing/2014/main" id="{8B524C9B-C0F8-08BE-4E44-93221B1C0042}"/>
+                <a16:creationId xmlns:a16="http://schemas.microsoft.com/office/drawing/2014/main" id="{3D666607-90A0-49B0-DCA0-59012F1CD272}"/>
               </a:ext>
             </a:extLst>
           </p:cNvPr>
@@ -13923,30 +13894,37 @@
         </p:nvSpPr>
         <p:spPr>
           <a:xfrm>
-            <a:off x="173033" y="4735793"/>
-            <a:ext cx="4703767" cy="1343157"/>
+            <a:off x="154745" y="640080"/>
+            <a:ext cx="5295079" cy="1481328"/>
           </a:xfrm>
         </p:spPr>
         <p:txBody>
-          <a:bodyPr vert="horz" lIns="91440" tIns="45720" rIns="91440" bIns="45720" rtlCol="0" anchor="ctr">
+          <a:bodyPr vert="horz" lIns="91440" tIns="45720" rIns="91440" bIns="45720" rtlCol="0" anchor="b">
             <a:normAutofit fontScale="90000"/>
           </a:bodyPr>
           <a:lstStyle/>
           <a:p>
-            <a:pPr lvl="0"/>
             <a:r>
               <a:rPr lang="en-US" sz="5400" dirty="0"/>
               <a:t>Public record for bankruptcies.</a:t>
             </a:r>
+            <a:endParaRPr lang="en-US" sz="5400" kern="1200" dirty="0">
+              <a:solidFill>
+                <a:schemeClr val="tx1"/>
+              </a:solidFill>
+              <a:latin typeface="+mj-lt"/>
+              <a:ea typeface="+mj-ea"/>
+              <a:cs typeface="+mj-cs"/>
+            </a:endParaRPr>
           </a:p>
         </p:txBody>
       </p:sp>
       <p:sp>
         <p:nvSpPr>
-          <p:cNvPr id="72" name="sketchy line">
+          <p:cNvPr id="5129" name="sketch line">
             <a:extLst>
               <a:ext uri="{FF2B5EF4-FFF2-40B4-BE49-F238E27FC236}">
-                <a16:creationId xmlns:a16="http://schemas.microsoft.com/office/drawing/2014/main" id="{D70CAC13-7274-8A80-84FC-ED10B1FAAB87}"/>
+                <a16:creationId xmlns:a16="http://schemas.microsoft.com/office/drawing/2014/main" id="{650D18FE-0824-4A46-B22C-A86B52E5780A}"/>
               </a:ext>
               <a:ext uri="{C183D7F6-B498-43B3-948B-1728B52AA6E4}">
                 <adec:decorative xmlns:adec="http://schemas.microsoft.com/office/drawing/2017/decorative" val="1"/>
@@ -13965,31 +13943,37 @@
           </p:nvPr>
         </p:nvSpPr>
         <p:spPr>
-          <a:xfrm rot="5400000">
-            <a:off x="4337304" y="5292566"/>
-            <a:ext cx="1554480" cy="18288"/>
+          <a:xfrm>
+            <a:off x="643278" y="2372868"/>
+            <a:ext cx="3255095" cy="18288"/>
           </a:xfrm>
           <a:custGeom>
             <a:avLst/>
             <a:gdLst>
-              <a:gd name="connsiteX0" fmla="*/ 0 w 1554480"/>
+              <a:gd name="connsiteX0" fmla="*/ 0 w 3255095"/>
               <a:gd name="connsiteY0" fmla="*/ 0 h 18288"/>
-              <a:gd name="connsiteX1" fmla="*/ 549250 w 1554480"/>
+              <a:gd name="connsiteX1" fmla="*/ 618468 w 3255095"/>
               <a:gd name="connsiteY1" fmla="*/ 0 h 18288"/>
-              <a:gd name="connsiteX2" fmla="*/ 1082954 w 1554480"/>
+              <a:gd name="connsiteX2" fmla="*/ 1269487 w 3255095"/>
               <a:gd name="connsiteY2" fmla="*/ 0 h 18288"/>
-              <a:gd name="connsiteX3" fmla="*/ 1554480 w 1554480"/>
+              <a:gd name="connsiteX3" fmla="*/ 1953057 w 3255095"/>
               <a:gd name="connsiteY3" fmla="*/ 0 h 18288"/>
-              <a:gd name="connsiteX4" fmla="*/ 1554480 w 1554480"/>
-              <a:gd name="connsiteY4" fmla="*/ 18288 h 18288"/>
-              <a:gd name="connsiteX5" fmla="*/ 1067410 w 1554480"/>
-              <a:gd name="connsiteY5" fmla="*/ 18288 h 18288"/>
-              <a:gd name="connsiteX6" fmla="*/ 549250 w 1554480"/>
+              <a:gd name="connsiteX4" fmla="*/ 2636627 w 3255095"/>
+              <a:gd name="connsiteY4" fmla="*/ 0 h 18288"/>
+              <a:gd name="connsiteX5" fmla="*/ 3255095 w 3255095"/>
+              <a:gd name="connsiteY5" fmla="*/ 0 h 18288"/>
+              <a:gd name="connsiteX6" fmla="*/ 3255095 w 3255095"/>
               <a:gd name="connsiteY6" fmla="*/ 18288 h 18288"/>
-              <a:gd name="connsiteX7" fmla="*/ 0 w 1554480"/>
+              <a:gd name="connsiteX7" fmla="*/ 2538974 w 3255095"/>
               <a:gd name="connsiteY7" fmla="*/ 18288 h 18288"/>
-              <a:gd name="connsiteX8" fmla="*/ 0 w 1554480"/>
-              <a:gd name="connsiteY8" fmla="*/ 0 h 18288"/>
+              <a:gd name="connsiteX8" fmla="*/ 1822853 w 3255095"/>
+              <a:gd name="connsiteY8" fmla="*/ 18288 h 18288"/>
+              <a:gd name="connsiteX9" fmla="*/ 1171834 w 3255095"/>
+              <a:gd name="connsiteY9" fmla="*/ 18288 h 18288"/>
+              <a:gd name="connsiteX10" fmla="*/ 0 w 3255095"/>
+              <a:gd name="connsiteY10" fmla="*/ 18288 h 18288"/>
+              <a:gd name="connsiteX11" fmla="*/ 0 w 3255095"/>
+              <a:gd name="connsiteY11" fmla="*/ 0 h 18288"/>
             </a:gdLst>
             <a:ahLst/>
             <a:cxnLst>
@@ -14020,97 +14004,141 @@
               <a:cxn ang="0">
                 <a:pos x="connsiteX8" y="connsiteY8"/>
               </a:cxn>
+              <a:cxn ang="0">
+                <a:pos x="connsiteX9" y="connsiteY9"/>
+              </a:cxn>
+              <a:cxn ang="0">
+                <a:pos x="connsiteX10" y="connsiteY10"/>
+              </a:cxn>
+              <a:cxn ang="0">
+                <a:pos x="connsiteX11" y="connsiteY11"/>
+              </a:cxn>
             </a:cxnLst>
             <a:rect l="l" t="t" r="r" b="b"/>
             <a:pathLst>
-              <a:path w="1554480" h="18288" fill="none" extrusionOk="0">
+              <a:path w="3255095" h="18288" fill="none" extrusionOk="0">
                 <a:moveTo>
                   <a:pt x="0" y="0"/>
                 </a:moveTo>
                 <a:cubicBezTo>
-                  <a:pt x="114141" y="-19864"/>
-                  <a:pt x="345055" y="-1657"/>
-                  <a:pt x="549250" y="0"/>
+                  <a:pt x="240201" y="-22123"/>
+                  <a:pt x="462021" y="-19623"/>
+                  <a:pt x="618468" y="0"/>
                 </a:cubicBezTo>
                 <a:cubicBezTo>
-                  <a:pt x="753445" y="1657"/>
-                  <a:pt x="862292" y="-5674"/>
-                  <a:pt x="1082954" y="0"/>
+                  <a:pt x="774915" y="19623"/>
+                  <a:pt x="974734" y="2035"/>
+                  <a:pt x="1269487" y="0"/>
                 </a:cubicBezTo>
                 <a:cubicBezTo>
-                  <a:pt x="1303616" y="5674"/>
-                  <a:pt x="1363530" y="4537"/>
-                  <a:pt x="1554480" y="0"/>
+                  <a:pt x="1564240" y="-2035"/>
+                  <a:pt x="1733579" y="10639"/>
+                  <a:pt x="1953057" y="0"/>
                 </a:cubicBezTo>
                 <a:cubicBezTo>
-                  <a:pt x="1554963" y="7176"/>
-                  <a:pt x="1553909" y="13682"/>
-                  <a:pt x="1554480" y="18288"/>
+                  <a:pt x="2172535" y="-10639"/>
+                  <a:pt x="2453962" y="14018"/>
+                  <a:pt x="2636627" y="0"/>
                 </a:cubicBezTo>
                 <a:cubicBezTo>
-                  <a:pt x="1338847" y="6127"/>
-                  <a:pt x="1215066" y="37851"/>
-                  <a:pt x="1067410" y="18288"/>
+                  <a:pt x="2819292" y="-14018"/>
+                  <a:pt x="3121375" y="5399"/>
+                  <a:pt x="3255095" y="0"/>
                 </a:cubicBezTo>
                 <a:cubicBezTo>
-                  <a:pt x="919754" y="-1275"/>
-                  <a:pt x="800465" y="3080"/>
-                  <a:pt x="549250" y="18288"/>
+                  <a:pt x="3254386" y="8157"/>
+                  <a:pt x="3254682" y="12125"/>
+                  <a:pt x="3255095" y="18288"/>
                 </a:cubicBezTo>
                 <a:cubicBezTo>
-                  <a:pt x="298035" y="33496"/>
-                  <a:pt x="158868" y="22769"/>
+                  <a:pt x="3088545" y="23203"/>
+                  <a:pt x="2687475" y="7419"/>
+                  <a:pt x="2538974" y="18288"/>
+                </a:cubicBezTo>
+                <a:cubicBezTo>
+                  <a:pt x="2390473" y="29157"/>
+                  <a:pt x="2137381" y="-8959"/>
+                  <a:pt x="1822853" y="18288"/>
+                </a:cubicBezTo>
+                <a:cubicBezTo>
+                  <a:pt x="1508325" y="45535"/>
+                  <a:pt x="1466437" y="20385"/>
+                  <a:pt x="1171834" y="18288"/>
+                </a:cubicBezTo>
+                <a:cubicBezTo>
+                  <a:pt x="877231" y="16191"/>
+                  <a:pt x="561097" y="37643"/>
                   <a:pt x="0" y="18288"/>
                 </a:cubicBezTo>
                 <a:cubicBezTo>
-                  <a:pt x="-655" y="13237"/>
-                  <a:pt x="709" y="4645"/>
+                  <a:pt x="-46" y="12483"/>
+                  <a:pt x="-203" y="6491"/>
                   <a:pt x="0" y="0"/>
                 </a:cubicBezTo>
                 <a:close/>
               </a:path>
-              <a:path w="1554480" h="18288" stroke="0" extrusionOk="0">
+              <a:path w="3255095" h="18288" stroke="0" extrusionOk="0">
                 <a:moveTo>
                   <a:pt x="0" y="0"/>
                 </a:moveTo>
                 <a:cubicBezTo>
-                  <a:pt x="249941" y="-58"/>
-                  <a:pt x="367334" y="23448"/>
-                  <a:pt x="502615" y="0"/>
+                  <a:pt x="291965" y="19429"/>
+                  <a:pt x="363155" y="8568"/>
+                  <a:pt x="618468" y="0"/>
                 </a:cubicBezTo>
                 <a:cubicBezTo>
-                  <a:pt x="637897" y="-23448"/>
-                  <a:pt x="813653" y="-20418"/>
-                  <a:pt x="974141" y="0"/>
+                  <a:pt x="873781" y="-8568"/>
+                  <a:pt x="904459" y="-19505"/>
+                  <a:pt x="1171834" y="0"/>
                 </a:cubicBezTo>
                 <a:cubicBezTo>
-                  <a:pt x="1134629" y="20418"/>
-                  <a:pt x="1268772" y="6288"/>
-                  <a:pt x="1554480" y="0"/>
+                  <a:pt x="1439209" y="19505"/>
+                  <a:pt x="1744369" y="9790"/>
+                  <a:pt x="1887955" y="0"/>
                 </a:cubicBezTo>
                 <a:cubicBezTo>
-                  <a:pt x="1554917" y="7222"/>
-                  <a:pt x="1555359" y="13299"/>
-                  <a:pt x="1554480" y="18288"/>
+                  <a:pt x="2031541" y="-9790"/>
+                  <a:pt x="2346378" y="21240"/>
+                  <a:pt x="2506423" y="0"/>
                 </a:cubicBezTo>
                 <a:cubicBezTo>
-                  <a:pt x="1336087" y="12172"/>
-                  <a:pt x="1310024" y="19759"/>
-                  <a:pt x="1067410" y="18288"/>
+                  <a:pt x="2666468" y="-21240"/>
+                  <a:pt x="2990257" y="30414"/>
+                  <a:pt x="3255095" y="0"/>
                 </a:cubicBezTo>
                 <a:cubicBezTo>
-                  <a:pt x="824796" y="16818"/>
-                  <a:pt x="787902" y="34647"/>
-                  <a:pt x="518160" y="18288"/>
+                  <a:pt x="3254831" y="4493"/>
+                  <a:pt x="3255479" y="9472"/>
+                  <a:pt x="3255095" y="18288"/>
                 </a:cubicBezTo>
                 <a:cubicBezTo>
-                  <a:pt x="248418" y="1930"/>
-                  <a:pt x="133160" y="9205"/>
+                  <a:pt x="3120743" y="16690"/>
+                  <a:pt x="2759628" y="42462"/>
+                  <a:pt x="2604076" y="18288"/>
+                </a:cubicBezTo>
+                <a:cubicBezTo>
+                  <a:pt x="2448524" y="-5886"/>
+                  <a:pt x="2184336" y="19599"/>
+                  <a:pt x="1887955" y="18288"/>
+                </a:cubicBezTo>
+                <a:cubicBezTo>
+                  <a:pt x="1591574" y="16977"/>
+                  <a:pt x="1548845" y="6870"/>
+                  <a:pt x="1334589" y="18288"/>
+                </a:cubicBezTo>
+                <a:cubicBezTo>
+                  <a:pt x="1120333" y="29706"/>
+                  <a:pt x="996014" y="9662"/>
+                  <a:pt x="683570" y="18288"/>
+                </a:cubicBezTo>
+                <a:cubicBezTo>
+                  <a:pt x="371126" y="26914"/>
+                  <a:pt x="198687" y="16167"/>
                   <a:pt x="0" y="18288"/>
                 </a:cubicBezTo>
                 <a:cubicBezTo>
-                  <a:pt x="-643" y="9451"/>
-                  <a:pt x="-340" y="7114"/>
+                  <a:pt x="843" y="9577"/>
+                  <a:pt x="371" y="6900"/>
                   <a:pt x="0" y="0"/>
                 </a:cubicBezTo>
                 <a:close/>
@@ -14120,7 +14148,7 @@
           <a:solidFill>
             <a:schemeClr val="accent2"/>
           </a:solidFill>
-          <a:ln w="41275" cap="rnd">
+          <a:ln w="38100" cap="rnd">
             <a:solidFill>
               <a:schemeClr val="accent2"/>
             </a:solidFill>
@@ -14159,37 +14187,8 @@
           <a:bodyPr rtlCol="0" anchor="ctr"/>
           <a:lstStyle/>
           <a:p>
-            <a:pPr marL="0" marR="0" lvl="0" indent="0" algn="ctr" defTabSz="914400" rtl="0" eaLnBrk="1" fontAlgn="auto" latinLnBrk="0" hangingPunct="1">
-              <a:lnSpc>
-                <a:spcPct val="100000"/>
-              </a:lnSpc>
-              <a:spcBef>
-                <a:spcPts val="0"/>
-              </a:spcBef>
-              <a:spcAft>
-                <a:spcPts val="0"/>
-              </a:spcAft>
-              <a:buClrTx/>
-              <a:buSzTx/>
-              <a:buFontTx/>
-              <a:buNone/>
-              <a:tabLst/>
-              <a:defRPr/>
-            </a:pPr>
-            <a:endParaRPr kumimoji="0" lang="en-US" sz="1800" b="0" i="0" u="none" strike="noStrike" kern="1200" cap="none" spc="0" normalizeH="0" baseline="0" noProof="0">
-              <a:ln>
-                <a:noFill/>
-              </a:ln>
-              <a:solidFill>
-                <a:prstClr val="white"/>
-              </a:solidFill>
-              <a:effectLst/>
-              <a:uLnTx/>
-              <a:uFillTx/>
-              <a:latin typeface="Aptos" panose="02110004020202020204"/>
-              <a:ea typeface="+mn-ea"/>
-              <a:cs typeface="+mn-cs"/>
-            </a:endParaRPr>
+            <a:pPr algn="ctr"/>
+            <a:endParaRPr lang="en-US"/>
           </a:p>
         </p:txBody>
       </p:sp>
@@ -14198,7 +14197,7 @@
           <p:cNvPr id="8" name="TextBox 7">
             <a:extLst>
               <a:ext uri="{FF2B5EF4-FFF2-40B4-BE49-F238E27FC236}">
-                <a16:creationId xmlns:a16="http://schemas.microsoft.com/office/drawing/2014/main" id="{FA725DC8-CB42-51D1-A963-34C5BF833E2E}"/>
+                <a16:creationId xmlns:a16="http://schemas.microsoft.com/office/drawing/2014/main" id="{BEEF90CD-CD56-DF53-2D57-42E23B855D55}"/>
               </a:ext>
             </a:extLst>
           </p:cNvPr>
@@ -14207,16 +14206,16 @@
         </p:nvSpPr>
         <p:spPr>
           <a:xfrm>
-            <a:off x="5333999" y="4735793"/>
-            <a:ext cx="6214871" cy="1722691"/>
+            <a:off x="154745" y="2660904"/>
+            <a:ext cx="5172629" cy="3547872"/>
           </a:xfrm>
           <a:prstGeom prst="rect">
             <a:avLst/>
           </a:prstGeom>
         </p:spPr>
         <p:txBody>
-          <a:bodyPr vert="horz" lIns="91440" tIns="45720" rIns="91440" bIns="45720" rtlCol="0" anchor="ctr">
-            <a:normAutofit/>
+          <a:bodyPr vert="horz" lIns="91440" tIns="45720" rIns="91440" bIns="45720" rtlCol="0" anchor="t">
+            <a:normAutofit lnSpcReduction="10000"/>
           </a:bodyPr>
           <a:lstStyle/>
           <a:p>
@@ -14238,7 +14237,7 @@
               <a:defRPr/>
             </a:pPr>
             <a:r>
-              <a:rPr kumimoji="0" lang="en-US" sz="1500" b="1" i="0" u="none" strike="noStrike" kern="1200" cap="none" spc="0" normalizeH="0" baseline="0" noProof="0" dirty="0">
+              <a:rPr kumimoji="0" lang="en-US" sz="2400" b="1" i="0" u="none" strike="noStrike" kern="1200" cap="none" spc="0" normalizeH="0" baseline="0" noProof="0" dirty="0">
                 <a:ln>
                   <a:noFill/>
                 </a:ln>
@@ -14274,7 +14273,7 @@
               <a:defRPr/>
             </a:pPr>
             <a:r>
-              <a:rPr kumimoji="0" lang="en-US" sz="1500" b="0" i="0" u="none" strike="noStrike" kern="1200" cap="none" spc="0" normalizeH="0" baseline="0" noProof="0" dirty="0">
+              <a:rPr kumimoji="0" lang="en-US" sz="2400" b="0" i="0" u="none" strike="noStrike" kern="1200" cap="none" spc="0" normalizeH="0" baseline="0" noProof="0" dirty="0">
                 <a:ln>
                   <a:noFill/>
                 </a:ln>
@@ -14310,7 +14309,7 @@
               <a:defRPr/>
             </a:pPr>
             <a:r>
-              <a:rPr kumimoji="0" lang="en-US" sz="1500" b="0" i="0" u="none" strike="noStrike" kern="1200" cap="none" spc="0" normalizeH="0" baseline="0" noProof="0" dirty="0">
+              <a:rPr kumimoji="0" lang="en-US" sz="2400" b="0" i="0" u="none" strike="noStrike" kern="1200" cap="none" spc="0" normalizeH="0" baseline="0" noProof="0" dirty="0">
                 <a:ln>
                   <a:noFill/>
                 </a:ln>
@@ -14346,7 +14345,7 @@
               <a:defRPr/>
             </a:pPr>
             <a:r>
-              <a:rPr kumimoji="0" lang="en-US" sz="1500" b="0" i="0" u="none" strike="noStrike" kern="1200" cap="none" spc="0" normalizeH="0" baseline="0" noProof="0" dirty="0">
+              <a:rPr kumimoji="0" lang="en-US" sz="2400" b="0" i="0" u="none" strike="noStrike" kern="1200" cap="none" spc="0" normalizeH="0" baseline="0" noProof="0" dirty="0">
                 <a:ln>
                   <a:noFill/>
                 </a:ln>
@@ -14381,7 +14380,7 @@
               <a:tabLst/>
               <a:defRPr/>
             </a:pPr>
-            <a:endParaRPr kumimoji="0" lang="en-US" sz="1500" b="0" i="0" u="none" strike="noStrike" kern="1200" cap="none" spc="0" normalizeH="0" baseline="0" noProof="0" dirty="0">
+            <a:endParaRPr kumimoji="0" lang="en-US" sz="2400" b="0" i="0" u="none" strike="noStrike" kern="1200" cap="none" spc="0" normalizeH="0" baseline="0" noProof="0" dirty="0">
               <a:ln>
                 <a:noFill/>
               </a:ln>
@@ -14414,7 +14413,7 @@
               <a:tabLst/>
               <a:defRPr/>
             </a:pPr>
-            <a:endParaRPr kumimoji="0" lang="en-US" sz="1500" b="0" i="0" u="none" strike="noStrike" kern="1200" cap="none" spc="0" normalizeH="0" baseline="0" noProof="0" dirty="0">
+            <a:endParaRPr kumimoji="0" lang="en-US" sz="2400" b="0" i="0" u="none" strike="noStrike" kern="1200" cap="none" spc="0" normalizeH="0" baseline="0" noProof="0" dirty="0">
               <a:ln>
                 <a:noFill/>
               </a:ln>
@@ -14431,10 +14430,56 @@
           </a:p>
         </p:txBody>
       </p:sp>
+      <p:pic>
+        <p:nvPicPr>
+          <p:cNvPr id="5122" name="Picture 2">
+            <a:extLst>
+              <a:ext uri="{FF2B5EF4-FFF2-40B4-BE49-F238E27FC236}">
+                <a16:creationId xmlns:a16="http://schemas.microsoft.com/office/drawing/2014/main" id="{1F315E91-6693-71DB-16B2-7B9E697D14F2}"/>
+              </a:ext>
+            </a:extLst>
+          </p:cNvPr>
+          <p:cNvPicPr>
+            <a:picLocks noChangeAspect="1" noChangeArrowheads="1"/>
+          </p:cNvPicPr>
+          <p:nvPr/>
+        </p:nvPicPr>
+        <p:blipFill>
+          <a:blip r:embed="rId2">
+            <a:extLst>
+              <a:ext uri="{28A0092B-C50C-407E-A947-70E740481C1C}">
+                <a14:useLocalDpi xmlns:a14="http://schemas.microsoft.com/office/drawing/2010/main" val="0"/>
+              </a:ext>
+            </a:extLst>
+          </a:blip>
+          <a:stretch>
+            <a:fillRect/>
+          </a:stretch>
+        </p:blipFill>
+        <p:spPr bwMode="auto">
+          <a:xfrm>
+            <a:off x="5411259" y="36576"/>
+            <a:ext cx="6767886" cy="6784847"/>
+          </a:xfrm>
+          <a:prstGeom prst="rect">
+            <a:avLst/>
+          </a:prstGeom>
+          <a:noFill/>
+          <a:extLst>
+            <a:ext uri="{909E8E84-426E-40DD-AFC4-6F175D3DCCD1}">
+              <a14:hiddenFill xmlns:a14="http://schemas.microsoft.com/office/drawing/2010/main">
+                <a:solidFill>
+                  <a:srgbClr val="FFFFFF"/>
+                </a:solidFill>
+              </a14:hiddenFill>
+            </a:ext>
+          </a:extLst>
+        </p:spPr>
+      </p:pic>
     </p:spTree>
     <p:extLst>
       <p:ext uri="{BB962C8B-B14F-4D97-AF65-F5344CB8AC3E}">
-        <p14:creationId xmlns:p14="http://schemas.microsoft.com/office/powerpoint/2010/main" val="2367339755"/>
+        <p14:creationId xmlns:p14="http://schemas.microsoft.com/office/powerpoint/2010/main" val="2639818551"/>
       </p:ext>
     </p:extLst>
   </p:cSld>
@@ -14552,7 +14597,7 @@
         <p:cNvPr id="1" name="">
           <a:extLst>
             <a:ext uri="{FF2B5EF4-FFF2-40B4-BE49-F238E27FC236}">
-              <a16:creationId xmlns:a16="http://schemas.microsoft.com/office/drawing/2014/main" id="{84701F40-89D5-9C67-4AF1-CEC365BE826C}"/>
+              <a16:creationId xmlns:a16="http://schemas.microsoft.com/office/drawing/2014/main" id="{A1A88D2A-F402-5F73-CD3F-E36C76F8113D}"/>
             </a:ext>
           </a:extLst>
         </p:cNvPr>
@@ -14569,10 +14614,10 @@
       </p:grpSpPr>
       <p:sp useBgFill="1">
         <p:nvSpPr>
-          <p:cNvPr id="6151" name="Rectangle 6150">
+          <p:cNvPr id="5127" name="Rectangle 5126">
             <a:extLst>
               <a:ext uri="{FF2B5EF4-FFF2-40B4-BE49-F238E27FC236}">
-                <a16:creationId xmlns:a16="http://schemas.microsoft.com/office/drawing/2014/main" id="{6D24BC9E-AC6A-42EE-AFD8-B290720B841F}"/>
+                <a16:creationId xmlns:a16="http://schemas.microsoft.com/office/drawing/2014/main" id="{C5828DB1-1840-BC46-BE9E-632B62D54A02}"/>
               </a:ext>
               <a:ext uri="{C183D7F6-B498-43B3-948B-1728B52AA6E4}">
                 <adec:decorative xmlns:adec="http://schemas.microsoft.com/office/drawing/2017/decorative" val="1"/>
@@ -14622,17 +14667,89 @@
           <a:bodyPr rtlCol="0" anchor="ctr"/>
           <a:lstStyle/>
           <a:p>
-            <a:pPr algn="ctr"/>
-            <a:endParaRPr lang="en-US"/>
+            <a:pPr marL="0" marR="0" lvl="0" indent="0" algn="ctr" defTabSz="914400" rtl="0" eaLnBrk="1" fontAlgn="auto" latinLnBrk="0" hangingPunct="1">
+              <a:lnSpc>
+                <a:spcPct val="100000"/>
+              </a:lnSpc>
+              <a:spcBef>
+                <a:spcPts val="0"/>
+              </a:spcBef>
+              <a:spcAft>
+                <a:spcPts val="0"/>
+              </a:spcAft>
+              <a:buClrTx/>
+              <a:buSzTx/>
+              <a:buFontTx/>
+              <a:buNone/>
+              <a:tabLst/>
+              <a:defRPr/>
+            </a:pPr>
+            <a:endParaRPr kumimoji="0" lang="en-US" sz="1800" b="0" i="0" u="none" strike="noStrike" kern="1200" cap="none" spc="0" normalizeH="0" baseline="0" noProof="0">
+              <a:ln>
+                <a:noFill/>
+              </a:ln>
+              <a:solidFill>
+                <a:prstClr val="white"/>
+              </a:solidFill>
+              <a:effectLst/>
+              <a:uLnTx/>
+              <a:uFillTx/>
+              <a:latin typeface="Aptos" panose="02110004020202020204"/>
+              <a:ea typeface="+mn-ea"/>
+              <a:cs typeface="+mn-cs"/>
+            </a:endParaRPr>
           </a:p>
         </p:txBody>
       </p:sp>
-      <p:sp useBgFill="1">
+      <p:sp>
         <p:nvSpPr>
-          <p:cNvPr id="6153" name="Rectangle 6152">
+          <p:cNvPr id="2" name="Title 1">
             <a:extLst>
               <a:ext uri="{FF2B5EF4-FFF2-40B4-BE49-F238E27FC236}">
-                <a16:creationId xmlns:a16="http://schemas.microsoft.com/office/drawing/2014/main" id="{0990C621-3B8B-4820-8328-D47EF7CE823C}"/>
+                <a16:creationId xmlns:a16="http://schemas.microsoft.com/office/drawing/2014/main" id="{8145FB9C-A74D-ABA8-8D97-19895B280EA3}"/>
+              </a:ext>
+            </a:extLst>
+          </p:cNvPr>
+          <p:cNvSpPr>
+            <a:spLocks noGrp="1"/>
+          </p:cNvSpPr>
+          <p:nvPr>
+            <p:ph type="title"/>
+          </p:nvPr>
+        </p:nvSpPr>
+        <p:spPr>
+          <a:xfrm>
+            <a:off x="154745" y="640080"/>
+            <a:ext cx="5295079" cy="1481328"/>
+          </a:xfrm>
+        </p:spPr>
+        <p:txBody>
+          <a:bodyPr vert="horz" lIns="91440" tIns="45720" rIns="91440" bIns="45720" rtlCol="0" anchor="b">
+            <a:normAutofit fontScale="90000"/>
+          </a:bodyPr>
+          <a:lstStyle/>
+          <a:p>
+            <a:r>
+              <a:rPr lang="en-US" sz="5400" dirty="0"/>
+              <a:t>Employment Length</a:t>
+            </a:r>
+            <a:endParaRPr lang="en-US" sz="5400" kern="1200" dirty="0">
+              <a:solidFill>
+                <a:schemeClr val="tx1"/>
+              </a:solidFill>
+              <a:latin typeface="+mj-lt"/>
+              <a:ea typeface="+mj-ea"/>
+              <a:cs typeface="+mj-cs"/>
+            </a:endParaRPr>
+          </a:p>
+        </p:txBody>
+      </p:sp>
+      <p:sp>
+        <p:nvSpPr>
+          <p:cNvPr id="5129" name="sketch line">
+            <a:extLst>
+              <a:ext uri="{FF2B5EF4-FFF2-40B4-BE49-F238E27FC236}">
+                <a16:creationId xmlns:a16="http://schemas.microsoft.com/office/drawing/2014/main" id="{802A4440-EF24-909D-F68B-5F132FB69E71}"/>
               </a:ext>
               <a:ext uri="{C183D7F6-B498-43B3-948B-1728B52AA6E4}">
                 <adec:decorative xmlns:adec="http://schemas.microsoft.com/office/drawing/2017/decorative" val="1"/>
@@ -14652,25 +14769,228 @@
         </p:nvSpPr>
         <p:spPr>
           <a:xfrm>
-            <a:off x="554416" y="4107624"/>
-            <a:ext cx="11167447" cy="2089317"/>
+            <a:off x="643278" y="2372868"/>
+            <a:ext cx="3255095" cy="18288"/>
           </a:xfrm>
-          <a:prstGeom prst="rect">
+          <a:custGeom>
             <a:avLst/>
-          </a:prstGeom>
-          <a:ln w="12700">
+            <a:gdLst>
+              <a:gd name="connsiteX0" fmla="*/ 0 w 3255095"/>
+              <a:gd name="connsiteY0" fmla="*/ 0 h 18288"/>
+              <a:gd name="connsiteX1" fmla="*/ 618468 w 3255095"/>
+              <a:gd name="connsiteY1" fmla="*/ 0 h 18288"/>
+              <a:gd name="connsiteX2" fmla="*/ 1269487 w 3255095"/>
+              <a:gd name="connsiteY2" fmla="*/ 0 h 18288"/>
+              <a:gd name="connsiteX3" fmla="*/ 1953057 w 3255095"/>
+              <a:gd name="connsiteY3" fmla="*/ 0 h 18288"/>
+              <a:gd name="connsiteX4" fmla="*/ 2636627 w 3255095"/>
+              <a:gd name="connsiteY4" fmla="*/ 0 h 18288"/>
+              <a:gd name="connsiteX5" fmla="*/ 3255095 w 3255095"/>
+              <a:gd name="connsiteY5" fmla="*/ 0 h 18288"/>
+              <a:gd name="connsiteX6" fmla="*/ 3255095 w 3255095"/>
+              <a:gd name="connsiteY6" fmla="*/ 18288 h 18288"/>
+              <a:gd name="connsiteX7" fmla="*/ 2538974 w 3255095"/>
+              <a:gd name="connsiteY7" fmla="*/ 18288 h 18288"/>
+              <a:gd name="connsiteX8" fmla="*/ 1822853 w 3255095"/>
+              <a:gd name="connsiteY8" fmla="*/ 18288 h 18288"/>
+              <a:gd name="connsiteX9" fmla="*/ 1171834 w 3255095"/>
+              <a:gd name="connsiteY9" fmla="*/ 18288 h 18288"/>
+              <a:gd name="connsiteX10" fmla="*/ 0 w 3255095"/>
+              <a:gd name="connsiteY10" fmla="*/ 18288 h 18288"/>
+              <a:gd name="connsiteX11" fmla="*/ 0 w 3255095"/>
+              <a:gd name="connsiteY11" fmla="*/ 0 h 18288"/>
+            </a:gdLst>
+            <a:ahLst/>
+            <a:cxnLst>
+              <a:cxn ang="0">
+                <a:pos x="connsiteX0" y="connsiteY0"/>
+              </a:cxn>
+              <a:cxn ang="0">
+                <a:pos x="connsiteX1" y="connsiteY1"/>
+              </a:cxn>
+              <a:cxn ang="0">
+                <a:pos x="connsiteX2" y="connsiteY2"/>
+              </a:cxn>
+              <a:cxn ang="0">
+                <a:pos x="connsiteX3" y="connsiteY3"/>
+              </a:cxn>
+              <a:cxn ang="0">
+                <a:pos x="connsiteX4" y="connsiteY4"/>
+              </a:cxn>
+              <a:cxn ang="0">
+                <a:pos x="connsiteX5" y="connsiteY5"/>
+              </a:cxn>
+              <a:cxn ang="0">
+                <a:pos x="connsiteX6" y="connsiteY6"/>
+              </a:cxn>
+              <a:cxn ang="0">
+                <a:pos x="connsiteX7" y="connsiteY7"/>
+              </a:cxn>
+              <a:cxn ang="0">
+                <a:pos x="connsiteX8" y="connsiteY8"/>
+              </a:cxn>
+              <a:cxn ang="0">
+                <a:pos x="connsiteX9" y="connsiteY9"/>
+              </a:cxn>
+              <a:cxn ang="0">
+                <a:pos x="connsiteX10" y="connsiteY10"/>
+              </a:cxn>
+              <a:cxn ang="0">
+                <a:pos x="connsiteX11" y="connsiteY11"/>
+              </a:cxn>
+            </a:cxnLst>
+            <a:rect l="l" t="t" r="r" b="b"/>
+            <a:pathLst>
+              <a:path w="3255095" h="18288" fill="none" extrusionOk="0">
+                <a:moveTo>
+                  <a:pt x="0" y="0"/>
+                </a:moveTo>
+                <a:cubicBezTo>
+                  <a:pt x="240201" y="-22123"/>
+                  <a:pt x="462021" y="-19623"/>
+                  <a:pt x="618468" y="0"/>
+                </a:cubicBezTo>
+                <a:cubicBezTo>
+                  <a:pt x="774915" y="19623"/>
+                  <a:pt x="974734" y="2035"/>
+                  <a:pt x="1269487" y="0"/>
+                </a:cubicBezTo>
+                <a:cubicBezTo>
+                  <a:pt x="1564240" y="-2035"/>
+                  <a:pt x="1733579" y="10639"/>
+                  <a:pt x="1953057" y="0"/>
+                </a:cubicBezTo>
+                <a:cubicBezTo>
+                  <a:pt x="2172535" y="-10639"/>
+                  <a:pt x="2453962" y="14018"/>
+                  <a:pt x="2636627" y="0"/>
+                </a:cubicBezTo>
+                <a:cubicBezTo>
+                  <a:pt x="2819292" y="-14018"/>
+                  <a:pt x="3121375" y="5399"/>
+                  <a:pt x="3255095" y="0"/>
+                </a:cubicBezTo>
+                <a:cubicBezTo>
+                  <a:pt x="3254386" y="8157"/>
+                  <a:pt x="3254682" y="12125"/>
+                  <a:pt x="3255095" y="18288"/>
+                </a:cubicBezTo>
+                <a:cubicBezTo>
+                  <a:pt x="3088545" y="23203"/>
+                  <a:pt x="2687475" y="7419"/>
+                  <a:pt x="2538974" y="18288"/>
+                </a:cubicBezTo>
+                <a:cubicBezTo>
+                  <a:pt x="2390473" y="29157"/>
+                  <a:pt x="2137381" y="-8959"/>
+                  <a:pt x="1822853" y="18288"/>
+                </a:cubicBezTo>
+                <a:cubicBezTo>
+                  <a:pt x="1508325" y="45535"/>
+                  <a:pt x="1466437" y="20385"/>
+                  <a:pt x="1171834" y="18288"/>
+                </a:cubicBezTo>
+                <a:cubicBezTo>
+                  <a:pt x="877231" y="16191"/>
+                  <a:pt x="561097" y="37643"/>
+                  <a:pt x="0" y="18288"/>
+                </a:cubicBezTo>
+                <a:cubicBezTo>
+                  <a:pt x="-46" y="12483"/>
+                  <a:pt x="-203" y="6491"/>
+                  <a:pt x="0" y="0"/>
+                </a:cubicBezTo>
+                <a:close/>
+              </a:path>
+              <a:path w="3255095" h="18288" stroke="0" extrusionOk="0">
+                <a:moveTo>
+                  <a:pt x="0" y="0"/>
+                </a:moveTo>
+                <a:cubicBezTo>
+                  <a:pt x="291965" y="19429"/>
+                  <a:pt x="363155" y="8568"/>
+                  <a:pt x="618468" y="0"/>
+                </a:cubicBezTo>
+                <a:cubicBezTo>
+                  <a:pt x="873781" y="-8568"/>
+                  <a:pt x="904459" y="-19505"/>
+                  <a:pt x="1171834" y="0"/>
+                </a:cubicBezTo>
+                <a:cubicBezTo>
+                  <a:pt x="1439209" y="19505"/>
+                  <a:pt x="1744369" y="9790"/>
+                  <a:pt x="1887955" y="0"/>
+                </a:cubicBezTo>
+                <a:cubicBezTo>
+                  <a:pt x="2031541" y="-9790"/>
+                  <a:pt x="2346378" y="21240"/>
+                  <a:pt x="2506423" y="0"/>
+                </a:cubicBezTo>
+                <a:cubicBezTo>
+                  <a:pt x="2666468" y="-21240"/>
+                  <a:pt x="2990257" y="30414"/>
+                  <a:pt x="3255095" y="0"/>
+                </a:cubicBezTo>
+                <a:cubicBezTo>
+                  <a:pt x="3254831" y="4493"/>
+                  <a:pt x="3255479" y="9472"/>
+                  <a:pt x="3255095" y="18288"/>
+                </a:cubicBezTo>
+                <a:cubicBezTo>
+                  <a:pt x="3120743" y="16690"/>
+                  <a:pt x="2759628" y="42462"/>
+                  <a:pt x="2604076" y="18288"/>
+                </a:cubicBezTo>
+                <a:cubicBezTo>
+                  <a:pt x="2448524" y="-5886"/>
+                  <a:pt x="2184336" y="19599"/>
+                  <a:pt x="1887955" y="18288"/>
+                </a:cubicBezTo>
+                <a:cubicBezTo>
+                  <a:pt x="1591574" y="16977"/>
+                  <a:pt x="1548845" y="6870"/>
+                  <a:pt x="1334589" y="18288"/>
+                </a:cubicBezTo>
+                <a:cubicBezTo>
+                  <a:pt x="1120333" y="29706"/>
+                  <a:pt x="996014" y="9662"/>
+                  <a:pt x="683570" y="18288"/>
+                </a:cubicBezTo>
+                <a:cubicBezTo>
+                  <a:pt x="371126" y="26914"/>
+                  <a:pt x="198687" y="16167"/>
+                  <a:pt x="0" y="18288"/>
+                </a:cubicBezTo>
+                <a:cubicBezTo>
+                  <a:pt x="843" y="9577"/>
+                  <a:pt x="371" y="6900"/>
+                  <a:pt x="0" y="0"/>
+                </a:cubicBezTo>
+                <a:close/>
+              </a:path>
+            </a:pathLst>
+          </a:custGeom>
+          <a:solidFill>
+            <a:schemeClr val="accent2"/>
+          </a:solidFill>
+          <a:ln w="38100" cap="rnd">
             <a:solidFill>
-              <a:srgbClr val="DEDEDE"/>
+              <a:schemeClr val="accent2"/>
             </a:solidFill>
+            <a:round/>
+            <a:extLst>
+              <a:ext uri="{C807C97D-BFC1-408E-A445-0C87EB9F89A2}">
+                <ask:lineSketchStyleProps xmlns:ask="http://schemas.microsoft.com/office/drawing/2018/sketchyshapes" sd="1219033472">
+                  <a:prstGeom prst="rect">
+                    <a:avLst/>
+                  </a:prstGeom>
+                  <ask:type>
+                    <ask:lineSketchFreehand/>
+                  </ask:type>
+                </ask:lineSketchStyleProps>
+              </a:ext>
+            </a:extLst>
           </a:ln>
-          <a:effectLst>
-            <a:outerShdw blurRad="50800" dist="38100" dir="2700000" algn="tl" rotWithShape="0">
-              <a:schemeClr val="bg2">
-                <a:lumMod val="85000"/>
-                <a:alpha val="50000"/>
-              </a:schemeClr>
-            </a:outerShdw>
-          </a:effectLst>
         </p:spPr>
         <p:style>
           <a:lnRef idx="2">
@@ -14719,7 +15039,7 @@
               <a:effectLst/>
               <a:uLnTx/>
               <a:uFillTx/>
-              <a:latin typeface="Calibri" panose="020F0502020204030204"/>
+              <a:latin typeface="Aptos" panose="02110004020202020204"/>
               <a:ea typeface="+mn-ea"/>
               <a:cs typeface="+mn-cs"/>
             </a:endParaRPr>
@@ -14728,36 +15048,189 @@
       </p:sp>
       <p:sp>
         <p:nvSpPr>
-          <p:cNvPr id="2" name="Title 1">
+          <p:cNvPr id="8" name="TextBox 7">
             <a:extLst>
               <a:ext uri="{FF2B5EF4-FFF2-40B4-BE49-F238E27FC236}">
-                <a16:creationId xmlns:a16="http://schemas.microsoft.com/office/drawing/2014/main" id="{9C2D102B-7C68-7120-64DA-13D2115D8EDC}"/>
+                <a16:creationId xmlns:a16="http://schemas.microsoft.com/office/drawing/2014/main" id="{77630F6C-1527-4ABF-F6A3-9E868E26E41D}"/>
               </a:ext>
             </a:extLst>
           </p:cNvPr>
-          <p:cNvSpPr>
-            <a:spLocks noGrp="1"/>
-          </p:cNvSpPr>
-          <p:nvPr>
-            <p:ph type="title"/>
-          </p:nvPr>
+          <p:cNvSpPr txBox="1"/>
+          <p:nvPr/>
         </p:nvSpPr>
         <p:spPr>
           <a:xfrm>
-            <a:off x="1051560" y="4329321"/>
-            <a:ext cx="3657600" cy="1645920"/>
+            <a:off x="154745" y="2660904"/>
+            <a:ext cx="5172629" cy="3547872"/>
           </a:xfrm>
+          <a:prstGeom prst="rect">
+            <a:avLst/>
+          </a:prstGeom>
         </p:spPr>
         <p:txBody>
-          <a:bodyPr vert="horz" lIns="91440" tIns="45720" rIns="91440" bIns="45720" rtlCol="0" anchor="ctr">
+          <a:bodyPr vert="horz" lIns="91440" tIns="45720" rIns="91440" bIns="45720" rtlCol="0" anchor="t">
             <a:normAutofit/>
           </a:bodyPr>
           <a:lstStyle/>
           <a:p>
+            <a:pPr marL="0" marR="0" lvl="0" indent="-228600" algn="l" defTabSz="914400" rtl="0" eaLnBrk="1" fontAlgn="auto" latinLnBrk="0" hangingPunct="1">
+              <a:lnSpc>
+                <a:spcPct val="90000"/>
+              </a:lnSpc>
+              <a:spcBef>
+                <a:spcPts val="0"/>
+              </a:spcBef>
+              <a:spcAft>
+                <a:spcPts val="600"/>
+              </a:spcAft>
+              <a:buClrTx/>
+              <a:buSzTx/>
+              <a:buFont typeface="Arial" panose="020B0604020202020204" pitchFamily="34" charset="0"/>
+              <a:buChar char="•"/>
+              <a:tabLst/>
+              <a:defRPr/>
+            </a:pPr>
             <a:r>
-              <a:rPr lang="en-US" sz="3200"/>
-              <a:t>Employment Length.</a:t>
+              <a:rPr kumimoji="0" lang="en-US" sz="2400" b="1" i="0" u="none" strike="noStrike" kern="1200" cap="none" spc="0" normalizeH="0" baseline="0" noProof="0" dirty="0">
+                <a:ln>
+                  <a:noFill/>
+                </a:ln>
+                <a:solidFill>
+                  <a:prstClr val="black"/>
+                </a:solidFill>
+                <a:effectLst/>
+                <a:uLnTx/>
+                <a:uFillTx/>
+                <a:latin typeface="Aptos" panose="02110004020202020204"/>
+                <a:ea typeface="+mn-ea"/>
+                <a:cs typeface="+mn-cs"/>
+              </a:rPr>
+              <a:t>Observations:</a:t>
             </a:r>
+          </a:p>
+          <a:p>
+            <a:pPr marL="0" marR="0" lvl="0" indent="-228600" fontAlgn="auto">
+              <a:lnSpc>
+                <a:spcPct val="90000"/>
+              </a:lnSpc>
+              <a:spcBef>
+                <a:spcPts val="0"/>
+              </a:spcBef>
+              <a:spcAft>
+                <a:spcPts val="600"/>
+              </a:spcAft>
+              <a:buClrTx/>
+              <a:buSzTx/>
+              <a:buFont typeface="Arial" panose="020B0604020202020204" pitchFamily="34" charset="0"/>
+              <a:buChar char="•"/>
+              <a:tabLst/>
+              <a:defRPr/>
+            </a:pPr>
+            <a:r>
+              <a:rPr lang="en-US" sz="2400" dirty="0"/>
+              <a:t>Contrary to popular belief, longer employment doesn’t necessarily lead to lower default rates as it can be seen that the default rate increases for borrowers who 10+ years of employment length. </a:t>
+            </a:r>
+            <a:endParaRPr kumimoji="0" lang="en-US" sz="2400" b="0" i="0" u="none" strike="noStrike" cap="none" spc="0" normalizeH="0" baseline="0" noProof="0" dirty="0">
+              <a:ln>
+                <a:noFill/>
+              </a:ln>
+              <a:effectLst/>
+              <a:uLnTx/>
+              <a:uFillTx/>
+            </a:endParaRPr>
+          </a:p>
+          <a:p>
+            <a:pPr marL="0" marR="0" lvl="0" indent="-228600" fontAlgn="auto">
+              <a:lnSpc>
+                <a:spcPct val="90000"/>
+              </a:lnSpc>
+              <a:spcBef>
+                <a:spcPts val="0"/>
+              </a:spcBef>
+              <a:spcAft>
+                <a:spcPts val="600"/>
+              </a:spcAft>
+              <a:buClrTx/>
+              <a:buSzTx/>
+              <a:buFont typeface="Arial" panose="020B0604020202020204" pitchFamily="34" charset="0"/>
+              <a:buChar char="•"/>
+              <a:tabLst/>
+              <a:defRPr/>
+            </a:pPr>
+            <a:endParaRPr kumimoji="0" lang="en-US" sz="2400" b="0" i="0" u="none" strike="noStrike" cap="none" spc="0" normalizeH="0" baseline="0" noProof="0" dirty="0">
+              <a:ln>
+                <a:noFill/>
+              </a:ln>
+              <a:effectLst/>
+              <a:uLnTx/>
+              <a:uFillTx/>
+            </a:endParaRPr>
+          </a:p>
+          <a:p>
+            <a:pPr marL="0" marR="0" lvl="0" indent="-228600" algn="l" defTabSz="914400" rtl="0" eaLnBrk="1" fontAlgn="auto" latinLnBrk="0" hangingPunct="1">
+              <a:lnSpc>
+                <a:spcPct val="90000"/>
+              </a:lnSpc>
+              <a:spcBef>
+                <a:spcPts val="0"/>
+              </a:spcBef>
+              <a:spcAft>
+                <a:spcPts val="600"/>
+              </a:spcAft>
+              <a:buClrTx/>
+              <a:buSzTx/>
+              <a:buFont typeface="Arial" panose="020B0604020202020204" pitchFamily="34" charset="0"/>
+              <a:buChar char="•"/>
+              <a:tabLst/>
+              <a:defRPr/>
+            </a:pPr>
+            <a:endParaRPr kumimoji="0" lang="en-US" sz="2400" b="0" i="0" u="none" strike="noStrike" kern="1200" cap="none" spc="0" normalizeH="0" baseline="0" noProof="0" dirty="0">
+              <a:ln>
+                <a:noFill/>
+              </a:ln>
+              <a:solidFill>
+                <a:prstClr val="black"/>
+              </a:solidFill>
+              <a:effectLst/>
+              <a:uLnTx/>
+              <a:uFillTx/>
+              <a:latin typeface="Aptos" panose="02110004020202020204"/>
+              <a:ea typeface="+mn-ea"/>
+              <a:cs typeface="+mn-cs"/>
+            </a:endParaRPr>
+          </a:p>
+          <a:p>
+            <a:pPr marL="0" marR="0" lvl="0" indent="-228600" algn="l" defTabSz="914400" rtl="0" eaLnBrk="1" fontAlgn="auto" latinLnBrk="0" hangingPunct="1">
+              <a:lnSpc>
+                <a:spcPct val="90000"/>
+              </a:lnSpc>
+              <a:spcBef>
+                <a:spcPts val="0"/>
+              </a:spcBef>
+              <a:spcAft>
+                <a:spcPts val="600"/>
+              </a:spcAft>
+              <a:buClrTx/>
+              <a:buSzTx/>
+              <a:buFont typeface="Arial" panose="020B0604020202020204" pitchFamily="34" charset="0"/>
+              <a:buChar char="•"/>
+              <a:tabLst/>
+              <a:defRPr/>
+            </a:pPr>
+            <a:endParaRPr kumimoji="0" lang="en-US" sz="2400" b="0" i="0" u="none" strike="noStrike" kern="1200" cap="none" spc="0" normalizeH="0" baseline="0" noProof="0" dirty="0">
+              <a:ln>
+                <a:noFill/>
+              </a:ln>
+              <a:solidFill>
+                <a:prstClr val="black"/>
+              </a:solidFill>
+              <a:effectLst/>
+              <a:uLnTx/>
+              <a:uFillTx/>
+              <a:latin typeface="Aptos" panose="02110004020202020204"/>
+              <a:ea typeface="+mn-ea"/>
+              <a:cs typeface="+mn-cs"/>
+            </a:endParaRPr>
           </a:p>
         </p:txBody>
       </p:sp>
@@ -14783,8 +15256,8 @@
         </p:blipFill>
         <p:spPr>
           <a:xfrm>
-            <a:off x="1038734" y="361910"/>
-            <a:ext cx="4524498" cy="3483864"/>
+            <a:off x="5482119" y="0"/>
+            <a:ext cx="6709881" cy="3246120"/>
           </a:xfrm>
           <a:prstGeom prst="rect">
             <a:avLst/>
@@ -14819,8 +15292,8 @@
         </p:blipFill>
         <p:spPr bwMode="auto">
           <a:xfrm>
-            <a:off x="6622211" y="357251"/>
-            <a:ext cx="4676327" cy="3483864"/>
+            <a:off x="5482119" y="3246120"/>
+            <a:ext cx="6709881" cy="3611880"/>
           </a:xfrm>
           <a:prstGeom prst="rect">
             <a:avLst/>
@@ -14837,289 +15310,10 @@
           </a:extLst>
         </p:spPr>
       </p:pic>
-      <p:sp>
-        <p:nvSpPr>
-          <p:cNvPr id="6155" name="Rectangle 6154">
-            <a:extLst>
-              <a:ext uri="{FF2B5EF4-FFF2-40B4-BE49-F238E27FC236}">
-                <a16:creationId xmlns:a16="http://schemas.microsoft.com/office/drawing/2014/main" id="{C1A2385B-1D2A-4E17-84FA-6CB7F0AAE473}"/>
-              </a:ext>
-              <a:ext uri="{C183D7F6-B498-43B3-948B-1728B52AA6E4}">
-                <adec:decorative xmlns:adec="http://schemas.microsoft.com/office/drawing/2017/decorative" val="1"/>
-              </a:ext>
-            </a:extLst>
-          </p:cNvPr>
-          <p:cNvSpPr>
-            <a:spLocks noGrp="1" noRot="1" noChangeAspect="1" noMove="1" noResize="1" noEditPoints="1" noAdjustHandles="1" noChangeArrowheads="1" noChangeShapeType="1" noTextEdit="1"/>
-          </p:cNvSpPr>
-          <p:nvPr>
-            <p:extLst>
-              <p:ext uri="{386F3935-93C4-4BCD-93E2-E3B085C9AB24}">
-                <p16:designElem xmlns:p16="http://schemas.microsoft.com/office/powerpoint/2015/main" val="1"/>
-              </p:ext>
-            </p:extLst>
-          </p:nvPr>
-        </p:nvSpPr>
-        <p:spPr>
-          <a:xfrm>
-            <a:off x="490408" y="4800238"/>
-            <a:ext cx="128016" cy="704088"/>
-          </a:xfrm>
-          <a:prstGeom prst="rect">
-            <a:avLst/>
-          </a:prstGeom>
-          <a:solidFill>
-            <a:schemeClr val="accent2"/>
-          </a:solidFill>
-          <a:ln>
-            <a:noFill/>
-          </a:ln>
-        </p:spPr>
-        <p:style>
-          <a:lnRef idx="2">
-            <a:schemeClr val="accent1">
-              <a:shade val="50000"/>
-            </a:schemeClr>
-          </a:lnRef>
-          <a:fillRef idx="1">
-            <a:schemeClr val="accent1"/>
-          </a:fillRef>
-          <a:effectRef idx="0">
-            <a:schemeClr val="accent1"/>
-          </a:effectRef>
-          <a:fontRef idx="minor">
-            <a:schemeClr val="lt1"/>
-          </a:fontRef>
-        </p:style>
-        <p:txBody>
-          <a:bodyPr rtlCol="0" anchor="ctr"/>
-          <a:lstStyle/>
-          <a:p>
-            <a:pPr algn="ctr"/>
-            <a:endParaRPr lang="en-US" dirty="0">
-              <a:solidFill>
-                <a:prstClr val="white"/>
-              </a:solidFill>
-              <a:latin typeface="Calibri" panose="020F0502020204030204"/>
-            </a:endParaRPr>
-          </a:p>
-        </p:txBody>
-      </p:sp>
-      <p:sp>
-        <p:nvSpPr>
-          <p:cNvPr id="6157" name="Rectangle 6156">
-            <a:extLst>
-              <a:ext uri="{FF2B5EF4-FFF2-40B4-BE49-F238E27FC236}">
-                <a16:creationId xmlns:a16="http://schemas.microsoft.com/office/drawing/2014/main" id="{5E791F2F-79DB-4CC0-9FA1-001E3E91E8B7}"/>
-              </a:ext>
-              <a:ext uri="{C183D7F6-B498-43B3-948B-1728B52AA6E4}">
-                <adec:decorative xmlns:adec="http://schemas.microsoft.com/office/drawing/2017/decorative" val="1"/>
-              </a:ext>
-            </a:extLst>
-          </p:cNvPr>
-          <p:cNvSpPr>
-            <a:spLocks noGrp="1" noRot="1" noChangeAspect="1" noMove="1" noResize="1" noEditPoints="1" noAdjustHandles="1" noChangeArrowheads="1" noChangeShapeType="1" noTextEdit="1"/>
-          </p:cNvSpPr>
-          <p:nvPr>
-            <p:extLst>
-              <p:ext uri="{386F3935-93C4-4BCD-93E2-E3B085C9AB24}">
-                <p16:designElem xmlns:p16="http://schemas.microsoft.com/office/powerpoint/2015/main" val="1"/>
-              </p:ext>
-            </p:extLst>
-          </p:nvPr>
-        </p:nvSpPr>
-        <p:spPr>
-          <a:xfrm rot="5400000">
-            <a:off x="4243541" y="5143137"/>
-            <a:ext cx="1463040" cy="18288"/>
-          </a:xfrm>
-          <a:prstGeom prst="rect">
-            <a:avLst/>
-          </a:prstGeom>
-          <a:solidFill>
-            <a:srgbClr val="D5D5D5"/>
-          </a:solidFill>
-          <a:ln w="3175">
-            <a:noFill/>
-          </a:ln>
-          <a:effectLst/>
-        </p:spPr>
-        <p:style>
-          <a:lnRef idx="2">
-            <a:schemeClr val="accent1">
-              <a:shade val="50000"/>
-            </a:schemeClr>
-          </a:lnRef>
-          <a:fillRef idx="1">
-            <a:schemeClr val="accent1"/>
-          </a:fillRef>
-          <a:effectRef idx="0">
-            <a:schemeClr val="accent1"/>
-          </a:effectRef>
-          <a:fontRef idx="minor">
-            <a:schemeClr val="lt1"/>
-          </a:fontRef>
-        </p:style>
-        <p:txBody>
-          <a:bodyPr rtlCol="0" anchor="ctr"/>
-          <a:lstStyle/>
-          <a:p>
-            <a:pPr marL="0" marR="0" lvl="0" indent="0" algn="ctr" defTabSz="914400" rtl="0" eaLnBrk="1" fontAlgn="auto" latinLnBrk="0" hangingPunct="1">
-              <a:lnSpc>
-                <a:spcPct val="100000"/>
-              </a:lnSpc>
-              <a:spcBef>
-                <a:spcPts val="0"/>
-              </a:spcBef>
-              <a:spcAft>
-                <a:spcPts val="0"/>
-              </a:spcAft>
-              <a:buClrTx/>
-              <a:buSzTx/>
-              <a:buFontTx/>
-              <a:buNone/>
-              <a:tabLst/>
-              <a:defRPr/>
-            </a:pPr>
-            <a:endParaRPr kumimoji="0" lang="en-US" sz="1800" b="0" i="0" u="none" strike="noStrike" kern="1200" cap="none" spc="0" normalizeH="0" baseline="0" noProof="0">
-              <a:ln>
-                <a:noFill/>
-              </a:ln>
-              <a:solidFill>
-                <a:prstClr val="white"/>
-              </a:solidFill>
-              <a:effectLst/>
-              <a:uLnTx/>
-              <a:uFillTx/>
-              <a:latin typeface="Calibri" panose="020F0502020204030204"/>
-              <a:ea typeface="+mn-ea"/>
-              <a:cs typeface="+mn-cs"/>
-            </a:endParaRPr>
-          </a:p>
-        </p:txBody>
-      </p:sp>
-      <p:sp>
-        <p:nvSpPr>
-          <p:cNvPr id="8" name="TextBox 7">
-            <a:extLst>
-              <a:ext uri="{FF2B5EF4-FFF2-40B4-BE49-F238E27FC236}">
-                <a16:creationId xmlns:a16="http://schemas.microsoft.com/office/drawing/2014/main" id="{B2D2584A-9C35-8FDF-B642-9F88F85789E1}"/>
-              </a:ext>
-            </a:extLst>
-          </p:cNvPr>
-          <p:cNvSpPr txBox="1"/>
-          <p:nvPr/>
-        </p:nvSpPr>
-        <p:spPr>
-          <a:xfrm>
-            <a:off x="5250106" y="4329321"/>
-            <a:ext cx="6106742" cy="1645920"/>
-          </a:xfrm>
-          <a:prstGeom prst="rect">
-            <a:avLst/>
-          </a:prstGeom>
-        </p:spPr>
-        <p:txBody>
-          <a:bodyPr vert="horz" lIns="91440" tIns="45720" rIns="91440" bIns="45720" rtlCol="0" anchor="ctr">
-            <a:normAutofit/>
-          </a:bodyPr>
-          <a:lstStyle/>
-          <a:p>
-            <a:pPr marL="0" marR="0" lvl="0" indent="-228600" fontAlgn="auto">
-              <a:lnSpc>
-                <a:spcPct val="90000"/>
-              </a:lnSpc>
-              <a:spcBef>
-                <a:spcPts val="0"/>
-              </a:spcBef>
-              <a:spcAft>
-                <a:spcPts val="600"/>
-              </a:spcAft>
-              <a:buClrTx/>
-              <a:buSzTx/>
-              <a:buFont typeface="Arial" panose="020B0604020202020204" pitchFamily="34" charset="0"/>
-              <a:buChar char="•"/>
-              <a:tabLst/>
-              <a:defRPr/>
-            </a:pPr>
-            <a:r>
-              <a:rPr lang="en-US" sz="1500" dirty="0"/>
-              <a:t>Contrary to popular belief, longer employment doesn’t necessarily lead to lower default rates as it can be seen that the default rate increases for borrowers who 10+ years of employment length. </a:t>
-            </a:r>
-            <a:endParaRPr kumimoji="0" lang="en-US" sz="1500" b="0" i="0" u="none" strike="noStrike" cap="none" spc="0" normalizeH="0" baseline="0" noProof="0" dirty="0">
-              <a:ln>
-                <a:noFill/>
-              </a:ln>
-              <a:effectLst/>
-              <a:uLnTx/>
-              <a:uFillTx/>
-            </a:endParaRPr>
-          </a:p>
-          <a:p>
-            <a:pPr marL="0" marR="0" lvl="0" indent="-228600" fontAlgn="auto">
-              <a:lnSpc>
-                <a:spcPct val="90000"/>
-              </a:lnSpc>
-              <a:spcBef>
-                <a:spcPts val="0"/>
-              </a:spcBef>
-              <a:spcAft>
-                <a:spcPts val="600"/>
-              </a:spcAft>
-              <a:buClrTx/>
-              <a:buSzTx/>
-              <a:buFont typeface="Arial" panose="020B0604020202020204" pitchFamily="34" charset="0"/>
-              <a:buChar char="•"/>
-              <a:tabLst/>
-              <a:defRPr/>
-            </a:pPr>
-            <a:endParaRPr kumimoji="0" lang="en-US" sz="1500" b="0" i="0" u="none" strike="noStrike" cap="none" spc="0" normalizeH="0" baseline="0" noProof="0" dirty="0">
-              <a:ln>
-                <a:noFill/>
-              </a:ln>
-              <a:effectLst/>
-              <a:uLnTx/>
-              <a:uFillTx/>
-            </a:endParaRPr>
-          </a:p>
-        </p:txBody>
-      </p:sp>
-      <p:sp>
-        <p:nvSpPr>
-          <p:cNvPr id="3" name="TextBox 2">
-            <a:extLst>
-              <a:ext uri="{FF2B5EF4-FFF2-40B4-BE49-F238E27FC236}">
-                <a16:creationId xmlns:a16="http://schemas.microsoft.com/office/drawing/2014/main" id="{F8BDE102-2D2B-761D-C143-07E6E190B1B0}"/>
-              </a:ext>
-            </a:extLst>
-          </p:cNvPr>
-          <p:cNvSpPr txBox="1"/>
-          <p:nvPr/>
-        </p:nvSpPr>
-        <p:spPr>
-          <a:xfrm>
-            <a:off x="6798365" y="4572000"/>
-            <a:ext cx="184731" cy="369332"/>
-          </a:xfrm>
-          <a:prstGeom prst="rect">
-            <a:avLst/>
-          </a:prstGeom>
-          <a:noFill/>
-        </p:spPr>
-        <p:txBody>
-          <a:bodyPr wrap="none" rtlCol="0">
-            <a:spAutoFit/>
-          </a:bodyPr>
-          <a:lstStyle/>
-          <a:p>
-            <a:endParaRPr lang="en-US" dirty="0"/>
-          </a:p>
-        </p:txBody>
-      </p:sp>
     </p:spTree>
     <p:extLst>
       <p:ext uri="{BB962C8B-B14F-4D97-AF65-F5344CB8AC3E}">
-        <p14:creationId xmlns:p14="http://schemas.microsoft.com/office/powerpoint/2010/main" val="2619256431"/>
+        <p14:creationId xmlns:p14="http://schemas.microsoft.com/office/powerpoint/2010/main" val="1592295358"/>
       </p:ext>
     </p:extLst>
   </p:cSld>
@@ -17004,7 +17198,7 @@
         </p:nvSpPr>
         <p:spPr>
           <a:xfrm>
-            <a:off x="841249" y="539578"/>
+            <a:off x="264473" y="568373"/>
             <a:ext cx="5981278" cy="1684638"/>
           </a:xfrm>
         </p:spPr>
@@ -17035,7 +17229,7 @@
         </p:nvSpPr>
         <p:spPr>
           <a:xfrm>
-            <a:off x="838201" y="2409568"/>
+            <a:off x="117201" y="2655472"/>
             <a:ext cx="5981278" cy="3690551"/>
           </a:xfrm>
           <a:prstGeom prst="rect">
@@ -17213,8 +17407,8 @@
         </p:blipFill>
         <p:spPr bwMode="auto">
           <a:xfrm>
-            <a:off x="4237583" y="156557"/>
-            <a:ext cx="7837215" cy="2096454"/>
+            <a:off x="3404383" y="156556"/>
+            <a:ext cx="8670416" cy="2294123"/>
           </a:xfrm>
           <a:prstGeom prst="rect">
             <a:avLst/>
@@ -17253,8 +17447,8 @@
         </p:blipFill>
         <p:spPr>
           <a:xfrm>
-            <a:off x="7305239" y="2409568"/>
-            <a:ext cx="4769559" cy="3577170"/>
+            <a:off x="5922498" y="2607237"/>
+            <a:ext cx="6152301" cy="4094206"/>
           </a:xfrm>
           <a:prstGeom prst="rect">
             <a:avLst/>
@@ -17475,7 +17669,7 @@
         </p:nvSpPr>
         <p:spPr>
           <a:xfrm>
-            <a:off x="841249" y="539578"/>
+            <a:off x="263975" y="645339"/>
             <a:ext cx="5981278" cy="1684638"/>
           </a:xfrm>
         </p:spPr>
@@ -17506,7 +17700,7 @@
         </p:nvSpPr>
         <p:spPr>
           <a:xfrm>
-            <a:off x="838201" y="2409568"/>
+            <a:off x="223797" y="2522110"/>
             <a:ext cx="5981278" cy="3690551"/>
           </a:xfrm>
           <a:prstGeom prst="rect">
@@ -17686,8 +17880,8 @@
         </p:blipFill>
         <p:spPr bwMode="auto">
           <a:xfrm>
-            <a:off x="7037179" y="62848"/>
-            <a:ext cx="4931024" cy="2638097"/>
+            <a:off x="6245253" y="0"/>
+            <a:ext cx="5943697" cy="3207434"/>
           </a:xfrm>
           <a:prstGeom prst="rect">
             <a:avLst/>
@@ -17732,8 +17926,8 @@
         </p:blipFill>
         <p:spPr bwMode="auto">
           <a:xfrm>
-            <a:off x="7077664" y="2845888"/>
-            <a:ext cx="4920734" cy="3690551"/>
+            <a:off x="6245253" y="3207434"/>
+            <a:ext cx="5941100" cy="3650566"/>
           </a:xfrm>
           <a:prstGeom prst="rect">
             <a:avLst/>
@@ -17964,8 +18158,8 @@
         </p:nvSpPr>
         <p:spPr>
           <a:xfrm>
-            <a:off x="841249" y="539578"/>
-            <a:ext cx="5981278" cy="1684638"/>
+            <a:off x="128960" y="539578"/>
+            <a:ext cx="5146425" cy="1684638"/>
           </a:xfrm>
         </p:spPr>
         <p:txBody>
@@ -17995,8 +18189,8 @@
         </p:nvSpPr>
         <p:spPr>
           <a:xfrm>
-            <a:off x="838201" y="2409568"/>
-            <a:ext cx="5489022" cy="3690551"/>
+            <a:off x="125912" y="2409568"/>
+            <a:ext cx="5475956" cy="3690551"/>
           </a:xfrm>
           <a:prstGeom prst="rect">
             <a:avLst/>
@@ -18245,8 +18439,8 @@
         </p:blipFill>
         <p:spPr bwMode="auto">
           <a:xfrm>
-            <a:off x="6451049" y="9320"/>
-            <a:ext cx="5614076" cy="3003530"/>
+            <a:off x="5601868" y="9319"/>
+            <a:ext cx="6587083" cy="3139489"/>
           </a:xfrm>
           <a:prstGeom prst="rect">
             <a:avLst/>
@@ -18291,8 +18485,8 @@
         </p:blipFill>
         <p:spPr bwMode="auto">
           <a:xfrm>
-            <a:off x="6942342" y="3022169"/>
-            <a:ext cx="5123746" cy="3817192"/>
+            <a:off x="5601867" y="3148809"/>
+            <a:ext cx="6587083" cy="3690552"/>
           </a:xfrm>
           <a:prstGeom prst="rect">
             <a:avLst/>
@@ -18430,444 +18624,7 @@
         <p:cNvPr id="1" name="">
           <a:extLst>
             <a:ext uri="{FF2B5EF4-FFF2-40B4-BE49-F238E27FC236}">
-              <a16:creationId xmlns:a16="http://schemas.microsoft.com/office/drawing/2014/main" id="{DACD16A2-33C3-B388-B832-0F4E0ECE48B4}"/>
-            </a:ext>
-          </a:extLst>
-        </p:cNvPr>
-        <p:cNvGrpSpPr/>
-        <p:nvPr/>
-      </p:nvGrpSpPr>
-      <p:grpSpPr>
-        <a:xfrm>
-          <a:off x="0" y="0"/>
-          <a:ext cx="0" cy="0"/>
-          <a:chOff x="0" y="0"/>
-          <a:chExt cx="0" cy="0"/>
-        </a:xfrm>
-      </p:grpSpPr>
-      <p:sp useBgFill="1">
-        <p:nvSpPr>
-          <p:cNvPr id="4112" name="Rectangle 4111">
-            <a:extLst>
-              <a:ext uri="{FF2B5EF4-FFF2-40B4-BE49-F238E27FC236}">
-                <a16:creationId xmlns:a16="http://schemas.microsoft.com/office/drawing/2014/main" id="{84DF55BE-B4AB-4BA1-BDE1-E9F7FB3F110A}"/>
-              </a:ext>
-              <a:ext uri="{C183D7F6-B498-43B3-948B-1728B52AA6E4}">
-                <adec:decorative xmlns:adec="http://schemas.microsoft.com/office/drawing/2017/decorative" val="1"/>
-              </a:ext>
-            </a:extLst>
-          </p:cNvPr>
-          <p:cNvSpPr>
-            <a:spLocks noGrp="1" noRot="1" noChangeAspect="1" noMove="1" noResize="1" noEditPoints="1" noAdjustHandles="1" noChangeArrowheads="1" noChangeShapeType="1" noTextEdit="1"/>
-          </p:cNvSpPr>
-          <p:nvPr>
-            <p:extLst>
-              <p:ext uri="{386F3935-93C4-4BCD-93E2-E3B085C9AB24}">
-                <p16:designElem xmlns:p16="http://schemas.microsoft.com/office/powerpoint/2015/main" val="1"/>
-              </p:ext>
-            </p:extLst>
-          </p:nvPr>
-        </p:nvSpPr>
-        <p:spPr>
-          <a:xfrm>
-            <a:off x="-1" y="0"/>
-            <a:ext cx="12188952" cy="6858000"/>
-          </a:xfrm>
-          <a:prstGeom prst="rect">
-            <a:avLst/>
-          </a:prstGeom>
-          <a:ln>
-            <a:noFill/>
-          </a:ln>
-        </p:spPr>
-        <p:style>
-          <a:lnRef idx="2">
-            <a:schemeClr val="accent1">
-              <a:shade val="50000"/>
-            </a:schemeClr>
-          </a:lnRef>
-          <a:fillRef idx="1">
-            <a:schemeClr val="accent1"/>
-          </a:fillRef>
-          <a:effectRef idx="0">
-            <a:schemeClr val="accent1"/>
-          </a:effectRef>
-          <a:fontRef idx="minor">
-            <a:schemeClr val="lt1"/>
-          </a:fontRef>
-        </p:style>
-        <p:txBody>
-          <a:bodyPr rtlCol="0" anchor="ctr"/>
-          <a:lstStyle/>
-          <a:p>
-            <a:pPr algn="ctr"/>
-            <a:endParaRPr lang="en-US"/>
-          </a:p>
-        </p:txBody>
-      </p:sp>
-      <p:sp>
-        <p:nvSpPr>
-          <p:cNvPr id="2" name="Title 1">
-            <a:extLst>
-              <a:ext uri="{FF2B5EF4-FFF2-40B4-BE49-F238E27FC236}">
-                <a16:creationId xmlns:a16="http://schemas.microsoft.com/office/drawing/2014/main" id="{7D595723-EAC6-0F7B-665E-D93B3B5FBDDE}"/>
-              </a:ext>
-            </a:extLst>
-          </p:cNvPr>
-          <p:cNvSpPr>
-            <a:spLocks noGrp="1"/>
-          </p:cNvSpPr>
-          <p:nvPr>
-            <p:ph type="title"/>
-          </p:nvPr>
-        </p:nvSpPr>
-        <p:spPr>
-          <a:xfrm>
-            <a:off x="841249" y="539578"/>
-            <a:ext cx="5981278" cy="1684638"/>
-          </a:xfrm>
-        </p:spPr>
-        <p:txBody>
-          <a:bodyPr vert="horz" lIns="91440" tIns="45720" rIns="91440" bIns="45720" rtlCol="0" anchor="ctr">
-            <a:normAutofit/>
-          </a:bodyPr>
-          <a:lstStyle/>
-          <a:p>
-            <a:r>
-              <a:rPr lang="en-US" sz="4000" dirty="0"/>
-              <a:t>Loan Grade</a:t>
-            </a:r>
-          </a:p>
-        </p:txBody>
-      </p:sp>
-      <p:sp>
-        <p:nvSpPr>
-          <p:cNvPr id="8" name="TextBox 7">
-            <a:extLst>
-              <a:ext uri="{FF2B5EF4-FFF2-40B4-BE49-F238E27FC236}">
-                <a16:creationId xmlns:a16="http://schemas.microsoft.com/office/drawing/2014/main" id="{698B1DEC-0D58-A701-FCBC-8EE8776950C8}"/>
-              </a:ext>
-            </a:extLst>
-          </p:cNvPr>
-          <p:cNvSpPr txBox="1"/>
-          <p:nvPr/>
-        </p:nvSpPr>
-        <p:spPr>
-          <a:xfrm>
-            <a:off x="838201" y="2409568"/>
-            <a:ext cx="4418363" cy="3690551"/>
-          </a:xfrm>
-          <a:prstGeom prst="rect">
-            <a:avLst/>
-          </a:prstGeom>
-        </p:spPr>
-        <p:txBody>
-          <a:bodyPr vert="horz" lIns="91440" tIns="45720" rIns="91440" bIns="45720" rtlCol="0">
-            <a:normAutofit/>
-          </a:bodyPr>
-          <a:lstStyle/>
-          <a:p>
-            <a:pPr indent="-228600">
-              <a:lnSpc>
-                <a:spcPct val="90000"/>
-              </a:lnSpc>
-              <a:spcAft>
-                <a:spcPts val="600"/>
-              </a:spcAft>
-              <a:buFont typeface="Arial" panose="020B0604020202020204" pitchFamily="34" charset="0"/>
-              <a:buChar char="•"/>
-              <a:defRPr/>
-            </a:pPr>
-            <a:r>
-              <a:rPr lang="en-IN" sz="2000" dirty="0">
-                <a:solidFill>
-                  <a:srgbClr val="0E0E0E"/>
-                </a:solidFill>
-                <a:latin typeface=".SF NS"/>
-              </a:rPr>
-              <a:t>Lower grades have the highest rates of default despite having lower proportions. </a:t>
-            </a:r>
-            <a:endParaRPr lang="en-US" sz="2000" dirty="0">
-              <a:solidFill>
-                <a:srgbClr val="0E0E0E"/>
-              </a:solidFill>
-              <a:latin typeface=".SF NS"/>
-            </a:endParaRPr>
-          </a:p>
-          <a:p>
-            <a:pPr indent="-228600">
-              <a:lnSpc>
-                <a:spcPct val="90000"/>
-              </a:lnSpc>
-              <a:spcAft>
-                <a:spcPts val="600"/>
-              </a:spcAft>
-              <a:buFont typeface="Arial" panose="020B0604020202020204" pitchFamily="34" charset="0"/>
-              <a:buChar char="•"/>
-              <a:defRPr/>
-            </a:pPr>
-            <a:r>
-              <a:rPr lang="en-IN" sz="2000" dirty="0">
-                <a:solidFill>
-                  <a:srgbClr val="0E0E0E"/>
-                </a:solidFill>
-                <a:effectLst/>
-                <a:latin typeface=".SF NS"/>
-              </a:rPr>
-              <a:t>Lower grades have significantly higher default rates compared to higher grades.</a:t>
-            </a:r>
-          </a:p>
-          <a:p>
-            <a:pPr indent="-228600">
-              <a:lnSpc>
-                <a:spcPct val="90000"/>
-              </a:lnSpc>
-              <a:spcAft>
-                <a:spcPts val="600"/>
-              </a:spcAft>
-              <a:buFont typeface="Arial" panose="020B0604020202020204" pitchFamily="34" charset="0"/>
-              <a:buChar char="•"/>
-              <a:defRPr/>
-            </a:pPr>
-            <a:r>
-              <a:rPr lang="en-IN" sz="2000" dirty="0">
-                <a:solidFill>
-                  <a:srgbClr val="0E0E0E"/>
-                </a:solidFill>
-                <a:highlight>
-                  <a:srgbClr val="FFFF00"/>
-                </a:highlight>
-                <a:latin typeface=".SF NS"/>
-              </a:rPr>
-              <a:t>There is an inverse correlation between loan grade and rate of default. The lower the grade, higher the chances of default. </a:t>
-            </a:r>
-            <a:endParaRPr lang="en-IN" sz="2000" dirty="0">
-              <a:solidFill>
-                <a:srgbClr val="0E0E0E"/>
-              </a:solidFill>
-              <a:effectLst/>
-              <a:highlight>
-                <a:srgbClr val="FFFF00"/>
-              </a:highlight>
-              <a:latin typeface=".SF NS"/>
-            </a:endParaRPr>
-          </a:p>
-        </p:txBody>
-      </p:sp>
-      <p:pic>
-        <p:nvPicPr>
-          <p:cNvPr id="4098" name="Picture 2">
-            <a:extLst>
-              <a:ext uri="{FF2B5EF4-FFF2-40B4-BE49-F238E27FC236}">
-                <a16:creationId xmlns:a16="http://schemas.microsoft.com/office/drawing/2014/main" id="{C4961D19-2456-6442-BEE9-DD3A59CCD8E3}"/>
-              </a:ext>
-            </a:extLst>
-          </p:cNvPr>
-          <p:cNvPicPr>
-            <a:picLocks noChangeAspect="1" noChangeArrowheads="1"/>
-          </p:cNvPicPr>
-          <p:nvPr/>
-        </p:nvPicPr>
-        <p:blipFill>
-          <a:blip r:embed="rId2">
-            <a:extLst>
-              <a:ext uri="{28A0092B-C50C-407E-A947-70E740481C1C}">
-                <a14:useLocalDpi xmlns:a14="http://schemas.microsoft.com/office/drawing/2010/main" val="0"/>
-              </a:ext>
-            </a:extLst>
-          </a:blip>
-          <a:stretch>
-            <a:fillRect/>
-          </a:stretch>
-        </p:blipFill>
-        <p:spPr bwMode="auto">
-          <a:xfrm>
-            <a:off x="5256564" y="117781"/>
-            <a:ext cx="6674249" cy="2469472"/>
-          </a:xfrm>
-          <a:prstGeom prst="rect">
-            <a:avLst/>
-          </a:prstGeom>
-          <a:noFill/>
-          <a:extLst>
-            <a:ext uri="{909E8E84-426E-40DD-AFC4-6F175D3DCCD1}">
-              <a14:hiddenFill xmlns:a14="http://schemas.microsoft.com/office/drawing/2010/main">
-                <a:solidFill>
-                  <a:srgbClr val="FFFFFF"/>
-                </a:solidFill>
-              </a14:hiddenFill>
-            </a:ext>
-          </a:extLst>
-        </p:spPr>
-      </p:pic>
-      <p:pic>
-        <p:nvPicPr>
-          <p:cNvPr id="4100" name="Picture 4">
-            <a:extLst>
-              <a:ext uri="{FF2B5EF4-FFF2-40B4-BE49-F238E27FC236}">
-                <a16:creationId xmlns:a16="http://schemas.microsoft.com/office/drawing/2014/main" id="{7CEC1964-9DB3-FA37-2CA1-A65E513A0319}"/>
-              </a:ext>
-            </a:extLst>
-          </p:cNvPr>
-          <p:cNvPicPr>
-            <a:picLocks noChangeAspect="1" noChangeArrowheads="1"/>
-          </p:cNvPicPr>
-          <p:nvPr/>
-        </p:nvPicPr>
-        <p:blipFill>
-          <a:blip r:embed="rId3">
-            <a:extLst>
-              <a:ext uri="{28A0092B-C50C-407E-A947-70E740481C1C}">
-                <a14:useLocalDpi xmlns:a14="http://schemas.microsoft.com/office/drawing/2010/main" val="0"/>
-              </a:ext>
-            </a:extLst>
-          </a:blip>
-          <a:stretch>
-            <a:fillRect/>
-          </a:stretch>
-        </p:blipFill>
-        <p:spPr bwMode="auto">
-          <a:xfrm>
-            <a:off x="6819479" y="2705034"/>
-            <a:ext cx="5111334" cy="3807944"/>
-          </a:xfrm>
-          <a:prstGeom prst="rect">
-            <a:avLst/>
-          </a:prstGeom>
-          <a:noFill/>
-          <a:extLst>
-            <a:ext uri="{909E8E84-426E-40DD-AFC4-6F175D3DCCD1}">
-              <a14:hiddenFill xmlns:a14="http://schemas.microsoft.com/office/drawing/2010/main">
-                <a:solidFill>
-                  <a:srgbClr val="FFFFFF"/>
-                </a:solidFill>
-              </a14:hiddenFill>
-            </a:ext>
-          </a:extLst>
-        </p:spPr>
-      </p:pic>
-    </p:spTree>
-    <p:extLst>
-      <p:ext uri="{BB962C8B-B14F-4D97-AF65-F5344CB8AC3E}">
-        <p14:creationId xmlns:p14="http://schemas.microsoft.com/office/powerpoint/2010/main" val="1629250955"/>
-      </p:ext>
-    </p:extLst>
-  </p:cSld>
-  <p:clrMapOvr>
-    <a:masterClrMapping/>
-  </p:clrMapOvr>
-  <p:timing>
-    <p:tnLst>
-      <p:par>
-        <p:cTn id="1" dur="indefinite" restart="never" nodeType="tmRoot">
-          <p:childTnLst>
-            <p:seq concurrent="1" nextAc="seek">
-              <p:cTn id="2" dur="indefinite" nodeType="mainSeq">
-                <p:childTnLst>
-                  <p:par>
-                    <p:cTn id="3" fill="hold">
-                      <p:stCondLst>
-                        <p:cond delay="indefinite"/>
-                        <p:cond evt="onBegin" delay="0">
-                          <p:tn val="2"/>
-                        </p:cond>
-                      </p:stCondLst>
-                      <p:childTnLst>
-                        <p:par>
-                          <p:cTn id="4" fill="hold">
-                            <p:stCondLst>
-                              <p:cond delay="0"/>
-                            </p:stCondLst>
-                            <p:childTnLst>
-                              <p:par>
-                                <p:cTn id="5" presetID="10" presetClass="entr" presetSubtype="0" fill="hold" grpId="0" nodeType="withEffect">
-                                  <p:stCondLst>
-                                    <p:cond delay="500"/>
-                                  </p:stCondLst>
-                                  <p:iterate type="wd">
-                                    <p:tmPct val="15000"/>
-                                  </p:iterate>
-                                  <p:childTnLst>
-                                    <p:set>
-                                      <p:cBhvr>
-                                        <p:cTn id="6" dur="1" fill="hold">
-                                          <p:stCondLst>
-                                            <p:cond delay="0"/>
-                                          </p:stCondLst>
-                                        </p:cTn>
-                                        <p:tgtEl>
-                                          <p:spTgt spid="2"/>
-                                        </p:tgtEl>
-                                        <p:attrNameLst>
-                                          <p:attrName>style.visibility</p:attrName>
-                                        </p:attrNameLst>
-                                      </p:cBhvr>
-                                      <p:to>
-                                        <p:strVal val="visible"/>
-                                      </p:to>
-                                    </p:set>
-                                    <p:animEffect transition="in" filter="fade">
-                                      <p:cBhvr>
-                                        <p:cTn id="7" dur="1000"/>
-                                        <p:tgtEl>
-                                          <p:spTgt spid="2"/>
-                                        </p:tgtEl>
-                                      </p:cBhvr>
-                                    </p:animEffect>
-                                  </p:childTnLst>
-                                </p:cTn>
-                              </p:par>
-                            </p:childTnLst>
-                          </p:cTn>
-                        </p:par>
-                      </p:childTnLst>
-                    </p:cTn>
-                  </p:par>
-                </p:childTnLst>
-              </p:cTn>
-              <p:prevCondLst>
-                <p:cond evt="onPrev" delay="0">
-                  <p:tgtEl>
-                    <p:sldTgt/>
-                  </p:tgtEl>
-                </p:cond>
-              </p:prevCondLst>
-              <p:nextCondLst>
-                <p:cond evt="onNext" delay="0">
-                  <p:tgtEl>
-                    <p:sldTgt/>
-                  </p:tgtEl>
-                </p:cond>
-              </p:nextCondLst>
-            </p:seq>
-          </p:childTnLst>
-        </p:cTn>
-      </p:par>
-    </p:tnLst>
-    <p:bldLst>
-      <p:bldP spid="2" grpId="0"/>
-    </p:bldLst>
-  </p:timing>
-</p:sld>
-</file>
-
-<file path=ppt/slides/slide9.xml><?xml version="1.0" encoding="utf-8"?>
-<p:sld xmlns:a="http://schemas.openxmlformats.org/drawingml/2006/main" xmlns:r="http://schemas.openxmlformats.org/officeDocument/2006/relationships" xmlns:p="http://schemas.openxmlformats.org/presentationml/2006/main">
-  <p:cSld>
-    <p:bg>
-      <p:bgPr>
-        <a:solidFill>
-          <a:schemeClr val="bg1"/>
-        </a:solidFill>
-        <a:effectLst/>
-      </p:bgPr>
-    </p:bg>
-    <p:spTree>
-      <p:nvGrpSpPr>
-        <p:cNvPr id="1" name="">
-          <a:extLst>
-            <a:ext uri="{FF2B5EF4-FFF2-40B4-BE49-F238E27FC236}">
-              <a16:creationId xmlns:a16="http://schemas.microsoft.com/office/drawing/2014/main" id="{8119757D-EA40-4809-AABF-217776FCED82}"/>
+              <a16:creationId xmlns:a16="http://schemas.microsoft.com/office/drawing/2014/main" id="{37179BE2-6004-C91B-B928-7A49A6ED35F8}"/>
             </a:ext>
           </a:extLst>
         </p:cNvPr>
@@ -18887,7 +18644,7 @@
           <p:cNvPr id="5127" name="Rectangle 5126">
             <a:extLst>
               <a:ext uri="{FF2B5EF4-FFF2-40B4-BE49-F238E27FC236}">
-                <a16:creationId xmlns:a16="http://schemas.microsoft.com/office/drawing/2014/main" id="{743AA782-23D1-4521-8CAD-47662984AA08}"/>
+                <a16:creationId xmlns:a16="http://schemas.microsoft.com/office/drawing/2014/main" id="{FA6C5586-ECEB-3090-F619-52EC4D068F6F}"/>
               </a:ext>
               <a:ext uri="{C183D7F6-B498-43B3-948B-1728B52AA6E4}">
                 <adec:decorative xmlns:adec="http://schemas.microsoft.com/office/drawing/2017/decorative" val="1"/>
@@ -18937,8 +18694,37 @@
           <a:bodyPr rtlCol="0" anchor="ctr"/>
           <a:lstStyle/>
           <a:p>
-            <a:pPr algn="ctr"/>
-            <a:endParaRPr lang="en-US"/>
+            <a:pPr marL="0" marR="0" lvl="0" indent="0" algn="ctr" defTabSz="914400" rtl="0" eaLnBrk="1" fontAlgn="auto" latinLnBrk="0" hangingPunct="1">
+              <a:lnSpc>
+                <a:spcPct val="100000"/>
+              </a:lnSpc>
+              <a:spcBef>
+                <a:spcPts val="0"/>
+              </a:spcBef>
+              <a:spcAft>
+                <a:spcPts val="0"/>
+              </a:spcAft>
+              <a:buClrTx/>
+              <a:buSzTx/>
+              <a:buFontTx/>
+              <a:buNone/>
+              <a:tabLst/>
+              <a:defRPr/>
+            </a:pPr>
+            <a:endParaRPr kumimoji="0" lang="en-US" sz="1800" b="0" i="0" u="none" strike="noStrike" kern="1200" cap="none" spc="0" normalizeH="0" baseline="0" noProof="0">
+              <a:ln>
+                <a:noFill/>
+              </a:ln>
+              <a:solidFill>
+                <a:prstClr val="white"/>
+              </a:solidFill>
+              <a:effectLst/>
+              <a:uLnTx/>
+              <a:uFillTx/>
+              <a:latin typeface="Aptos" panose="02110004020202020204"/>
+              <a:ea typeface="+mn-ea"/>
+              <a:cs typeface="+mn-cs"/>
+            </a:endParaRPr>
           </a:p>
         </p:txBody>
       </p:sp>
@@ -18947,7 +18733,7 @@
           <p:cNvPr id="2" name="Title 1">
             <a:extLst>
               <a:ext uri="{FF2B5EF4-FFF2-40B4-BE49-F238E27FC236}">
-                <a16:creationId xmlns:a16="http://schemas.microsoft.com/office/drawing/2014/main" id="{3D666607-90A0-49B0-DCA0-59012F1CD272}"/>
+                <a16:creationId xmlns:a16="http://schemas.microsoft.com/office/drawing/2014/main" id="{70FBA807-0E17-9A96-A02E-84DF700941DB}"/>
               </a:ext>
             </a:extLst>
           </p:cNvPr>
@@ -18989,7 +18775,7 @@
           <p:cNvPr id="5129" name="sketch line">
             <a:extLst>
               <a:ext uri="{FF2B5EF4-FFF2-40B4-BE49-F238E27FC236}">
-                <a16:creationId xmlns:a16="http://schemas.microsoft.com/office/drawing/2014/main" id="{650D18FE-0824-4A46-B22C-A86B52E5780A}"/>
+                <a16:creationId xmlns:a16="http://schemas.microsoft.com/office/drawing/2014/main" id="{7967F7DD-D4BA-4146-8E14-061C8003B450}"/>
               </a:ext>
               <a:ext uri="{C183D7F6-B498-43B3-948B-1728B52AA6E4}">
                 <adec:decorative xmlns:adec="http://schemas.microsoft.com/office/drawing/2017/decorative" val="1"/>
@@ -19252,8 +19038,37 @@
           <a:bodyPr rtlCol="0" anchor="ctr"/>
           <a:lstStyle/>
           <a:p>
-            <a:pPr algn="ctr"/>
-            <a:endParaRPr lang="en-US"/>
+            <a:pPr marL="0" marR="0" lvl="0" indent="0" algn="ctr" defTabSz="914400" rtl="0" eaLnBrk="1" fontAlgn="auto" latinLnBrk="0" hangingPunct="1">
+              <a:lnSpc>
+                <a:spcPct val="100000"/>
+              </a:lnSpc>
+              <a:spcBef>
+                <a:spcPts val="0"/>
+              </a:spcBef>
+              <a:spcAft>
+                <a:spcPts val="0"/>
+              </a:spcAft>
+              <a:buClrTx/>
+              <a:buSzTx/>
+              <a:buFontTx/>
+              <a:buNone/>
+              <a:tabLst/>
+              <a:defRPr/>
+            </a:pPr>
+            <a:endParaRPr kumimoji="0" lang="en-US" sz="1800" b="0" i="0" u="none" strike="noStrike" kern="1200" cap="none" spc="0" normalizeH="0" baseline="0" noProof="0">
+              <a:ln>
+                <a:noFill/>
+              </a:ln>
+              <a:solidFill>
+                <a:prstClr val="white"/>
+              </a:solidFill>
+              <a:effectLst/>
+              <a:uLnTx/>
+              <a:uFillTx/>
+              <a:latin typeface="Aptos" panose="02110004020202020204"/>
+              <a:ea typeface="+mn-ea"/>
+              <a:cs typeface="+mn-cs"/>
+            </a:endParaRPr>
           </a:p>
         </p:txBody>
       </p:sp>
@@ -19262,7 +19077,7 @@
           <p:cNvPr id="8" name="TextBox 7">
             <a:extLst>
               <a:ext uri="{FF2B5EF4-FFF2-40B4-BE49-F238E27FC236}">
-                <a16:creationId xmlns:a16="http://schemas.microsoft.com/office/drawing/2014/main" id="{BEEF90CD-CD56-DF53-2D57-42E23B855D55}"/>
+                <a16:creationId xmlns:a16="http://schemas.microsoft.com/office/drawing/2014/main" id="{52F2818D-E5DC-D62F-C465-337EF50A6555}"/>
               </a:ext>
             </a:extLst>
           </p:cNvPr>
@@ -19284,88 +19099,146 @@
           </a:bodyPr>
           <a:lstStyle/>
           <a:p>
-            <a:pPr indent="-228600">
+            <a:pPr marL="0" marR="0" lvl="0" indent="-228600" algn="l" defTabSz="914400" rtl="0" eaLnBrk="1" fontAlgn="auto" latinLnBrk="0" hangingPunct="1">
               <a:lnSpc>
                 <a:spcPct val="90000"/>
               </a:lnSpc>
+              <a:spcBef>
+                <a:spcPts val="0"/>
+              </a:spcBef>
               <a:spcAft>
                 <a:spcPts val="600"/>
               </a:spcAft>
+              <a:buClrTx/>
+              <a:buSzTx/>
               <a:buFont typeface="Arial" panose="020B0604020202020204" pitchFamily="34" charset="0"/>
               <a:buChar char="•"/>
+              <a:tabLst/>
               <a:defRPr/>
             </a:pPr>
             <a:r>
-              <a:rPr lang="en-IN" sz="2400" b="1" dirty="0">
+              <a:rPr kumimoji="0" lang="en-IN" sz="2400" b="1" i="0" u="none" strike="noStrike" kern="1200" cap="none" spc="0" normalizeH="0" baseline="0" noProof="0" dirty="0">
+                <a:ln>
+                  <a:noFill/>
+                </a:ln>
                 <a:solidFill>
                   <a:srgbClr val="0E0E0E"/>
                 </a:solidFill>
                 <a:effectLst/>
+                <a:uLnTx/>
+                <a:uFillTx/>
                 <a:latin typeface=".SF NS"/>
+                <a:ea typeface="+mn-ea"/>
+                <a:cs typeface="+mn-cs"/>
               </a:rPr>
               <a:t>Debt Consolidation</a:t>
             </a:r>
             <a:r>
-              <a:rPr lang="en-IN" sz="2400" dirty="0">
+              <a:rPr kumimoji="0" lang="en-IN" sz="2400" b="0" i="0" u="none" strike="noStrike" kern="1200" cap="none" spc="0" normalizeH="0" baseline="0" noProof="0" dirty="0">
+                <a:ln>
+                  <a:noFill/>
+                </a:ln>
                 <a:solidFill>
                   <a:srgbClr val="0E0E0E"/>
                 </a:solidFill>
                 <a:effectLst/>
+                <a:uLnTx/>
+                <a:uFillTx/>
                 <a:latin typeface=".SF NS"/>
+                <a:ea typeface="+mn-ea"/>
+                <a:cs typeface="+mn-cs"/>
               </a:rPr>
               <a:t> is the most popular purpose (</a:t>
             </a:r>
             <a:r>
-              <a:rPr lang="en-IN" sz="2400" b="1" dirty="0">
+              <a:rPr kumimoji="0" lang="en-IN" sz="2400" b="1" i="0" u="none" strike="noStrike" kern="1200" cap="none" spc="0" normalizeH="0" baseline="0" noProof="0" dirty="0">
+                <a:ln>
+                  <a:noFill/>
+                </a:ln>
                 <a:solidFill>
                   <a:srgbClr val="0E0E0E"/>
                 </a:solidFill>
                 <a:effectLst/>
+                <a:uLnTx/>
+                <a:uFillTx/>
                 <a:latin typeface=".SF NS"/>
+                <a:ea typeface="+mn-ea"/>
+                <a:cs typeface="+mn-cs"/>
               </a:rPr>
               <a:t>47.3% of total loans). </a:t>
             </a:r>
           </a:p>
           <a:p>
-            <a:pPr indent="-228600">
+            <a:pPr marL="0" marR="0" lvl="0" indent="-228600" algn="l" defTabSz="914400" rtl="0" eaLnBrk="1" fontAlgn="auto" latinLnBrk="0" hangingPunct="1">
               <a:lnSpc>
                 <a:spcPct val="90000"/>
               </a:lnSpc>
+              <a:spcBef>
+                <a:spcPts val="0"/>
+              </a:spcBef>
               <a:spcAft>
                 <a:spcPts val="600"/>
               </a:spcAft>
+              <a:buClrTx/>
+              <a:buSzTx/>
               <a:buFont typeface="Arial" panose="020B0604020202020204" pitchFamily="34" charset="0"/>
               <a:buChar char="•"/>
+              <a:tabLst/>
               <a:defRPr/>
             </a:pPr>
             <a:r>
-              <a:rPr kumimoji="0" lang="en-US" sz="2200" b="0" i="0" u="none" strike="noStrike" cap="none" spc="0" normalizeH="0" baseline="0" noProof="0" dirty="0">
+              <a:rPr kumimoji="0" lang="en-US" sz="2200" b="0" i="0" u="none" strike="noStrike" kern="1200" cap="none" spc="0" normalizeH="0" baseline="0" noProof="0" dirty="0">
                 <a:ln>
                   <a:noFill/>
                 </a:ln>
+                <a:solidFill>
+                  <a:prstClr val="black"/>
+                </a:solidFill>
                 <a:effectLst/>
                 <a:highlight>
                   <a:srgbClr val="FFFF00"/>
                 </a:highlight>
                 <a:uLnTx/>
                 <a:uFillTx/>
+                <a:latin typeface="Aptos" panose="02110004020202020204"/>
+                <a:ea typeface="+mn-ea"/>
+                <a:cs typeface="+mn-cs"/>
               </a:rPr>
               <a:t>Small business loans and renewable energy loans are the riskiest loans with 26.19% and 18% default rate respectively.</a:t>
             </a:r>
           </a:p>
           <a:p>
-            <a:pPr indent="-228600">
+            <a:pPr marL="0" marR="0" lvl="0" indent="-228600" algn="l" defTabSz="914400" rtl="0" eaLnBrk="1" fontAlgn="auto" latinLnBrk="0" hangingPunct="1">
               <a:lnSpc>
                 <a:spcPct val="90000"/>
               </a:lnSpc>
+              <a:spcBef>
+                <a:spcPts val="0"/>
+              </a:spcBef>
               <a:spcAft>
                 <a:spcPts val="600"/>
               </a:spcAft>
+              <a:buClrTx/>
+              <a:buSzTx/>
               <a:buFont typeface="Arial" panose="020B0604020202020204" pitchFamily="34" charset="0"/>
               <a:buChar char="•"/>
+              <a:tabLst/>
               <a:defRPr/>
             </a:pPr>
-            <a:endParaRPr lang="en-US" sz="2200" dirty="0"/>
+            <a:endParaRPr kumimoji="0" lang="en-US" sz="2200" b="0" i="0" u="none" strike="noStrike" kern="1200" cap="none" spc="0" normalizeH="0" baseline="0" noProof="0" dirty="0">
+              <a:ln>
+                <a:noFill/>
+              </a:ln>
+              <a:solidFill>
+                <a:prstClr val="black"/>
+              </a:solidFill>
+              <a:effectLst/>
+              <a:uLnTx/>
+              <a:uFillTx/>
+              <a:latin typeface="Aptos" panose="02110004020202020204"/>
+              <a:ea typeface="+mn-ea"/>
+              <a:cs typeface="+mn-cs"/>
+            </a:endParaRPr>
           </a:p>
         </p:txBody>
       </p:sp>
@@ -19374,7 +19247,7 @@
           <p:cNvPr id="5122" name="Picture 2">
             <a:extLst>
               <a:ext uri="{FF2B5EF4-FFF2-40B4-BE49-F238E27FC236}">
-                <a16:creationId xmlns:a16="http://schemas.microsoft.com/office/drawing/2014/main" id="{1F315E91-6693-71DB-16B2-7B9E697D14F2}"/>
+                <a16:creationId xmlns:a16="http://schemas.microsoft.com/office/drawing/2014/main" id="{88E9A565-82AF-5E46-5CB8-52A31C8E7E97}"/>
               </a:ext>
             </a:extLst>
           </p:cNvPr>
@@ -19418,7 +19291,444 @@
     </p:spTree>
     <p:extLst>
       <p:ext uri="{BB962C8B-B14F-4D97-AF65-F5344CB8AC3E}">
-        <p14:creationId xmlns:p14="http://schemas.microsoft.com/office/powerpoint/2010/main" val="2639818551"/>
+        <p14:creationId xmlns:p14="http://schemas.microsoft.com/office/powerpoint/2010/main" val="523664251"/>
+      </p:ext>
+    </p:extLst>
+  </p:cSld>
+  <p:clrMapOvr>
+    <a:masterClrMapping/>
+  </p:clrMapOvr>
+  <p:timing>
+    <p:tnLst>
+      <p:par>
+        <p:cTn id="1" dur="indefinite" restart="never" nodeType="tmRoot">
+          <p:childTnLst>
+            <p:seq concurrent="1" nextAc="seek">
+              <p:cTn id="2" dur="indefinite" nodeType="mainSeq">
+                <p:childTnLst>
+                  <p:par>
+                    <p:cTn id="3" fill="hold">
+                      <p:stCondLst>
+                        <p:cond delay="indefinite"/>
+                        <p:cond evt="onBegin" delay="0">
+                          <p:tn val="2"/>
+                        </p:cond>
+                      </p:stCondLst>
+                      <p:childTnLst>
+                        <p:par>
+                          <p:cTn id="4" fill="hold">
+                            <p:stCondLst>
+                              <p:cond delay="0"/>
+                            </p:stCondLst>
+                            <p:childTnLst>
+                              <p:par>
+                                <p:cTn id="5" presetID="10" presetClass="entr" presetSubtype="0" fill="hold" grpId="0" nodeType="withEffect">
+                                  <p:stCondLst>
+                                    <p:cond delay="500"/>
+                                  </p:stCondLst>
+                                  <p:iterate type="wd">
+                                    <p:tmPct val="15000"/>
+                                  </p:iterate>
+                                  <p:childTnLst>
+                                    <p:set>
+                                      <p:cBhvr>
+                                        <p:cTn id="6" dur="1" fill="hold">
+                                          <p:stCondLst>
+                                            <p:cond delay="0"/>
+                                          </p:stCondLst>
+                                        </p:cTn>
+                                        <p:tgtEl>
+                                          <p:spTgt spid="2"/>
+                                        </p:tgtEl>
+                                        <p:attrNameLst>
+                                          <p:attrName>style.visibility</p:attrName>
+                                        </p:attrNameLst>
+                                      </p:cBhvr>
+                                      <p:to>
+                                        <p:strVal val="visible"/>
+                                      </p:to>
+                                    </p:set>
+                                    <p:animEffect transition="in" filter="fade">
+                                      <p:cBhvr>
+                                        <p:cTn id="7" dur="1000"/>
+                                        <p:tgtEl>
+                                          <p:spTgt spid="2"/>
+                                        </p:tgtEl>
+                                      </p:cBhvr>
+                                    </p:animEffect>
+                                  </p:childTnLst>
+                                </p:cTn>
+                              </p:par>
+                            </p:childTnLst>
+                          </p:cTn>
+                        </p:par>
+                      </p:childTnLst>
+                    </p:cTn>
+                  </p:par>
+                </p:childTnLst>
+              </p:cTn>
+              <p:prevCondLst>
+                <p:cond evt="onPrev" delay="0">
+                  <p:tgtEl>
+                    <p:sldTgt/>
+                  </p:tgtEl>
+                </p:cond>
+              </p:prevCondLst>
+              <p:nextCondLst>
+                <p:cond evt="onNext" delay="0">
+                  <p:tgtEl>
+                    <p:sldTgt/>
+                  </p:tgtEl>
+                </p:cond>
+              </p:nextCondLst>
+            </p:seq>
+          </p:childTnLst>
+        </p:cTn>
+      </p:par>
+    </p:tnLst>
+    <p:bldLst>
+      <p:bldP spid="2" grpId="0"/>
+    </p:bldLst>
+  </p:timing>
+</p:sld>
+</file>
+
+<file path=ppt/slides/slide9.xml><?xml version="1.0" encoding="utf-8"?>
+<p:sld xmlns:a="http://schemas.openxmlformats.org/drawingml/2006/main" xmlns:r="http://schemas.openxmlformats.org/officeDocument/2006/relationships" xmlns:p="http://schemas.openxmlformats.org/presentationml/2006/main">
+  <p:cSld>
+    <p:bg>
+      <p:bgPr>
+        <a:solidFill>
+          <a:schemeClr val="bg1"/>
+        </a:solidFill>
+        <a:effectLst/>
+      </p:bgPr>
+    </p:bg>
+    <p:spTree>
+      <p:nvGrpSpPr>
+        <p:cNvPr id="1" name="">
+          <a:extLst>
+            <a:ext uri="{FF2B5EF4-FFF2-40B4-BE49-F238E27FC236}">
+              <a16:creationId xmlns:a16="http://schemas.microsoft.com/office/drawing/2014/main" id="{DACD16A2-33C3-B388-B832-0F4E0ECE48B4}"/>
+            </a:ext>
+          </a:extLst>
+        </p:cNvPr>
+        <p:cNvGrpSpPr/>
+        <p:nvPr/>
+      </p:nvGrpSpPr>
+      <p:grpSpPr>
+        <a:xfrm>
+          <a:off x="0" y="0"/>
+          <a:ext cx="0" cy="0"/>
+          <a:chOff x="0" y="0"/>
+          <a:chExt cx="0" cy="0"/>
+        </a:xfrm>
+      </p:grpSpPr>
+      <p:sp useBgFill="1">
+        <p:nvSpPr>
+          <p:cNvPr id="4112" name="Rectangle 4111">
+            <a:extLst>
+              <a:ext uri="{FF2B5EF4-FFF2-40B4-BE49-F238E27FC236}">
+                <a16:creationId xmlns:a16="http://schemas.microsoft.com/office/drawing/2014/main" id="{84DF55BE-B4AB-4BA1-BDE1-E9F7FB3F110A}"/>
+              </a:ext>
+              <a:ext uri="{C183D7F6-B498-43B3-948B-1728B52AA6E4}">
+                <adec:decorative xmlns:adec="http://schemas.microsoft.com/office/drawing/2017/decorative" val="1"/>
+              </a:ext>
+            </a:extLst>
+          </p:cNvPr>
+          <p:cNvSpPr>
+            <a:spLocks noGrp="1" noRot="1" noChangeAspect="1" noMove="1" noResize="1" noEditPoints="1" noAdjustHandles="1" noChangeArrowheads="1" noChangeShapeType="1" noTextEdit="1"/>
+          </p:cNvSpPr>
+          <p:nvPr>
+            <p:extLst>
+              <p:ext uri="{386F3935-93C4-4BCD-93E2-E3B085C9AB24}">
+                <p16:designElem xmlns:p16="http://schemas.microsoft.com/office/powerpoint/2015/main" val="1"/>
+              </p:ext>
+            </p:extLst>
+          </p:nvPr>
+        </p:nvSpPr>
+        <p:spPr>
+          <a:xfrm>
+            <a:off x="-1" y="0"/>
+            <a:ext cx="12188952" cy="6858000"/>
+          </a:xfrm>
+          <a:prstGeom prst="rect">
+            <a:avLst/>
+          </a:prstGeom>
+          <a:ln>
+            <a:noFill/>
+          </a:ln>
+        </p:spPr>
+        <p:style>
+          <a:lnRef idx="2">
+            <a:schemeClr val="accent1">
+              <a:shade val="50000"/>
+            </a:schemeClr>
+          </a:lnRef>
+          <a:fillRef idx="1">
+            <a:schemeClr val="accent1"/>
+          </a:fillRef>
+          <a:effectRef idx="0">
+            <a:schemeClr val="accent1"/>
+          </a:effectRef>
+          <a:fontRef idx="minor">
+            <a:schemeClr val="lt1"/>
+          </a:fontRef>
+        </p:style>
+        <p:txBody>
+          <a:bodyPr rtlCol="0" anchor="ctr"/>
+          <a:lstStyle/>
+          <a:p>
+            <a:pPr algn="ctr"/>
+            <a:endParaRPr lang="en-US"/>
+          </a:p>
+        </p:txBody>
+      </p:sp>
+      <p:sp>
+        <p:nvSpPr>
+          <p:cNvPr id="2" name="Title 1">
+            <a:extLst>
+              <a:ext uri="{FF2B5EF4-FFF2-40B4-BE49-F238E27FC236}">
+                <a16:creationId xmlns:a16="http://schemas.microsoft.com/office/drawing/2014/main" id="{7D595723-EAC6-0F7B-665E-D93B3B5FBDDE}"/>
+              </a:ext>
+            </a:extLst>
+          </p:cNvPr>
+          <p:cNvSpPr>
+            <a:spLocks noGrp="1"/>
+          </p:cNvSpPr>
+          <p:nvPr>
+            <p:ph type="title"/>
+          </p:nvPr>
+        </p:nvSpPr>
+        <p:spPr>
+          <a:xfrm>
+            <a:off x="114722" y="652562"/>
+            <a:ext cx="5981278" cy="1684638"/>
+          </a:xfrm>
+        </p:spPr>
+        <p:txBody>
+          <a:bodyPr vert="horz" lIns="91440" tIns="45720" rIns="91440" bIns="45720" rtlCol="0" anchor="ctr">
+            <a:normAutofit/>
+          </a:bodyPr>
+          <a:lstStyle/>
+          <a:p>
+            <a:r>
+              <a:rPr lang="en-US" sz="4000" dirty="0"/>
+              <a:t>Loan Grade</a:t>
+            </a:r>
+          </a:p>
+        </p:txBody>
+      </p:sp>
+      <p:sp>
+        <p:nvSpPr>
+          <p:cNvPr id="8" name="TextBox 7">
+            <a:extLst>
+              <a:ext uri="{FF2B5EF4-FFF2-40B4-BE49-F238E27FC236}">
+                <a16:creationId xmlns:a16="http://schemas.microsoft.com/office/drawing/2014/main" id="{698B1DEC-0D58-A701-FCBC-8EE8776950C8}"/>
+              </a:ext>
+            </a:extLst>
+          </p:cNvPr>
+          <p:cNvSpPr txBox="1"/>
+          <p:nvPr/>
+        </p:nvSpPr>
+        <p:spPr>
+          <a:xfrm>
+            <a:off x="111674" y="2522552"/>
+            <a:ext cx="4418363" cy="3690551"/>
+          </a:xfrm>
+          <a:prstGeom prst="rect">
+            <a:avLst/>
+          </a:prstGeom>
+        </p:spPr>
+        <p:txBody>
+          <a:bodyPr vert="horz" lIns="91440" tIns="45720" rIns="91440" bIns="45720" rtlCol="0">
+            <a:normAutofit/>
+          </a:bodyPr>
+          <a:lstStyle/>
+          <a:p>
+            <a:pPr indent="-228600">
+              <a:lnSpc>
+                <a:spcPct val="90000"/>
+              </a:lnSpc>
+              <a:spcAft>
+                <a:spcPts val="600"/>
+              </a:spcAft>
+              <a:buFont typeface="Arial" panose="020B0604020202020204" pitchFamily="34" charset="0"/>
+              <a:buChar char="•"/>
+              <a:defRPr/>
+            </a:pPr>
+            <a:r>
+              <a:rPr lang="en-IN" sz="2000" dirty="0">
+                <a:solidFill>
+                  <a:srgbClr val="0E0E0E"/>
+                </a:solidFill>
+                <a:latin typeface=".SF NS"/>
+              </a:rPr>
+              <a:t>Lower grades have the highest rates of default despite having lower proportions. </a:t>
+            </a:r>
+            <a:endParaRPr lang="en-US" sz="2000" dirty="0">
+              <a:solidFill>
+                <a:srgbClr val="0E0E0E"/>
+              </a:solidFill>
+              <a:latin typeface=".SF NS"/>
+            </a:endParaRPr>
+          </a:p>
+          <a:p>
+            <a:pPr indent="-228600">
+              <a:lnSpc>
+                <a:spcPct val="90000"/>
+              </a:lnSpc>
+              <a:spcAft>
+                <a:spcPts val="600"/>
+              </a:spcAft>
+              <a:buFont typeface="Arial" panose="020B0604020202020204" pitchFamily="34" charset="0"/>
+              <a:buChar char="•"/>
+              <a:defRPr/>
+            </a:pPr>
+            <a:r>
+              <a:rPr lang="en-IN" sz="2000" dirty="0">
+                <a:solidFill>
+                  <a:srgbClr val="0E0E0E"/>
+                </a:solidFill>
+                <a:effectLst/>
+                <a:latin typeface=".SF NS"/>
+              </a:rPr>
+              <a:t>Lower grades have significantly higher default rates compared to higher grades.</a:t>
+            </a:r>
+          </a:p>
+          <a:p>
+            <a:pPr indent="-228600">
+              <a:lnSpc>
+                <a:spcPct val="90000"/>
+              </a:lnSpc>
+              <a:spcAft>
+                <a:spcPts val="600"/>
+              </a:spcAft>
+              <a:buFont typeface="Arial" panose="020B0604020202020204" pitchFamily="34" charset="0"/>
+              <a:buChar char="•"/>
+              <a:defRPr/>
+            </a:pPr>
+            <a:r>
+              <a:rPr lang="en-IN" sz="2000" dirty="0">
+                <a:solidFill>
+                  <a:srgbClr val="0E0E0E"/>
+                </a:solidFill>
+                <a:highlight>
+                  <a:srgbClr val="FFFF00"/>
+                </a:highlight>
+                <a:latin typeface=".SF NS"/>
+              </a:rPr>
+              <a:t>There is an inverse correlation between loan grade and rate of default. The lower the grade, higher the chances of default. </a:t>
+            </a:r>
+            <a:endParaRPr lang="en-IN" sz="2000" dirty="0">
+              <a:solidFill>
+                <a:srgbClr val="0E0E0E"/>
+              </a:solidFill>
+              <a:effectLst/>
+              <a:highlight>
+                <a:srgbClr val="FFFF00"/>
+              </a:highlight>
+              <a:latin typeface=".SF NS"/>
+            </a:endParaRPr>
+          </a:p>
+        </p:txBody>
+      </p:sp>
+      <p:pic>
+        <p:nvPicPr>
+          <p:cNvPr id="4098" name="Picture 2">
+            <a:extLst>
+              <a:ext uri="{FF2B5EF4-FFF2-40B4-BE49-F238E27FC236}">
+                <a16:creationId xmlns:a16="http://schemas.microsoft.com/office/drawing/2014/main" id="{C4961D19-2456-6442-BEE9-DD3A59CCD8E3}"/>
+              </a:ext>
+            </a:extLst>
+          </p:cNvPr>
+          <p:cNvPicPr>
+            <a:picLocks noChangeAspect="1" noChangeArrowheads="1"/>
+          </p:cNvPicPr>
+          <p:nvPr/>
+        </p:nvPicPr>
+        <p:blipFill>
+          <a:blip r:embed="rId2">
+            <a:extLst>
+              <a:ext uri="{28A0092B-C50C-407E-A947-70E740481C1C}">
+                <a14:useLocalDpi xmlns:a14="http://schemas.microsoft.com/office/drawing/2010/main" val="0"/>
+              </a:ext>
+            </a:extLst>
+          </a:blip>
+          <a:stretch>
+            <a:fillRect/>
+          </a:stretch>
+        </p:blipFill>
+        <p:spPr bwMode="auto">
+          <a:xfrm>
+            <a:off x="5359791" y="0"/>
+            <a:ext cx="6829160" cy="3050056"/>
+          </a:xfrm>
+          <a:prstGeom prst="rect">
+            <a:avLst/>
+          </a:prstGeom>
+          <a:noFill/>
+          <a:extLst>
+            <a:ext uri="{909E8E84-426E-40DD-AFC4-6F175D3DCCD1}">
+              <a14:hiddenFill xmlns:a14="http://schemas.microsoft.com/office/drawing/2010/main">
+                <a:solidFill>
+                  <a:srgbClr val="FFFFFF"/>
+                </a:solidFill>
+              </a14:hiddenFill>
+            </a:ext>
+          </a:extLst>
+        </p:spPr>
+      </p:pic>
+      <p:pic>
+        <p:nvPicPr>
+          <p:cNvPr id="4100" name="Picture 4">
+            <a:extLst>
+              <a:ext uri="{FF2B5EF4-FFF2-40B4-BE49-F238E27FC236}">
+                <a16:creationId xmlns:a16="http://schemas.microsoft.com/office/drawing/2014/main" id="{7CEC1964-9DB3-FA37-2CA1-A65E513A0319}"/>
+              </a:ext>
+            </a:extLst>
+          </p:cNvPr>
+          <p:cNvPicPr>
+            <a:picLocks noChangeAspect="1" noChangeArrowheads="1"/>
+          </p:cNvPicPr>
+          <p:nvPr/>
+        </p:nvPicPr>
+        <p:blipFill>
+          <a:blip r:embed="rId3">
+            <a:extLst>
+              <a:ext uri="{28A0092B-C50C-407E-A947-70E740481C1C}">
+                <a14:useLocalDpi xmlns:a14="http://schemas.microsoft.com/office/drawing/2010/main" val="0"/>
+              </a:ext>
+            </a:extLst>
+          </a:blip>
+          <a:stretch>
+            <a:fillRect/>
+          </a:stretch>
+        </p:blipFill>
+        <p:spPr bwMode="auto">
+          <a:xfrm>
+            <a:off x="5359790" y="3050056"/>
+            <a:ext cx="6829159" cy="3807944"/>
+          </a:xfrm>
+          <a:prstGeom prst="rect">
+            <a:avLst/>
+          </a:prstGeom>
+          <a:noFill/>
+          <a:extLst>
+            <a:ext uri="{909E8E84-426E-40DD-AFC4-6F175D3DCCD1}">
+              <a14:hiddenFill xmlns:a14="http://schemas.microsoft.com/office/drawing/2010/main">
+                <a:solidFill>
+                  <a:srgbClr val="FFFFFF"/>
+                </a:solidFill>
+              </a14:hiddenFill>
+            </a:ext>
+          </a:extLst>
+        </p:spPr>
+      </p:pic>
+    </p:spTree>
+    <p:extLst>
+      <p:ext uri="{BB962C8B-B14F-4D97-AF65-F5344CB8AC3E}">
+        <p14:creationId xmlns:p14="http://schemas.microsoft.com/office/powerpoint/2010/main" val="1629250955"/>
       </p:ext>
     </p:extLst>
   </p:cSld>

</xml_diff>